<commit_message>
#3 Updated mockup for sign in and sign up
</commit_message>
<xml_diff>
--- a/docs/COMPONENT-DIAGRAM.pptx
+++ b/docs/COMPONENT-DIAGRAM.pptx
@@ -6,7 +6,8 @@
   </p:sldMasterIdLst>
   <p:sldIdLst>
     <p:sldId id="256" r:id="rId2"/>
-    <p:sldId id="258" r:id="rId3"/>
+    <p:sldId id="259" r:id="rId3"/>
+    <p:sldId id="258" r:id="rId4"/>
   </p:sldIdLst>
   <p:sldSz cx="12192000" cy="6858000"/>
   <p:notesSz cx="6858000" cy="9144000"/>
@@ -105,6 +106,11 @@
       </a:defRPr>
     </a:lvl9pPr>
   </p:defaultTextStyle>
+  <p:extLst>
+    <p:ext uri="{EFAFB233-063F-42B5-8137-9DF3F51BA10A}">
+      <p15:sldGuideLst xmlns:p15="http://schemas.microsoft.com/office/powerpoint/2012/main"/>
+    </p:ext>
+  </p:extLst>
 </p:presentation>
 </file>
 
@@ -150,10 +156,9 @@
           </a:lstStyle>
           <a:p>
             <a:r>
-              <a:rPr lang="en-US" smtClean="0"/>
+              <a:rPr lang="en-US"/>
               <a:t>Click to edit Master title style</a:t>
             </a:r>
-            <a:endParaRPr lang="en-US"/>
           </a:p>
         </p:txBody>
       </p:sp>
@@ -215,10 +220,9 @@
           </a:lstStyle>
           <a:p>
             <a:r>
-              <a:rPr lang="en-US" smtClean="0"/>
+              <a:rPr lang="en-US"/>
               <a:t>Click to edit Master subtitle style</a:t>
             </a:r>
-            <a:endParaRPr lang="en-US"/>
           </a:p>
         </p:txBody>
       </p:sp>
@@ -239,7 +243,7 @@
           <a:p>
             <a:fld id="{28BE630F-C39C-4DB9-8258-0B48CA067079}" type="datetimeFigureOut">
               <a:rPr lang="en-US" smtClean="0"/>
-              <a:t>11/25/2021</a:t>
+              <a:t>11/28/2021</a:t>
             </a:fld>
             <a:endParaRPr lang="en-US"/>
           </a:p>
@@ -333,10 +337,9 @@
           <a:lstStyle/>
           <a:p>
             <a:r>
-              <a:rPr lang="en-US" smtClean="0"/>
+              <a:rPr lang="en-US"/>
               <a:t>Click to edit Master title style</a:t>
             </a:r>
-            <a:endParaRPr lang="en-US"/>
           </a:p>
         </p:txBody>
       </p:sp>
@@ -357,38 +360,37 @@
           <a:p>
             <a:pPr lvl="0"/>
             <a:r>
-              <a:rPr lang="en-US" smtClean="0"/>
+              <a:rPr lang="en-US"/>
               <a:t>Click to edit Master text styles</a:t>
             </a:r>
           </a:p>
           <a:p>
             <a:pPr lvl="1"/>
             <a:r>
-              <a:rPr lang="en-US" smtClean="0"/>
+              <a:rPr lang="en-US"/>
               <a:t>Second level</a:t>
             </a:r>
           </a:p>
           <a:p>
             <a:pPr lvl="2"/>
             <a:r>
-              <a:rPr lang="en-US" smtClean="0"/>
+              <a:rPr lang="en-US"/>
               <a:t>Third level</a:t>
             </a:r>
           </a:p>
           <a:p>
             <a:pPr lvl="3"/>
             <a:r>
-              <a:rPr lang="en-US" smtClean="0"/>
+              <a:rPr lang="en-US"/>
               <a:t>Fourth level</a:t>
             </a:r>
           </a:p>
           <a:p>
             <a:pPr lvl="4"/>
             <a:r>
-              <a:rPr lang="en-US" smtClean="0"/>
+              <a:rPr lang="en-US"/>
               <a:t>Fifth level</a:t>
             </a:r>
-            <a:endParaRPr lang="en-US"/>
           </a:p>
         </p:txBody>
       </p:sp>
@@ -409,7 +411,7 @@
           <a:p>
             <a:fld id="{28BE630F-C39C-4DB9-8258-0B48CA067079}" type="datetimeFigureOut">
               <a:rPr lang="en-US" smtClean="0"/>
-              <a:t>11/25/2021</a:t>
+              <a:t>11/28/2021</a:t>
             </a:fld>
             <a:endParaRPr lang="en-US"/>
           </a:p>
@@ -508,10 +510,9 @@
           <a:lstStyle/>
           <a:p>
             <a:r>
-              <a:rPr lang="en-US" smtClean="0"/>
+              <a:rPr lang="en-US"/>
               <a:t>Click to edit Master title style</a:t>
             </a:r>
-            <a:endParaRPr lang="en-US"/>
           </a:p>
         </p:txBody>
       </p:sp>
@@ -537,38 +538,37 @@
           <a:p>
             <a:pPr lvl="0"/>
             <a:r>
-              <a:rPr lang="en-US" smtClean="0"/>
+              <a:rPr lang="en-US"/>
               <a:t>Click to edit Master text styles</a:t>
             </a:r>
           </a:p>
           <a:p>
             <a:pPr lvl="1"/>
             <a:r>
-              <a:rPr lang="en-US" smtClean="0"/>
+              <a:rPr lang="en-US"/>
               <a:t>Second level</a:t>
             </a:r>
           </a:p>
           <a:p>
             <a:pPr lvl="2"/>
             <a:r>
-              <a:rPr lang="en-US" smtClean="0"/>
+              <a:rPr lang="en-US"/>
               <a:t>Third level</a:t>
             </a:r>
           </a:p>
           <a:p>
             <a:pPr lvl="3"/>
             <a:r>
-              <a:rPr lang="en-US" smtClean="0"/>
+              <a:rPr lang="en-US"/>
               <a:t>Fourth level</a:t>
             </a:r>
           </a:p>
           <a:p>
             <a:pPr lvl="4"/>
             <a:r>
-              <a:rPr lang="en-US" smtClean="0"/>
+              <a:rPr lang="en-US"/>
               <a:t>Fifth level</a:t>
             </a:r>
-            <a:endParaRPr lang="en-US"/>
           </a:p>
         </p:txBody>
       </p:sp>
@@ -589,7 +589,7 @@
           <a:p>
             <a:fld id="{28BE630F-C39C-4DB9-8258-0B48CA067079}" type="datetimeFigureOut">
               <a:rPr lang="en-US" smtClean="0"/>
-              <a:t>11/25/2021</a:t>
+              <a:t>11/28/2021</a:t>
             </a:fld>
             <a:endParaRPr lang="en-US"/>
           </a:p>
@@ -683,10 +683,9 @@
           <a:lstStyle/>
           <a:p>
             <a:r>
-              <a:rPr lang="en-US" smtClean="0"/>
+              <a:rPr lang="en-US"/>
               <a:t>Click to edit Master title style</a:t>
             </a:r>
-            <a:endParaRPr lang="en-US"/>
           </a:p>
         </p:txBody>
       </p:sp>
@@ -707,38 +706,37 @@
           <a:p>
             <a:pPr lvl="0"/>
             <a:r>
-              <a:rPr lang="en-US" smtClean="0"/>
+              <a:rPr lang="en-US"/>
               <a:t>Click to edit Master text styles</a:t>
             </a:r>
           </a:p>
           <a:p>
             <a:pPr lvl="1"/>
             <a:r>
-              <a:rPr lang="en-US" smtClean="0"/>
+              <a:rPr lang="en-US"/>
               <a:t>Second level</a:t>
             </a:r>
           </a:p>
           <a:p>
             <a:pPr lvl="2"/>
             <a:r>
-              <a:rPr lang="en-US" smtClean="0"/>
+              <a:rPr lang="en-US"/>
               <a:t>Third level</a:t>
             </a:r>
           </a:p>
           <a:p>
             <a:pPr lvl="3"/>
             <a:r>
-              <a:rPr lang="en-US" smtClean="0"/>
+              <a:rPr lang="en-US"/>
               <a:t>Fourth level</a:t>
             </a:r>
           </a:p>
           <a:p>
             <a:pPr lvl="4"/>
             <a:r>
-              <a:rPr lang="en-US" smtClean="0"/>
+              <a:rPr lang="en-US"/>
               <a:t>Fifth level</a:t>
             </a:r>
-            <a:endParaRPr lang="en-US"/>
           </a:p>
         </p:txBody>
       </p:sp>
@@ -759,7 +757,7 @@
           <a:p>
             <a:fld id="{28BE630F-C39C-4DB9-8258-0B48CA067079}" type="datetimeFigureOut">
               <a:rPr lang="en-US" smtClean="0"/>
-              <a:t>11/25/2021</a:t>
+              <a:t>11/28/2021</a:t>
             </a:fld>
             <a:endParaRPr lang="en-US"/>
           </a:p>
@@ -862,10 +860,9 @@
           </a:lstStyle>
           <a:p>
             <a:r>
-              <a:rPr lang="en-US" smtClean="0"/>
+              <a:rPr lang="en-US"/>
               <a:t>Click to edit Master title style</a:t>
             </a:r>
-            <a:endParaRPr lang="en-US"/>
           </a:p>
         </p:txBody>
       </p:sp>
@@ -982,7 +979,7 @@
           <a:p>
             <a:pPr lvl="0"/>
             <a:r>
-              <a:rPr lang="en-US" smtClean="0"/>
+              <a:rPr lang="en-US"/>
               <a:t>Click to edit Master text styles</a:t>
             </a:r>
           </a:p>
@@ -1005,7 +1002,7 @@
           <a:p>
             <a:fld id="{28BE630F-C39C-4DB9-8258-0B48CA067079}" type="datetimeFigureOut">
               <a:rPr lang="en-US" smtClean="0"/>
-              <a:t>11/25/2021</a:t>
+              <a:t>11/28/2021</a:t>
             </a:fld>
             <a:endParaRPr lang="en-US"/>
           </a:p>
@@ -1099,10 +1096,9 @@
           <a:lstStyle/>
           <a:p>
             <a:r>
-              <a:rPr lang="en-US" smtClean="0"/>
+              <a:rPr lang="en-US"/>
               <a:t>Click to edit Master title style</a:t>
             </a:r>
-            <a:endParaRPr lang="en-US"/>
           </a:p>
         </p:txBody>
       </p:sp>
@@ -1128,38 +1124,37 @@
           <a:p>
             <a:pPr lvl="0"/>
             <a:r>
-              <a:rPr lang="en-US" smtClean="0"/>
+              <a:rPr lang="en-US"/>
               <a:t>Click to edit Master text styles</a:t>
             </a:r>
           </a:p>
           <a:p>
             <a:pPr lvl="1"/>
             <a:r>
-              <a:rPr lang="en-US" smtClean="0"/>
+              <a:rPr lang="en-US"/>
               <a:t>Second level</a:t>
             </a:r>
           </a:p>
           <a:p>
             <a:pPr lvl="2"/>
             <a:r>
-              <a:rPr lang="en-US" smtClean="0"/>
+              <a:rPr lang="en-US"/>
               <a:t>Third level</a:t>
             </a:r>
           </a:p>
           <a:p>
             <a:pPr lvl="3"/>
             <a:r>
-              <a:rPr lang="en-US" smtClean="0"/>
+              <a:rPr lang="en-US"/>
               <a:t>Fourth level</a:t>
             </a:r>
           </a:p>
           <a:p>
             <a:pPr lvl="4"/>
             <a:r>
-              <a:rPr lang="en-US" smtClean="0"/>
+              <a:rPr lang="en-US"/>
               <a:t>Fifth level</a:t>
             </a:r>
-            <a:endParaRPr lang="en-US"/>
           </a:p>
         </p:txBody>
       </p:sp>
@@ -1185,38 +1180,37 @@
           <a:p>
             <a:pPr lvl="0"/>
             <a:r>
-              <a:rPr lang="en-US" smtClean="0"/>
+              <a:rPr lang="en-US"/>
               <a:t>Click to edit Master text styles</a:t>
             </a:r>
           </a:p>
           <a:p>
             <a:pPr lvl="1"/>
             <a:r>
-              <a:rPr lang="en-US" smtClean="0"/>
+              <a:rPr lang="en-US"/>
               <a:t>Second level</a:t>
             </a:r>
           </a:p>
           <a:p>
             <a:pPr lvl="2"/>
             <a:r>
-              <a:rPr lang="en-US" smtClean="0"/>
+              <a:rPr lang="en-US"/>
               <a:t>Third level</a:t>
             </a:r>
           </a:p>
           <a:p>
             <a:pPr lvl="3"/>
             <a:r>
-              <a:rPr lang="en-US" smtClean="0"/>
+              <a:rPr lang="en-US"/>
               <a:t>Fourth level</a:t>
             </a:r>
           </a:p>
           <a:p>
             <a:pPr lvl="4"/>
             <a:r>
-              <a:rPr lang="en-US" smtClean="0"/>
+              <a:rPr lang="en-US"/>
               <a:t>Fifth level</a:t>
             </a:r>
-            <a:endParaRPr lang="en-US"/>
           </a:p>
         </p:txBody>
       </p:sp>
@@ -1237,7 +1231,7 @@
           <a:p>
             <a:fld id="{28BE630F-C39C-4DB9-8258-0B48CA067079}" type="datetimeFigureOut">
               <a:rPr lang="en-US" smtClean="0"/>
-              <a:t>11/25/2021</a:t>
+              <a:t>11/28/2021</a:t>
             </a:fld>
             <a:endParaRPr lang="en-US"/>
           </a:p>
@@ -1336,10 +1330,9 @@
           <a:lstStyle/>
           <a:p>
             <a:r>
-              <a:rPr lang="en-US" smtClean="0"/>
+              <a:rPr lang="en-US"/>
               <a:t>Click to edit Master title style</a:t>
             </a:r>
-            <a:endParaRPr lang="en-US"/>
           </a:p>
         </p:txBody>
       </p:sp>
@@ -1402,7 +1395,7 @@
           <a:p>
             <a:pPr lvl="0"/>
             <a:r>
-              <a:rPr lang="en-US" smtClean="0"/>
+              <a:rPr lang="en-US"/>
               <a:t>Click to edit Master text styles</a:t>
             </a:r>
           </a:p>
@@ -1430,38 +1423,37 @@
           <a:p>
             <a:pPr lvl="0"/>
             <a:r>
-              <a:rPr lang="en-US" smtClean="0"/>
+              <a:rPr lang="en-US"/>
               <a:t>Click to edit Master text styles</a:t>
             </a:r>
           </a:p>
           <a:p>
             <a:pPr lvl="1"/>
             <a:r>
-              <a:rPr lang="en-US" smtClean="0"/>
+              <a:rPr lang="en-US"/>
               <a:t>Second level</a:t>
             </a:r>
           </a:p>
           <a:p>
             <a:pPr lvl="2"/>
             <a:r>
-              <a:rPr lang="en-US" smtClean="0"/>
+              <a:rPr lang="en-US"/>
               <a:t>Third level</a:t>
             </a:r>
           </a:p>
           <a:p>
             <a:pPr lvl="3"/>
             <a:r>
-              <a:rPr lang="en-US" smtClean="0"/>
+              <a:rPr lang="en-US"/>
               <a:t>Fourth level</a:t>
             </a:r>
           </a:p>
           <a:p>
             <a:pPr lvl="4"/>
             <a:r>
-              <a:rPr lang="en-US" smtClean="0"/>
+              <a:rPr lang="en-US"/>
               <a:t>Fifth level</a:t>
             </a:r>
-            <a:endParaRPr lang="en-US"/>
           </a:p>
         </p:txBody>
       </p:sp>
@@ -1524,7 +1516,7 @@
           <a:p>
             <a:pPr lvl="0"/>
             <a:r>
-              <a:rPr lang="en-US" smtClean="0"/>
+              <a:rPr lang="en-US"/>
               <a:t>Click to edit Master text styles</a:t>
             </a:r>
           </a:p>
@@ -1552,38 +1544,37 @@
           <a:p>
             <a:pPr lvl="0"/>
             <a:r>
-              <a:rPr lang="en-US" smtClean="0"/>
+              <a:rPr lang="en-US"/>
               <a:t>Click to edit Master text styles</a:t>
             </a:r>
           </a:p>
           <a:p>
             <a:pPr lvl="1"/>
             <a:r>
-              <a:rPr lang="en-US" smtClean="0"/>
+              <a:rPr lang="en-US"/>
               <a:t>Second level</a:t>
             </a:r>
           </a:p>
           <a:p>
             <a:pPr lvl="2"/>
             <a:r>
-              <a:rPr lang="en-US" smtClean="0"/>
+              <a:rPr lang="en-US"/>
               <a:t>Third level</a:t>
             </a:r>
           </a:p>
           <a:p>
             <a:pPr lvl="3"/>
             <a:r>
-              <a:rPr lang="en-US" smtClean="0"/>
+              <a:rPr lang="en-US"/>
               <a:t>Fourth level</a:t>
             </a:r>
           </a:p>
           <a:p>
             <a:pPr lvl="4"/>
             <a:r>
-              <a:rPr lang="en-US" smtClean="0"/>
+              <a:rPr lang="en-US"/>
               <a:t>Fifth level</a:t>
             </a:r>
-            <a:endParaRPr lang="en-US"/>
           </a:p>
         </p:txBody>
       </p:sp>
@@ -1604,7 +1595,7 @@
           <a:p>
             <a:fld id="{28BE630F-C39C-4DB9-8258-0B48CA067079}" type="datetimeFigureOut">
               <a:rPr lang="en-US" smtClean="0"/>
-              <a:t>11/25/2021</a:t>
+              <a:t>11/28/2021</a:t>
             </a:fld>
             <a:endParaRPr lang="en-US"/>
           </a:p>
@@ -1698,10 +1689,9 @@
           <a:lstStyle/>
           <a:p>
             <a:r>
-              <a:rPr lang="en-US" smtClean="0"/>
+              <a:rPr lang="en-US"/>
               <a:t>Click to edit Master title style</a:t>
             </a:r>
-            <a:endParaRPr lang="en-US"/>
           </a:p>
         </p:txBody>
       </p:sp>
@@ -1722,7 +1712,7 @@
           <a:p>
             <a:fld id="{28BE630F-C39C-4DB9-8258-0B48CA067079}" type="datetimeFigureOut">
               <a:rPr lang="en-US" smtClean="0"/>
-              <a:t>11/25/2021</a:t>
+              <a:t>11/28/2021</a:t>
             </a:fld>
             <a:endParaRPr lang="en-US"/>
           </a:p>
@@ -1817,7 +1807,7 @@
           <a:p>
             <a:fld id="{28BE630F-C39C-4DB9-8258-0B48CA067079}" type="datetimeFigureOut">
               <a:rPr lang="en-US" smtClean="0"/>
-              <a:t>11/25/2021</a:t>
+              <a:t>11/28/2021</a:t>
             </a:fld>
             <a:endParaRPr lang="en-US"/>
           </a:p>
@@ -1920,10 +1910,9 @@
           </a:lstStyle>
           <a:p>
             <a:r>
-              <a:rPr lang="en-US" smtClean="0"/>
+              <a:rPr lang="en-US"/>
               <a:t>Click to edit Master title style</a:t>
             </a:r>
-            <a:endParaRPr lang="en-US"/>
           </a:p>
         </p:txBody>
       </p:sp>
@@ -1977,38 +1966,37 @@
           <a:p>
             <a:pPr lvl="0"/>
             <a:r>
-              <a:rPr lang="en-US" smtClean="0"/>
+              <a:rPr lang="en-US"/>
               <a:t>Click to edit Master text styles</a:t>
             </a:r>
           </a:p>
           <a:p>
             <a:pPr lvl="1"/>
             <a:r>
-              <a:rPr lang="en-US" smtClean="0"/>
+              <a:rPr lang="en-US"/>
               <a:t>Second level</a:t>
             </a:r>
           </a:p>
           <a:p>
             <a:pPr lvl="2"/>
             <a:r>
-              <a:rPr lang="en-US" smtClean="0"/>
+              <a:rPr lang="en-US"/>
               <a:t>Third level</a:t>
             </a:r>
           </a:p>
           <a:p>
             <a:pPr lvl="3"/>
             <a:r>
-              <a:rPr lang="en-US" smtClean="0"/>
+              <a:rPr lang="en-US"/>
               <a:t>Fourth level</a:t>
             </a:r>
           </a:p>
           <a:p>
             <a:pPr lvl="4"/>
             <a:r>
-              <a:rPr lang="en-US" smtClean="0"/>
+              <a:rPr lang="en-US"/>
               <a:t>Fifth level</a:t>
             </a:r>
-            <a:endParaRPr lang="en-US"/>
           </a:p>
         </p:txBody>
       </p:sp>
@@ -2071,7 +2059,7 @@
           <a:p>
             <a:pPr lvl="0"/>
             <a:r>
-              <a:rPr lang="en-US" smtClean="0"/>
+              <a:rPr lang="en-US"/>
               <a:t>Click to edit Master text styles</a:t>
             </a:r>
           </a:p>
@@ -2094,7 +2082,7 @@
           <a:p>
             <a:fld id="{28BE630F-C39C-4DB9-8258-0B48CA067079}" type="datetimeFigureOut">
               <a:rPr lang="en-US" smtClean="0"/>
-              <a:t>11/25/2021</a:t>
+              <a:t>11/28/2021</a:t>
             </a:fld>
             <a:endParaRPr lang="en-US"/>
           </a:p>
@@ -2197,10 +2185,9 @@
           </a:lstStyle>
           <a:p>
             <a:r>
-              <a:rPr lang="en-US" smtClean="0"/>
+              <a:rPr lang="en-US"/>
               <a:t>Click to edit Master title style</a:t>
             </a:r>
-            <a:endParaRPr lang="en-US"/>
           </a:p>
         </p:txBody>
       </p:sp>
@@ -2324,7 +2311,7 @@
           <a:p>
             <a:pPr lvl="0"/>
             <a:r>
-              <a:rPr lang="en-US" smtClean="0"/>
+              <a:rPr lang="en-US"/>
               <a:t>Click to edit Master text styles</a:t>
             </a:r>
           </a:p>
@@ -2347,7 +2334,7 @@
           <a:p>
             <a:fld id="{28BE630F-C39C-4DB9-8258-0B48CA067079}" type="datetimeFigureOut">
               <a:rPr lang="en-US" smtClean="0"/>
-              <a:t>11/25/2021</a:t>
+              <a:t>11/28/2021</a:t>
             </a:fld>
             <a:endParaRPr lang="en-US"/>
           </a:p>
@@ -2456,10 +2443,9 @@
           <a:lstStyle/>
           <a:p>
             <a:r>
-              <a:rPr lang="en-US" smtClean="0"/>
+              <a:rPr lang="en-US"/>
               <a:t>Click to edit Master title style</a:t>
             </a:r>
-            <a:endParaRPr lang="en-US"/>
           </a:p>
         </p:txBody>
       </p:sp>
@@ -2490,38 +2476,37 @@
           <a:p>
             <a:pPr lvl="0"/>
             <a:r>
-              <a:rPr lang="en-US" smtClean="0"/>
+              <a:rPr lang="en-US"/>
               <a:t>Click to edit Master text styles</a:t>
             </a:r>
           </a:p>
           <a:p>
             <a:pPr lvl="1"/>
             <a:r>
-              <a:rPr lang="en-US" smtClean="0"/>
+              <a:rPr lang="en-US"/>
               <a:t>Second level</a:t>
             </a:r>
           </a:p>
           <a:p>
             <a:pPr lvl="2"/>
             <a:r>
-              <a:rPr lang="en-US" smtClean="0"/>
+              <a:rPr lang="en-US"/>
               <a:t>Third level</a:t>
             </a:r>
           </a:p>
           <a:p>
             <a:pPr lvl="3"/>
             <a:r>
-              <a:rPr lang="en-US" smtClean="0"/>
+              <a:rPr lang="en-US"/>
               <a:t>Fourth level</a:t>
             </a:r>
           </a:p>
           <a:p>
             <a:pPr lvl="4"/>
             <a:r>
-              <a:rPr lang="en-US" smtClean="0"/>
+              <a:rPr lang="en-US"/>
               <a:t>Fifth level</a:t>
             </a:r>
-            <a:endParaRPr lang="en-US"/>
           </a:p>
         </p:txBody>
       </p:sp>
@@ -2560,7 +2545,7 @@
           <a:p>
             <a:fld id="{28BE630F-C39C-4DB9-8258-0B48CA067079}" type="datetimeFigureOut">
               <a:rPr lang="en-US" smtClean="0"/>
-              <a:t>11/25/2021</a:t>
+              <a:t>11/28/2021</a:t>
             </a:fld>
             <a:endParaRPr lang="en-US"/>
           </a:p>
@@ -3222,14 +3207,196 @@
       </p:grpSpPr>
       <p:sp>
         <p:nvSpPr>
-          <p:cNvPr id="4" name="TextBox 3"/>
+          <p:cNvPr id="4" name="Rectangle: Rounded Corners 3">
+            <a:extLst>
+              <a:ext uri="{FF2B5EF4-FFF2-40B4-BE49-F238E27FC236}">
+                <a16:creationId xmlns:a16="http://schemas.microsoft.com/office/drawing/2014/main" id="{A9AFE4D5-3297-4F83-8F7F-A66D12345EB6}"/>
+              </a:ext>
+            </a:extLst>
+          </p:cNvPr>
+          <p:cNvSpPr/>
+          <p:nvPr/>
+        </p:nvSpPr>
+        <p:spPr>
+          <a:xfrm>
+            <a:off x="1089993" y="1001460"/>
+            <a:ext cx="1731626" cy="1049466"/>
+          </a:xfrm>
+          <a:prstGeom prst="roundRect">
+            <a:avLst/>
+          </a:prstGeom>
+          <a:noFill/>
+          <a:ln w="19050">
+            <a:solidFill>
+              <a:schemeClr val="accent6">
+                <a:lumMod val="75000"/>
+              </a:schemeClr>
+            </a:solidFill>
+            <a:prstDash val="dash"/>
+          </a:ln>
+        </p:spPr>
+        <p:style>
+          <a:lnRef idx="2">
+            <a:schemeClr val="dk1"/>
+          </a:lnRef>
+          <a:fillRef idx="1">
+            <a:schemeClr val="lt1"/>
+          </a:fillRef>
+          <a:effectRef idx="0">
+            <a:schemeClr val="dk1"/>
+          </a:effectRef>
+          <a:fontRef idx="minor">
+            <a:schemeClr val="dk1"/>
+          </a:fontRef>
+        </p:style>
+        <p:txBody>
+          <a:bodyPr rtlCol="0" anchor="ctr"/>
+          <a:lstStyle/>
+          <a:p>
+            <a:pPr algn="ctr"/>
+            <a:endParaRPr lang="en-US" dirty="0">
+              <a:solidFill>
+                <a:srgbClr val="00B050"/>
+              </a:solidFill>
+            </a:endParaRPr>
+          </a:p>
+        </p:txBody>
+      </p:sp>
+      <p:sp>
+        <p:nvSpPr>
+          <p:cNvPr id="5" name="Rectangle: Rounded Corners 4">
+            <a:extLst>
+              <a:ext uri="{FF2B5EF4-FFF2-40B4-BE49-F238E27FC236}">
+                <a16:creationId xmlns:a16="http://schemas.microsoft.com/office/drawing/2014/main" id="{6EFC5776-9789-4CA5-9697-8A39A3825854}"/>
+              </a:ext>
+            </a:extLst>
+          </p:cNvPr>
+          <p:cNvSpPr/>
+          <p:nvPr/>
+        </p:nvSpPr>
+        <p:spPr>
+          <a:xfrm>
+            <a:off x="1603512" y="4087622"/>
+            <a:ext cx="1991139" cy="764916"/>
+          </a:xfrm>
+          <a:prstGeom prst="roundRect">
+            <a:avLst/>
+          </a:prstGeom>
+          <a:noFill/>
+          <a:ln w="19050">
+            <a:solidFill>
+              <a:schemeClr val="accent6">
+                <a:lumMod val="75000"/>
+              </a:schemeClr>
+            </a:solidFill>
+            <a:prstDash val="dash"/>
+          </a:ln>
+        </p:spPr>
+        <p:style>
+          <a:lnRef idx="2">
+            <a:schemeClr val="dk1"/>
+          </a:lnRef>
+          <a:fillRef idx="1">
+            <a:schemeClr val="lt1"/>
+          </a:fillRef>
+          <a:effectRef idx="0">
+            <a:schemeClr val="dk1"/>
+          </a:effectRef>
+          <a:fontRef idx="minor">
+            <a:schemeClr val="dk1"/>
+          </a:fontRef>
+        </p:style>
+        <p:txBody>
+          <a:bodyPr rtlCol="0" anchor="ctr"/>
+          <a:lstStyle/>
+          <a:p>
+            <a:pPr algn="ctr"/>
+            <a:endParaRPr lang="en-US" dirty="0">
+              <a:ln>
+                <a:solidFill>
+                  <a:srgbClr val="FF0000"/>
+                </a:solidFill>
+              </a:ln>
+              <a:solidFill>
+                <a:srgbClr val="00B050"/>
+              </a:solidFill>
+            </a:endParaRPr>
+          </a:p>
+        </p:txBody>
+      </p:sp>
+      <p:sp>
+        <p:nvSpPr>
+          <p:cNvPr id="6" name="Rectangle: Rounded Corners 5">
+            <a:extLst>
+              <a:ext uri="{FF2B5EF4-FFF2-40B4-BE49-F238E27FC236}">
+                <a16:creationId xmlns:a16="http://schemas.microsoft.com/office/drawing/2014/main" id="{AFE2FB31-9699-4FC5-9BD8-4E944A1B4EA3}"/>
+              </a:ext>
+            </a:extLst>
+          </p:cNvPr>
+          <p:cNvSpPr/>
+          <p:nvPr/>
+        </p:nvSpPr>
+        <p:spPr>
+          <a:xfrm>
+            <a:off x="2650434" y="2429271"/>
+            <a:ext cx="6453809" cy="1049466"/>
+          </a:xfrm>
+          <a:prstGeom prst="roundRect">
+            <a:avLst/>
+          </a:prstGeom>
+          <a:noFill/>
+          <a:ln w="19050">
+            <a:solidFill>
+              <a:schemeClr val="accent5">
+                <a:lumMod val="75000"/>
+              </a:schemeClr>
+            </a:solidFill>
+            <a:prstDash val="dash"/>
+          </a:ln>
+        </p:spPr>
+        <p:style>
+          <a:lnRef idx="2">
+            <a:schemeClr val="dk1"/>
+          </a:lnRef>
+          <a:fillRef idx="1">
+            <a:schemeClr val="lt1"/>
+          </a:fillRef>
+          <a:effectRef idx="0">
+            <a:schemeClr val="dk1"/>
+          </a:effectRef>
+          <a:fontRef idx="minor">
+            <a:schemeClr val="dk1"/>
+          </a:fontRef>
+        </p:style>
+        <p:txBody>
+          <a:bodyPr rtlCol="0" anchor="ctr"/>
+          <a:lstStyle/>
+          <a:p>
+            <a:pPr algn="ctr"/>
+            <a:endParaRPr lang="en-US" dirty="0">
+              <a:solidFill>
+                <a:srgbClr val="00B050"/>
+              </a:solidFill>
+            </a:endParaRPr>
+          </a:p>
+        </p:txBody>
+      </p:sp>
+      <p:sp>
+        <p:nvSpPr>
+          <p:cNvPr id="7" name="TextBox 6">
+            <a:extLst>
+              <a:ext uri="{FF2B5EF4-FFF2-40B4-BE49-F238E27FC236}">
+                <a16:creationId xmlns:a16="http://schemas.microsoft.com/office/drawing/2014/main" id="{960D8AC4-6FDE-45D6-B079-F4FA13BCE3B4}"/>
+              </a:ext>
+            </a:extLst>
+          </p:cNvPr>
           <p:cNvSpPr txBox="1"/>
           <p:nvPr/>
         </p:nvSpPr>
         <p:spPr>
           <a:xfrm>
-            <a:off x="1009380" y="479624"/>
-            <a:ext cx="639919" cy="303481"/>
+            <a:off x="1603512" y="4175430"/>
+            <a:ext cx="1868557" cy="338554"/>
           </a:xfrm>
           <a:prstGeom prst="rect">
             <a:avLst/>
@@ -3237,13 +3404,52 @@
           <a:noFill/>
         </p:spPr>
         <p:txBody>
-          <a:bodyPr wrap="none" rtlCol="0">
+          <a:bodyPr wrap="square" rtlCol="0">
             <a:spAutoFit/>
           </a:bodyPr>
           <a:lstStyle/>
           <a:p>
             <a:r>
-              <a:rPr lang="en-US" sz="1372" b="1" i="1" dirty="0">
+              <a:rPr lang="en-US" sz="1600" b="1" dirty="0">
+                <a:solidFill>
+                  <a:srgbClr val="FF0000"/>
+                </a:solidFill>
+              </a:rPr>
+              <a:t>&lt;my-event-view&gt;</a:t>
+            </a:r>
+          </a:p>
+        </p:txBody>
+      </p:sp>
+      <p:sp>
+        <p:nvSpPr>
+          <p:cNvPr id="8" name="TextBox 7">
+            <a:extLst>
+              <a:ext uri="{FF2B5EF4-FFF2-40B4-BE49-F238E27FC236}">
+                <a16:creationId xmlns:a16="http://schemas.microsoft.com/office/drawing/2014/main" id="{59BD5410-A02A-4E3D-8160-C2DD19BD057F}"/>
+              </a:ext>
+            </a:extLst>
+          </p:cNvPr>
+          <p:cNvSpPr txBox="1"/>
+          <p:nvPr/>
+        </p:nvSpPr>
+        <p:spPr>
+          <a:xfrm>
+            <a:off x="1618669" y="1187639"/>
+            <a:ext cx="959552" cy="338554"/>
+          </a:xfrm>
+          <a:prstGeom prst="rect">
+            <a:avLst/>
+          </a:prstGeom>
+          <a:noFill/>
+        </p:spPr>
+        <p:txBody>
+          <a:bodyPr wrap="square" rtlCol="0">
+            <a:spAutoFit/>
+          </a:bodyPr>
+          <a:lstStyle/>
+          <a:p>
+            <a:r>
+              <a:rPr lang="en-US" sz="1600" b="1" dirty="0">
                 <a:solidFill>
                   <a:srgbClr val="FF0000"/>
                 </a:solidFill>
@@ -3255,25 +3461,463 @@
       </p:sp>
       <p:sp>
         <p:nvSpPr>
-          <p:cNvPr id="5" name="Rounded Rectangle 4"/>
+          <p:cNvPr id="9" name="TextBox 8">
+            <a:extLst>
+              <a:ext uri="{FF2B5EF4-FFF2-40B4-BE49-F238E27FC236}">
+                <a16:creationId xmlns:a16="http://schemas.microsoft.com/office/drawing/2014/main" id="{8E0926C8-D028-4BB1-B318-DF2F6667F8EF}"/>
+              </a:ext>
+            </a:extLst>
+          </p:cNvPr>
+          <p:cNvSpPr txBox="1"/>
+          <p:nvPr/>
+        </p:nvSpPr>
+        <p:spPr>
+          <a:xfrm>
+            <a:off x="4995240" y="2784727"/>
+            <a:ext cx="1551334" cy="338554"/>
+          </a:xfrm>
+          <a:prstGeom prst="rect">
+            <a:avLst/>
+          </a:prstGeom>
+          <a:noFill/>
+        </p:spPr>
+        <p:txBody>
+          <a:bodyPr wrap="square" rtlCol="0">
+            <a:spAutoFit/>
+          </a:bodyPr>
+          <a:lstStyle/>
+          <a:p>
+            <a:r>
+              <a:rPr lang="en-US" sz="1600" b="1" dirty="0">
+                <a:solidFill>
+                  <a:srgbClr val="7030A0"/>
+                </a:solidFill>
+              </a:rPr>
+              <a:t>&lt;router-view&gt;</a:t>
+            </a:r>
+          </a:p>
+        </p:txBody>
+      </p:sp>
+      <p:sp>
+        <p:nvSpPr>
+          <p:cNvPr id="10" name="Rectangle: Rounded Corners 9">
+            <a:extLst>
+              <a:ext uri="{FF2B5EF4-FFF2-40B4-BE49-F238E27FC236}">
+                <a16:creationId xmlns:a16="http://schemas.microsoft.com/office/drawing/2014/main" id="{1ED0947D-AB3B-4EF0-9FFD-46D433B2D290}"/>
+              </a:ext>
+            </a:extLst>
+          </p:cNvPr>
           <p:cNvSpPr/>
           <p:nvPr/>
         </p:nvSpPr>
         <p:spPr>
           <a:xfrm>
-            <a:off x="523323" y="309043"/>
-            <a:ext cx="1650319" cy="1166483"/>
+            <a:off x="8042052" y="4034617"/>
+            <a:ext cx="1991139" cy="732666"/>
           </a:xfrm>
           <a:prstGeom prst="roundRect">
             <a:avLst/>
           </a:prstGeom>
           <a:noFill/>
-          <a:ln>
+          <a:ln w="19050">
             <a:solidFill>
-              <a:srgbClr val="FF0000"/>
+              <a:schemeClr val="accent6">
+                <a:lumMod val="75000"/>
+              </a:schemeClr>
             </a:solidFill>
-            <a:prstDash val="lgDash"/>
+            <a:prstDash val="dash"/>
           </a:ln>
+        </p:spPr>
+        <p:style>
+          <a:lnRef idx="2">
+            <a:schemeClr val="dk1"/>
+          </a:lnRef>
+          <a:fillRef idx="1">
+            <a:schemeClr val="lt1"/>
+          </a:fillRef>
+          <a:effectRef idx="0">
+            <a:schemeClr val="dk1"/>
+          </a:effectRef>
+          <a:fontRef idx="minor">
+            <a:schemeClr val="dk1"/>
+          </a:fontRef>
+        </p:style>
+        <p:txBody>
+          <a:bodyPr rtlCol="0" anchor="ctr"/>
+          <a:lstStyle/>
+          <a:p>
+            <a:pPr algn="ctr"/>
+            <a:endParaRPr lang="en-US" dirty="0">
+              <a:ln>
+                <a:solidFill>
+                  <a:srgbClr val="FF0000"/>
+                </a:solidFill>
+              </a:ln>
+              <a:solidFill>
+                <a:srgbClr val="00B050"/>
+              </a:solidFill>
+            </a:endParaRPr>
+          </a:p>
+        </p:txBody>
+      </p:sp>
+      <p:sp>
+        <p:nvSpPr>
+          <p:cNvPr id="11" name="TextBox 10">
+            <a:extLst>
+              <a:ext uri="{FF2B5EF4-FFF2-40B4-BE49-F238E27FC236}">
+                <a16:creationId xmlns:a16="http://schemas.microsoft.com/office/drawing/2014/main" id="{B76E343B-1C5F-4BF9-AA5A-7211D685E99B}"/>
+              </a:ext>
+            </a:extLst>
+          </p:cNvPr>
+          <p:cNvSpPr txBox="1"/>
+          <p:nvPr/>
+        </p:nvSpPr>
+        <p:spPr>
+          <a:xfrm>
+            <a:off x="8358812" y="4122425"/>
+            <a:ext cx="1674379" cy="338554"/>
+          </a:xfrm>
+          <a:prstGeom prst="rect">
+            <a:avLst/>
+          </a:prstGeom>
+          <a:noFill/>
+        </p:spPr>
+        <p:txBody>
+          <a:bodyPr wrap="square" rtlCol="0">
+            <a:spAutoFit/>
+          </a:bodyPr>
+          <a:lstStyle/>
+          <a:p>
+            <a:r>
+              <a:rPr lang="en-US" sz="1600" b="1" dirty="0">
+                <a:solidFill>
+                  <a:srgbClr val="FF0000"/>
+                </a:solidFill>
+              </a:rPr>
+              <a:t>&lt;category-view&gt;</a:t>
+            </a:r>
+          </a:p>
+        </p:txBody>
+      </p:sp>
+      <p:sp>
+        <p:nvSpPr>
+          <p:cNvPr id="12" name="Rectangle: Rounded Corners 11">
+            <a:extLst>
+              <a:ext uri="{FF2B5EF4-FFF2-40B4-BE49-F238E27FC236}">
+                <a16:creationId xmlns:a16="http://schemas.microsoft.com/office/drawing/2014/main" id="{F763D849-7CE0-49B6-8025-A44503BBD686}"/>
+              </a:ext>
+            </a:extLst>
+          </p:cNvPr>
+          <p:cNvSpPr/>
+          <p:nvPr/>
+        </p:nvSpPr>
+        <p:spPr>
+          <a:xfrm>
+            <a:off x="4641573" y="1001460"/>
+            <a:ext cx="1991139" cy="676910"/>
+          </a:xfrm>
+          <a:prstGeom prst="roundRect">
+            <a:avLst/>
+          </a:prstGeom>
+          <a:noFill/>
+          <a:ln w="19050">
+            <a:solidFill>
+              <a:schemeClr val="accent6">
+                <a:lumMod val="75000"/>
+              </a:schemeClr>
+            </a:solidFill>
+            <a:prstDash val="dash"/>
+          </a:ln>
+        </p:spPr>
+        <p:style>
+          <a:lnRef idx="2">
+            <a:schemeClr val="dk1"/>
+          </a:lnRef>
+          <a:fillRef idx="1">
+            <a:schemeClr val="lt1"/>
+          </a:fillRef>
+          <a:effectRef idx="0">
+            <a:schemeClr val="dk1"/>
+          </a:effectRef>
+          <a:fontRef idx="minor">
+            <a:schemeClr val="dk1"/>
+          </a:fontRef>
+        </p:style>
+        <p:txBody>
+          <a:bodyPr rtlCol="0" anchor="ctr"/>
+          <a:lstStyle/>
+          <a:p>
+            <a:pPr algn="ctr"/>
+            <a:endParaRPr lang="en-US" dirty="0">
+              <a:ln>
+                <a:solidFill>
+                  <a:srgbClr val="FF0000"/>
+                </a:solidFill>
+              </a:ln>
+              <a:solidFill>
+                <a:srgbClr val="00B050"/>
+              </a:solidFill>
+            </a:endParaRPr>
+          </a:p>
+        </p:txBody>
+      </p:sp>
+      <p:sp>
+        <p:nvSpPr>
+          <p:cNvPr id="13" name="TextBox 12">
+            <a:extLst>
+              <a:ext uri="{FF2B5EF4-FFF2-40B4-BE49-F238E27FC236}">
+                <a16:creationId xmlns:a16="http://schemas.microsoft.com/office/drawing/2014/main" id="{68E37A04-EEAF-41DD-9A13-668D51A9A560}"/>
+              </a:ext>
+            </a:extLst>
+          </p:cNvPr>
+          <p:cNvSpPr txBox="1"/>
+          <p:nvPr/>
+        </p:nvSpPr>
+        <p:spPr>
+          <a:xfrm>
+            <a:off x="4793891" y="1034098"/>
+            <a:ext cx="1756075" cy="338554"/>
+          </a:xfrm>
+          <a:prstGeom prst="rect">
+            <a:avLst/>
+          </a:prstGeom>
+          <a:noFill/>
+        </p:spPr>
+        <p:txBody>
+          <a:bodyPr wrap="square" rtlCol="0">
+            <a:spAutoFit/>
+          </a:bodyPr>
+          <a:lstStyle/>
+          <a:p>
+            <a:pPr algn="ctr"/>
+            <a:r>
+              <a:rPr lang="en-US" sz="1600" b="1" dirty="0">
+                <a:solidFill>
+                  <a:srgbClr val="FF0000"/>
+                </a:solidFill>
+              </a:rPr>
+              <a:t>&lt;Navigation&gt;</a:t>
+            </a:r>
+          </a:p>
+        </p:txBody>
+      </p:sp>
+      <p:cxnSp>
+        <p:nvCxnSpPr>
+          <p:cNvPr id="14" name="Straight Arrow Connector 13">
+            <a:extLst>
+              <a:ext uri="{FF2B5EF4-FFF2-40B4-BE49-F238E27FC236}">
+                <a16:creationId xmlns:a16="http://schemas.microsoft.com/office/drawing/2014/main" id="{A80A24D6-6827-4C99-9D91-A77D9F15952E}"/>
+              </a:ext>
+            </a:extLst>
+          </p:cNvPr>
+          <p:cNvCxnSpPr>
+            <a:cxnSpLocks/>
+            <a:stCxn id="12" idx="2"/>
+          </p:cNvCxnSpPr>
+          <p:nvPr/>
+        </p:nvCxnSpPr>
+        <p:spPr>
+          <a:xfrm>
+            <a:off x="5637143" y="1678370"/>
+            <a:ext cx="0" cy="750901"/>
+          </a:xfrm>
+          <a:prstGeom prst="straightConnector1">
+            <a:avLst/>
+          </a:prstGeom>
+          <a:ln w="12700">
+            <a:tailEnd type="triangle"/>
+          </a:ln>
+        </p:spPr>
+        <p:style>
+          <a:lnRef idx="1">
+            <a:schemeClr val="accent1"/>
+          </a:lnRef>
+          <a:fillRef idx="0">
+            <a:schemeClr val="accent1"/>
+          </a:fillRef>
+          <a:effectRef idx="0">
+            <a:schemeClr val="accent1"/>
+          </a:effectRef>
+          <a:fontRef idx="minor">
+            <a:schemeClr val="tx1"/>
+          </a:fontRef>
+        </p:style>
+      </p:cxnSp>
+      <p:cxnSp>
+        <p:nvCxnSpPr>
+          <p:cNvPr id="15" name="Straight Arrow Connector 14">
+            <a:extLst>
+              <a:ext uri="{FF2B5EF4-FFF2-40B4-BE49-F238E27FC236}">
+                <a16:creationId xmlns:a16="http://schemas.microsoft.com/office/drawing/2014/main" id="{0744309F-2F30-4AB3-BAE5-EBCE490866F8}"/>
+              </a:ext>
+            </a:extLst>
+          </p:cNvPr>
+          <p:cNvCxnSpPr>
+            <a:cxnSpLocks/>
+          </p:cNvCxnSpPr>
+          <p:nvPr/>
+        </p:nvCxnSpPr>
+        <p:spPr>
+          <a:xfrm>
+            <a:off x="2671320" y="3429000"/>
+            <a:ext cx="0" cy="662278"/>
+          </a:xfrm>
+          <a:prstGeom prst="straightConnector1">
+            <a:avLst/>
+          </a:prstGeom>
+          <a:ln w="12700">
+            <a:tailEnd type="triangle"/>
+          </a:ln>
+        </p:spPr>
+        <p:style>
+          <a:lnRef idx="1">
+            <a:schemeClr val="accent1"/>
+          </a:lnRef>
+          <a:fillRef idx="0">
+            <a:schemeClr val="accent1"/>
+          </a:fillRef>
+          <a:effectRef idx="0">
+            <a:schemeClr val="accent1"/>
+          </a:effectRef>
+          <a:fontRef idx="minor">
+            <a:schemeClr val="tx1"/>
+          </a:fontRef>
+        </p:style>
+      </p:cxnSp>
+      <p:cxnSp>
+        <p:nvCxnSpPr>
+          <p:cNvPr id="16" name="Straight Arrow Connector 15">
+            <a:extLst>
+              <a:ext uri="{FF2B5EF4-FFF2-40B4-BE49-F238E27FC236}">
+                <a16:creationId xmlns:a16="http://schemas.microsoft.com/office/drawing/2014/main" id="{AE9B1C9F-193C-46E5-ADA1-C15035571659}"/>
+              </a:ext>
+            </a:extLst>
+          </p:cNvPr>
+          <p:cNvCxnSpPr>
+            <a:cxnSpLocks/>
+          </p:cNvCxnSpPr>
+          <p:nvPr/>
+        </p:nvCxnSpPr>
+        <p:spPr>
+          <a:xfrm>
+            <a:off x="9090628" y="3429000"/>
+            <a:ext cx="0" cy="559904"/>
+          </a:xfrm>
+          <a:prstGeom prst="straightConnector1">
+            <a:avLst/>
+          </a:prstGeom>
+          <a:ln w="12700">
+            <a:tailEnd type="triangle"/>
+          </a:ln>
+        </p:spPr>
+        <p:style>
+          <a:lnRef idx="1">
+            <a:schemeClr val="accent1"/>
+          </a:lnRef>
+          <a:fillRef idx="0">
+            <a:schemeClr val="accent1"/>
+          </a:fillRef>
+          <a:effectRef idx="0">
+            <a:schemeClr val="accent1"/>
+          </a:effectRef>
+          <a:fontRef idx="minor">
+            <a:schemeClr val="tx1"/>
+          </a:fontRef>
+        </p:style>
+      </p:cxnSp>
+      <p:sp>
+        <p:nvSpPr>
+          <p:cNvPr id="17" name="TextBox 16">
+            <a:extLst>
+              <a:ext uri="{FF2B5EF4-FFF2-40B4-BE49-F238E27FC236}">
+                <a16:creationId xmlns:a16="http://schemas.microsoft.com/office/drawing/2014/main" id="{5F7F7A0E-3321-49FC-BC8C-E6951A5AA12E}"/>
+              </a:ext>
+            </a:extLst>
+          </p:cNvPr>
+          <p:cNvSpPr txBox="1"/>
+          <p:nvPr/>
+        </p:nvSpPr>
+        <p:spPr>
+          <a:xfrm>
+            <a:off x="2623929" y="3490580"/>
+            <a:ext cx="1344815" cy="338554"/>
+          </a:xfrm>
+          <a:prstGeom prst="rect">
+            <a:avLst/>
+          </a:prstGeom>
+          <a:noFill/>
+        </p:spPr>
+        <p:txBody>
+          <a:bodyPr wrap="square" rtlCol="0">
+            <a:spAutoFit/>
+          </a:bodyPr>
+          <a:lstStyle/>
+          <a:p>
+            <a:r>
+              <a:rPr lang="en-US" sz="1600" dirty="0"/>
+              <a:t>/my-event</a:t>
+            </a:r>
+          </a:p>
+        </p:txBody>
+      </p:sp>
+      <p:sp>
+        <p:nvSpPr>
+          <p:cNvPr id="18" name="TextBox 17">
+            <a:extLst>
+              <a:ext uri="{FF2B5EF4-FFF2-40B4-BE49-F238E27FC236}">
+                <a16:creationId xmlns:a16="http://schemas.microsoft.com/office/drawing/2014/main" id="{DADEE896-117B-46FD-BEE2-024F90D26F17}"/>
+              </a:ext>
+            </a:extLst>
+          </p:cNvPr>
+          <p:cNvSpPr txBox="1"/>
+          <p:nvPr/>
+        </p:nvSpPr>
+        <p:spPr>
+          <a:xfrm>
+            <a:off x="9022896" y="3429000"/>
+            <a:ext cx="995568" cy="338554"/>
+          </a:xfrm>
+          <a:prstGeom prst="rect">
+            <a:avLst/>
+          </a:prstGeom>
+          <a:noFill/>
+        </p:spPr>
+        <p:txBody>
+          <a:bodyPr wrap="square" rtlCol="0">
+            <a:spAutoFit/>
+          </a:bodyPr>
+          <a:lstStyle/>
+          <a:p>
+            <a:r>
+              <a:rPr lang="en-US" sz="1600" dirty="0"/>
+              <a:t>/category</a:t>
+            </a:r>
+          </a:p>
+        </p:txBody>
+      </p:sp>
+      <p:sp>
+        <p:nvSpPr>
+          <p:cNvPr id="19" name="Arrow: Right 18">
+            <a:extLst>
+              <a:ext uri="{FF2B5EF4-FFF2-40B4-BE49-F238E27FC236}">
+                <a16:creationId xmlns:a16="http://schemas.microsoft.com/office/drawing/2014/main" id="{0F5D82C2-2A8A-45EF-9022-59C46CB91208}"/>
+              </a:ext>
+            </a:extLst>
+          </p:cNvPr>
+          <p:cNvSpPr/>
+          <p:nvPr/>
+        </p:nvSpPr>
+        <p:spPr>
+          <a:xfrm>
+            <a:off x="2623929" y="1340215"/>
+            <a:ext cx="630475" cy="324613"/>
+          </a:xfrm>
+          <a:prstGeom prst="rightArrow">
+            <a:avLst/>
+          </a:prstGeom>
+          <a:solidFill>
+            <a:srgbClr val="FFFF00"/>
+          </a:solidFill>
         </p:spPr>
         <p:style>
           <a:lnRef idx="2">
@@ -3296,20 +3940,26 @@
           <a:lstStyle/>
           <a:p>
             <a:pPr algn="ctr"/>
-            <a:endParaRPr lang="en-US" sz="1372"/>
-          </a:p>
-        </p:txBody>
-      </p:sp>
-      <p:sp>
-        <p:nvSpPr>
-          <p:cNvPr id="6" name="TextBox 5"/>
+            <a:endParaRPr lang="en-US"/>
+          </a:p>
+        </p:txBody>
+      </p:sp>
+      <p:sp>
+        <p:nvSpPr>
+          <p:cNvPr id="20" name="TextBox 19">
+            <a:extLst>
+              <a:ext uri="{FF2B5EF4-FFF2-40B4-BE49-F238E27FC236}">
+                <a16:creationId xmlns:a16="http://schemas.microsoft.com/office/drawing/2014/main" id="{F2266A6E-C727-4224-A23C-B3B3F55B728B}"/>
+              </a:ext>
+            </a:extLst>
+          </p:cNvPr>
           <p:cNvSpPr txBox="1"/>
           <p:nvPr/>
         </p:nvSpPr>
         <p:spPr>
           <a:xfrm>
-            <a:off x="885053" y="892284"/>
-            <a:ext cx="926857" cy="303481"/>
+            <a:off x="2527428" y="1043066"/>
+            <a:ext cx="995568" cy="338554"/>
           </a:xfrm>
           <a:prstGeom prst="rect">
             <a:avLst/>
@@ -3317,29 +3967,40 @@
           <a:noFill/>
         </p:spPr>
         <p:txBody>
-          <a:bodyPr wrap="none" rtlCol="0">
+          <a:bodyPr wrap="square" rtlCol="0">
             <a:spAutoFit/>
           </a:bodyPr>
           <a:lstStyle/>
           <a:p>
             <a:r>
-              <a:rPr lang="en-US" sz="1372" dirty="0" smtClean="0"/>
-              <a:t>Students[]</a:t>
-            </a:r>
-            <a:endParaRPr lang="en-US" sz="1372" dirty="0"/>
-          </a:p>
-        </p:txBody>
-      </p:sp>
-      <p:sp>
-        <p:nvSpPr>
-          <p:cNvPr id="7" name="TextBox 6"/>
+              <a:rPr lang="en-US" sz="1600" b="1" dirty="0">
+                <a:solidFill>
+                  <a:schemeClr val="accent4">
+                    <a:lumMod val="75000"/>
+                  </a:schemeClr>
+                </a:solidFill>
+              </a:rPr>
+              <a:t>PROVIDE</a:t>
+            </a:r>
+          </a:p>
+        </p:txBody>
+      </p:sp>
+      <p:sp>
+        <p:nvSpPr>
+          <p:cNvPr id="21" name="TextBox 20">
+            <a:extLst>
+              <a:ext uri="{FF2B5EF4-FFF2-40B4-BE49-F238E27FC236}">
+                <a16:creationId xmlns:a16="http://schemas.microsoft.com/office/drawing/2014/main" id="{251941B5-48C2-4952-912B-F6B0570D972E}"/>
+              </a:ext>
+            </a:extLst>
+          </p:cNvPr>
           <p:cNvSpPr txBox="1"/>
           <p:nvPr/>
         </p:nvSpPr>
         <p:spPr>
           <a:xfrm>
-            <a:off x="119555" y="1627265"/>
-            <a:ext cx="3384709" cy="303481"/>
+            <a:off x="2527428" y="1623423"/>
+            <a:ext cx="2114144" cy="584775"/>
           </a:xfrm>
           <a:prstGeom prst="rect">
             <a:avLst/>
@@ -3347,73 +4008,47 @@
           <a:noFill/>
         </p:spPr>
         <p:txBody>
-          <a:bodyPr wrap="none" rtlCol="0">
+          <a:bodyPr wrap="square" rtlCol="0">
             <a:spAutoFit/>
           </a:bodyPr>
           <a:lstStyle/>
           <a:p>
             <a:r>
-              <a:rPr lang="en-US" sz="1372" dirty="0" smtClean="0"/>
-              <a:t>// A component with a list of student as data</a:t>
-            </a:r>
-            <a:endParaRPr lang="en-US" sz="1372" dirty="0"/>
-          </a:p>
-        </p:txBody>
-      </p:sp>
-      <p:sp>
-        <p:nvSpPr>
-          <p:cNvPr id="8" name="TextBox 7"/>
-          <p:cNvSpPr txBox="1"/>
-          <p:nvPr/>
-        </p:nvSpPr>
-        <p:spPr>
-          <a:xfrm>
-            <a:off x="1009380" y="2556074"/>
-            <a:ext cx="639919" cy="303481"/>
-          </a:xfrm>
-          <a:prstGeom prst="rect">
-            <a:avLst/>
-          </a:prstGeom>
-          <a:noFill/>
-        </p:spPr>
-        <p:txBody>
-          <a:bodyPr wrap="none" rtlCol="0">
-            <a:spAutoFit/>
-          </a:bodyPr>
-          <a:lstStyle/>
-          <a:p>
-            <a:r>
-              <a:rPr lang="en-US" sz="1372" b="1" i="1" dirty="0">
-                <a:solidFill>
-                  <a:srgbClr val="FF0000"/>
-                </a:solidFill>
-              </a:rPr>
-              <a:t>&lt;app&gt;</a:t>
-            </a:r>
-          </a:p>
-        </p:txBody>
-      </p:sp>
-      <p:sp>
-        <p:nvSpPr>
-          <p:cNvPr id="9" name="Rounded Rectangle 8"/>
+              <a:rPr lang="en-US" sz="1600" dirty="0"/>
+              <a:t>my-event-info</a:t>
+            </a:r>
+          </a:p>
+          <a:p>
+            <a:r>
+              <a:rPr lang="en-US" sz="1600" dirty="0"/>
+              <a:t>category-info</a:t>
+            </a:r>
+          </a:p>
+        </p:txBody>
+      </p:sp>
+      <p:sp>
+        <p:nvSpPr>
+          <p:cNvPr id="22" name="Arrow: Right 21">
+            <a:extLst>
+              <a:ext uri="{FF2B5EF4-FFF2-40B4-BE49-F238E27FC236}">
+                <a16:creationId xmlns:a16="http://schemas.microsoft.com/office/drawing/2014/main" id="{25513C9C-A932-49FA-85D1-0FC6461D9801}"/>
+              </a:ext>
+            </a:extLst>
+          </p:cNvPr>
           <p:cNvSpPr/>
           <p:nvPr/>
         </p:nvSpPr>
         <p:spPr>
           <a:xfrm>
-            <a:off x="523323" y="2385493"/>
-            <a:ext cx="1650319" cy="1166483"/>
-          </a:xfrm>
-          <a:prstGeom prst="roundRect">
-            <a:avLst/>
-          </a:prstGeom>
-          <a:noFill/>
-          <a:ln>
-            <a:solidFill>
-              <a:srgbClr val="FF0000"/>
-            </a:solidFill>
-            <a:prstDash val="lgDash"/>
-          </a:ln>
+            <a:off x="7450043" y="4238015"/>
+            <a:ext cx="630475" cy="324613"/>
+          </a:xfrm>
+          <a:prstGeom prst="rightArrow">
+            <a:avLst/>
+          </a:prstGeom>
+          <a:solidFill>
+            <a:srgbClr val="FFFF00"/>
+          </a:solidFill>
         </p:spPr>
         <p:style>
           <a:lnRef idx="2">
@@ -3436,20 +4071,26 @@
           <a:lstStyle/>
           <a:p>
             <a:pPr algn="ctr"/>
-            <a:endParaRPr lang="en-US" sz="1372"/>
-          </a:p>
-        </p:txBody>
-      </p:sp>
-      <p:sp>
-        <p:nvSpPr>
-          <p:cNvPr id="10" name="TextBox 9"/>
+            <a:endParaRPr lang="en-US"/>
+          </a:p>
+        </p:txBody>
+      </p:sp>
+      <p:sp>
+        <p:nvSpPr>
+          <p:cNvPr id="23" name="TextBox 22">
+            <a:extLst>
+              <a:ext uri="{FF2B5EF4-FFF2-40B4-BE49-F238E27FC236}">
+                <a16:creationId xmlns:a16="http://schemas.microsoft.com/office/drawing/2014/main" id="{F55DE77F-13EC-44BD-AD8E-1DF008202D92}"/>
+              </a:ext>
+            </a:extLst>
+          </p:cNvPr>
           <p:cNvSpPr txBox="1"/>
           <p:nvPr/>
         </p:nvSpPr>
         <p:spPr>
           <a:xfrm>
-            <a:off x="885053" y="2968734"/>
-            <a:ext cx="926857" cy="303481"/>
+            <a:off x="7416932" y="3989899"/>
+            <a:ext cx="802733" cy="338554"/>
           </a:xfrm>
           <a:prstGeom prst="rect">
             <a:avLst/>
@@ -3457,29 +4098,40 @@
           <a:noFill/>
         </p:spPr>
         <p:txBody>
-          <a:bodyPr wrap="none" rtlCol="0">
+          <a:bodyPr wrap="square" rtlCol="0">
             <a:spAutoFit/>
           </a:bodyPr>
           <a:lstStyle/>
           <a:p>
             <a:r>
-              <a:rPr lang="en-US" sz="1372" dirty="0" smtClean="0"/>
-              <a:t>Students[]</a:t>
-            </a:r>
-            <a:endParaRPr lang="en-US" sz="1372" dirty="0"/>
-          </a:p>
-        </p:txBody>
-      </p:sp>
-      <p:sp>
-        <p:nvSpPr>
-          <p:cNvPr id="11" name="TextBox 10"/>
+              <a:rPr lang="en-US" sz="1600" b="1" dirty="0">
+                <a:solidFill>
+                  <a:schemeClr val="accent4">
+                    <a:lumMod val="75000"/>
+                  </a:schemeClr>
+                </a:solidFill>
+              </a:rPr>
+              <a:t>INJECT</a:t>
+            </a:r>
+          </a:p>
+        </p:txBody>
+      </p:sp>
+      <p:sp>
+        <p:nvSpPr>
+          <p:cNvPr id="24" name="TextBox 23">
+            <a:extLst>
+              <a:ext uri="{FF2B5EF4-FFF2-40B4-BE49-F238E27FC236}">
+                <a16:creationId xmlns:a16="http://schemas.microsoft.com/office/drawing/2014/main" id="{4FAEC3FA-4AC2-45E9-8E91-97A542BC29B5}"/>
+              </a:ext>
+            </a:extLst>
+          </p:cNvPr>
           <p:cNvSpPr txBox="1"/>
           <p:nvPr/>
         </p:nvSpPr>
         <p:spPr>
           <a:xfrm>
-            <a:off x="464251" y="3703715"/>
-            <a:ext cx="2183996" cy="303481"/>
+            <a:off x="7057269" y="4498523"/>
+            <a:ext cx="1301543" cy="338554"/>
           </a:xfrm>
           <a:prstGeom prst="rect">
             <a:avLst/>
@@ -3487,53 +4139,211 @@
           <a:noFill/>
         </p:spPr>
         <p:txBody>
-          <a:bodyPr wrap="none" rtlCol="0">
+          <a:bodyPr wrap="square" rtlCol="0">
             <a:spAutoFit/>
           </a:bodyPr>
           <a:lstStyle/>
           <a:p>
             <a:r>
-              <a:rPr lang="en-US" sz="1372" dirty="0" smtClean="0"/>
-              <a:t>// </a:t>
-            </a:r>
-            <a:r>
-              <a:rPr lang="en-US" sz="1372" dirty="0" smtClean="0">
+              <a:rPr lang="en-US" sz="1600" dirty="0"/>
+              <a:t>category-info</a:t>
+            </a:r>
+          </a:p>
+        </p:txBody>
+      </p:sp>
+      <p:cxnSp>
+        <p:nvCxnSpPr>
+          <p:cNvPr id="25" name="Straight Arrow Connector 24">
+            <a:extLst>
+              <a:ext uri="{FF2B5EF4-FFF2-40B4-BE49-F238E27FC236}">
+                <a16:creationId xmlns:a16="http://schemas.microsoft.com/office/drawing/2014/main" id="{D7F03172-CE48-4D87-9C53-3BBAF63D3C9A}"/>
+              </a:ext>
+            </a:extLst>
+          </p:cNvPr>
+          <p:cNvCxnSpPr>
+            <a:cxnSpLocks/>
+          </p:cNvCxnSpPr>
+          <p:nvPr/>
+        </p:nvCxnSpPr>
+        <p:spPr>
+          <a:xfrm>
+            <a:off x="5829298" y="3490580"/>
+            <a:ext cx="0" cy="498324"/>
+          </a:xfrm>
+          <a:prstGeom prst="straightConnector1">
+            <a:avLst/>
+          </a:prstGeom>
+          <a:ln w="12700">
+            <a:tailEnd type="triangle"/>
+          </a:ln>
+        </p:spPr>
+        <p:style>
+          <a:lnRef idx="1">
+            <a:schemeClr val="accent1"/>
+          </a:lnRef>
+          <a:fillRef idx="0">
+            <a:schemeClr val="accent1"/>
+          </a:fillRef>
+          <a:effectRef idx="0">
+            <a:schemeClr val="accent1"/>
+          </a:effectRef>
+          <a:fontRef idx="minor">
+            <a:schemeClr val="tx1"/>
+          </a:fontRef>
+        </p:style>
+      </p:cxnSp>
+      <p:sp>
+        <p:nvSpPr>
+          <p:cNvPr id="26" name="TextBox 25">
+            <a:extLst>
+              <a:ext uri="{FF2B5EF4-FFF2-40B4-BE49-F238E27FC236}">
+                <a16:creationId xmlns:a16="http://schemas.microsoft.com/office/drawing/2014/main" id="{95CC66C4-2EAD-4D0E-A94F-9F37CF9C6CA1}"/>
+              </a:ext>
+            </a:extLst>
+          </p:cNvPr>
+          <p:cNvSpPr txBox="1"/>
+          <p:nvPr/>
+        </p:nvSpPr>
+        <p:spPr>
+          <a:xfrm>
+            <a:off x="5833582" y="3478737"/>
+            <a:ext cx="1344815" cy="338554"/>
+          </a:xfrm>
+          <a:prstGeom prst="rect">
+            <a:avLst/>
+          </a:prstGeom>
+          <a:noFill/>
+        </p:spPr>
+        <p:txBody>
+          <a:bodyPr wrap="square" rtlCol="0">
+            <a:spAutoFit/>
+          </a:bodyPr>
+          <a:lstStyle/>
+          <a:p>
+            <a:r>
+              <a:rPr lang="en-US" sz="1600" dirty="0"/>
+              <a:t>/event</a:t>
+            </a:r>
+          </a:p>
+        </p:txBody>
+      </p:sp>
+      <p:sp>
+        <p:nvSpPr>
+          <p:cNvPr id="27" name="Rectangle: Rounded Corners 26">
+            <a:extLst>
+              <a:ext uri="{FF2B5EF4-FFF2-40B4-BE49-F238E27FC236}">
+                <a16:creationId xmlns:a16="http://schemas.microsoft.com/office/drawing/2014/main" id="{2C05C123-39B9-4985-9117-441BADD134B8}"/>
+              </a:ext>
+            </a:extLst>
+          </p:cNvPr>
+          <p:cNvSpPr/>
+          <p:nvPr/>
+        </p:nvSpPr>
+        <p:spPr>
+          <a:xfrm>
+            <a:off x="5008511" y="4003470"/>
+            <a:ext cx="1991139" cy="833607"/>
+          </a:xfrm>
+          <a:prstGeom prst="roundRect">
+            <a:avLst/>
+          </a:prstGeom>
+          <a:noFill/>
+          <a:ln w="19050">
+            <a:solidFill>
+              <a:schemeClr val="accent6">
+                <a:lumMod val="75000"/>
+              </a:schemeClr>
+            </a:solidFill>
+            <a:prstDash val="dash"/>
+          </a:ln>
+        </p:spPr>
+        <p:style>
+          <a:lnRef idx="2">
+            <a:schemeClr val="dk1"/>
+          </a:lnRef>
+          <a:fillRef idx="1">
+            <a:schemeClr val="lt1"/>
+          </a:fillRef>
+          <a:effectRef idx="0">
+            <a:schemeClr val="dk1"/>
+          </a:effectRef>
+          <a:fontRef idx="minor">
+            <a:schemeClr val="dk1"/>
+          </a:fontRef>
+        </p:style>
+        <p:txBody>
+          <a:bodyPr rtlCol="0" anchor="ctr"/>
+          <a:lstStyle/>
+          <a:p>
+            <a:pPr algn="ctr"/>
+            <a:endParaRPr lang="en-US" dirty="0">
+              <a:ln>
+                <a:solidFill>
+                  <a:srgbClr val="FF0000"/>
+                </a:solidFill>
+              </a:ln>
+              <a:solidFill>
+                <a:srgbClr val="00B050"/>
+              </a:solidFill>
+            </a:endParaRPr>
+          </a:p>
+        </p:txBody>
+      </p:sp>
+      <p:sp>
+        <p:nvSpPr>
+          <p:cNvPr id="28" name="TextBox 27">
+            <a:extLst>
+              <a:ext uri="{FF2B5EF4-FFF2-40B4-BE49-F238E27FC236}">
+                <a16:creationId xmlns:a16="http://schemas.microsoft.com/office/drawing/2014/main" id="{0A130B2E-F501-4EDF-8D2F-4BABA7DA1813}"/>
+              </a:ext>
+            </a:extLst>
+          </p:cNvPr>
+          <p:cNvSpPr txBox="1"/>
+          <p:nvPr/>
+        </p:nvSpPr>
+        <p:spPr>
+          <a:xfrm>
+            <a:off x="5059703" y="4091278"/>
+            <a:ext cx="1817366" cy="338554"/>
+          </a:xfrm>
+          <a:prstGeom prst="rect">
+            <a:avLst/>
+          </a:prstGeom>
+          <a:noFill/>
+        </p:spPr>
+        <p:txBody>
+          <a:bodyPr wrap="square" rtlCol="0">
+            <a:spAutoFit/>
+          </a:bodyPr>
+          <a:lstStyle/>
+          <a:p>
+            <a:r>
+              <a:rPr lang="en-US" sz="1600" b="1" dirty="0">
                 <a:solidFill>
                   <a:srgbClr val="FF0000"/>
                 </a:solidFill>
               </a:rPr>
-              <a:t>app</a:t>
-            </a:r>
-            <a:r>
-              <a:rPr lang="en-US" sz="1372" dirty="0" smtClean="0"/>
-              <a:t> send student to </a:t>
-            </a:r>
-            <a:r>
-              <a:rPr lang="en-US" sz="1372" dirty="0" smtClean="0">
-                <a:solidFill>
-                  <a:srgbClr val="FF0000"/>
-                </a:solidFill>
-              </a:rPr>
-              <a:t>card </a:t>
-            </a:r>
-            <a:endParaRPr lang="en-US" sz="1372" dirty="0">
-              <a:solidFill>
-                <a:srgbClr val="FF0000"/>
-              </a:solidFill>
-            </a:endParaRPr>
-          </a:p>
-        </p:txBody>
-      </p:sp>
-      <p:sp>
-        <p:nvSpPr>
-          <p:cNvPr id="12" name="TextBox 11"/>
+              <a:t>&lt;event-view&gt;</a:t>
+            </a:r>
+          </a:p>
+        </p:txBody>
+      </p:sp>
+      <p:sp>
+        <p:nvSpPr>
+          <p:cNvPr id="29" name="TextBox 28">
+            <a:extLst>
+              <a:ext uri="{FF2B5EF4-FFF2-40B4-BE49-F238E27FC236}">
+                <a16:creationId xmlns:a16="http://schemas.microsoft.com/office/drawing/2014/main" id="{FE20A30A-72EC-4DA3-A234-C920D511C68A}"/>
+              </a:ext>
+            </a:extLst>
+          </p:cNvPr>
           <p:cNvSpPr txBox="1"/>
           <p:nvPr/>
         </p:nvSpPr>
         <p:spPr>
           <a:xfrm>
-            <a:off x="1009380" y="4803105"/>
-            <a:ext cx="848309" cy="303481"/>
+            <a:off x="3753401" y="4513984"/>
+            <a:ext cx="1412833" cy="338554"/>
           </a:xfrm>
           <a:prstGeom prst="rect">
             <a:avLst/>
@@ -3541,48 +4351,41 @@
           <a:noFill/>
         </p:spPr>
         <p:txBody>
-          <a:bodyPr wrap="none" rtlCol="0">
+          <a:bodyPr wrap="square" rtlCol="0">
             <a:spAutoFit/>
           </a:bodyPr>
           <a:lstStyle/>
           <a:p>
             <a:r>
-              <a:rPr lang="en-US" sz="1372" b="1" i="1" dirty="0" smtClean="0">
-                <a:solidFill>
-                  <a:srgbClr val="FF0000"/>
-                </a:solidFill>
-              </a:rPr>
-              <a:t>&lt;parent&gt;</a:t>
-            </a:r>
-            <a:endParaRPr lang="en-US" sz="1372" b="1" i="1" dirty="0">
-              <a:solidFill>
-                <a:srgbClr val="FF0000"/>
-              </a:solidFill>
-            </a:endParaRPr>
-          </a:p>
-        </p:txBody>
-      </p:sp>
-      <p:sp>
-        <p:nvSpPr>
-          <p:cNvPr id="13" name="Rounded Rectangle 12"/>
+              <a:rPr lang="en-US" sz="1600" dirty="0"/>
+              <a:t>my-event-info</a:t>
+            </a:r>
+          </a:p>
+        </p:txBody>
+      </p:sp>
+      <p:sp>
+        <p:nvSpPr>
+          <p:cNvPr id="30" name="Arrow: Right 29">
+            <a:extLst>
+              <a:ext uri="{FF2B5EF4-FFF2-40B4-BE49-F238E27FC236}">
+                <a16:creationId xmlns:a16="http://schemas.microsoft.com/office/drawing/2014/main" id="{FAB6D45E-D882-4BB8-909A-532092820E9E}"/>
+              </a:ext>
+            </a:extLst>
+          </p:cNvPr>
           <p:cNvSpPr/>
           <p:nvPr/>
         </p:nvSpPr>
         <p:spPr>
           <a:xfrm>
-            <a:off x="523323" y="4632524"/>
-            <a:ext cx="1650319" cy="1166483"/>
-          </a:xfrm>
-          <a:prstGeom prst="roundRect">
-            <a:avLst/>
-          </a:prstGeom>
-          <a:noFill/>
-          <a:ln>
-            <a:solidFill>
-              <a:srgbClr val="FF0000"/>
-            </a:solidFill>
-            <a:prstDash val="lgDash"/>
-          </a:ln>
+            <a:off x="4181270" y="4251586"/>
+            <a:ext cx="630475" cy="324613"/>
+          </a:xfrm>
+          <a:prstGeom prst="rightArrow">
+            <a:avLst/>
+          </a:prstGeom>
+          <a:solidFill>
+            <a:srgbClr val="FFFF00"/>
+          </a:solidFill>
         </p:spPr>
         <p:style>
           <a:lnRef idx="2">
@@ -3605,20 +4408,26 @@
           <a:lstStyle/>
           <a:p>
             <a:pPr algn="ctr"/>
-            <a:endParaRPr lang="en-US" sz="1372"/>
-          </a:p>
-        </p:txBody>
-      </p:sp>
-      <p:sp>
-        <p:nvSpPr>
-          <p:cNvPr id="14" name="TextBox 13"/>
+            <a:endParaRPr lang="en-US"/>
+          </a:p>
+        </p:txBody>
+      </p:sp>
+      <p:sp>
+        <p:nvSpPr>
+          <p:cNvPr id="31" name="TextBox 30">
+            <a:extLst>
+              <a:ext uri="{FF2B5EF4-FFF2-40B4-BE49-F238E27FC236}">
+                <a16:creationId xmlns:a16="http://schemas.microsoft.com/office/drawing/2014/main" id="{F3AE494E-E56C-47D3-B072-EB90BCC73D52}"/>
+              </a:ext>
+            </a:extLst>
+          </p:cNvPr>
           <p:cNvSpPr txBox="1"/>
           <p:nvPr/>
         </p:nvSpPr>
         <p:spPr>
           <a:xfrm>
-            <a:off x="885053" y="5215765"/>
-            <a:ext cx="926857" cy="303481"/>
+            <a:off x="4148159" y="4003470"/>
+            <a:ext cx="802733" cy="338554"/>
           </a:xfrm>
           <a:prstGeom prst="rect">
             <a:avLst/>
@@ -3626,29 +4435,40 @@
           <a:noFill/>
         </p:spPr>
         <p:txBody>
-          <a:bodyPr wrap="none" rtlCol="0">
+          <a:bodyPr wrap="square" rtlCol="0">
             <a:spAutoFit/>
           </a:bodyPr>
           <a:lstStyle/>
           <a:p>
             <a:r>
-              <a:rPr lang="en-US" sz="1372" dirty="0" smtClean="0"/>
-              <a:t>Students[]</a:t>
-            </a:r>
-            <a:endParaRPr lang="en-US" sz="1372" dirty="0"/>
-          </a:p>
-        </p:txBody>
-      </p:sp>
-      <p:sp>
-        <p:nvSpPr>
-          <p:cNvPr id="15" name="TextBox 14"/>
+              <a:rPr lang="en-US" sz="1600" b="1" dirty="0">
+                <a:solidFill>
+                  <a:schemeClr val="accent4">
+                    <a:lumMod val="75000"/>
+                  </a:schemeClr>
+                </a:solidFill>
+              </a:rPr>
+              <a:t>INJECT</a:t>
+            </a:r>
+          </a:p>
+        </p:txBody>
+      </p:sp>
+      <p:sp>
+        <p:nvSpPr>
+          <p:cNvPr id="32" name="TextBox 31">
+            <a:extLst>
+              <a:ext uri="{FF2B5EF4-FFF2-40B4-BE49-F238E27FC236}">
+                <a16:creationId xmlns:a16="http://schemas.microsoft.com/office/drawing/2014/main" id="{A9548B9C-074E-491B-A77D-C75303DE4A62}"/>
+              </a:ext>
+            </a:extLst>
+          </p:cNvPr>
           <p:cNvSpPr txBox="1"/>
           <p:nvPr/>
         </p:nvSpPr>
         <p:spPr>
           <a:xfrm>
-            <a:off x="394083" y="6064417"/>
-            <a:ext cx="3216522" cy="303481"/>
+            <a:off x="5607069" y="1678370"/>
+            <a:ext cx="1412833" cy="338554"/>
           </a:xfrm>
           <a:prstGeom prst="rect">
             <a:avLst/>
@@ -3656,38 +4476,277 @@
           <a:noFill/>
         </p:spPr>
         <p:txBody>
-          <a:bodyPr wrap="none" rtlCol="0">
+          <a:bodyPr wrap="square" rtlCol="0">
             <a:spAutoFit/>
           </a:bodyPr>
           <a:lstStyle/>
           <a:p>
             <a:r>
-              <a:rPr lang="en-US" sz="1372" dirty="0" smtClean="0"/>
-              <a:t>// </a:t>
-            </a:r>
-            <a:r>
-              <a:rPr lang="en-US" sz="1372" dirty="0" smtClean="0">
+              <a:rPr lang="en-US" sz="1600" dirty="0"/>
+              <a:t>Change path</a:t>
+            </a:r>
+          </a:p>
+        </p:txBody>
+      </p:sp>
+      <p:sp>
+        <p:nvSpPr>
+          <p:cNvPr id="33" name="Rectangle: Rounded Corners 32">
+            <a:extLst>
+              <a:ext uri="{FF2B5EF4-FFF2-40B4-BE49-F238E27FC236}">
+                <a16:creationId xmlns:a16="http://schemas.microsoft.com/office/drawing/2014/main" id="{E22161B5-5530-4A40-951E-15CDBCC7460B}"/>
+              </a:ext>
+            </a:extLst>
+          </p:cNvPr>
+          <p:cNvSpPr/>
+          <p:nvPr/>
+        </p:nvSpPr>
+        <p:spPr>
+          <a:xfrm>
+            <a:off x="1603512" y="5557849"/>
+            <a:ext cx="1991139" cy="764916"/>
+          </a:xfrm>
+          <a:prstGeom prst="roundRect">
+            <a:avLst/>
+          </a:prstGeom>
+          <a:noFill/>
+          <a:ln w="19050">
+            <a:solidFill>
+              <a:schemeClr val="accent6">
+                <a:lumMod val="75000"/>
+              </a:schemeClr>
+            </a:solidFill>
+            <a:prstDash val="dash"/>
+          </a:ln>
+        </p:spPr>
+        <p:style>
+          <a:lnRef idx="2">
+            <a:schemeClr val="dk1"/>
+          </a:lnRef>
+          <a:fillRef idx="1">
+            <a:schemeClr val="lt1"/>
+          </a:fillRef>
+          <a:effectRef idx="0">
+            <a:schemeClr val="dk1"/>
+          </a:effectRef>
+          <a:fontRef idx="minor">
+            <a:schemeClr val="dk1"/>
+          </a:fontRef>
+        </p:style>
+        <p:txBody>
+          <a:bodyPr rtlCol="0" anchor="ctr"/>
+          <a:lstStyle/>
+          <a:p>
+            <a:pPr algn="ctr"/>
+            <a:endParaRPr lang="en-US" dirty="0">
+              <a:ln>
+                <a:solidFill>
+                  <a:srgbClr val="FF0000"/>
+                </a:solidFill>
+              </a:ln>
+              <a:solidFill>
+                <a:srgbClr val="00B050"/>
+              </a:solidFill>
+            </a:endParaRPr>
+          </a:p>
+        </p:txBody>
+      </p:sp>
+      <p:sp>
+        <p:nvSpPr>
+          <p:cNvPr id="34" name="TextBox 33">
+            <a:extLst>
+              <a:ext uri="{FF2B5EF4-FFF2-40B4-BE49-F238E27FC236}">
+                <a16:creationId xmlns:a16="http://schemas.microsoft.com/office/drawing/2014/main" id="{A009090E-6408-4768-8683-85A75ACBD9DD}"/>
+              </a:ext>
+            </a:extLst>
+          </p:cNvPr>
+          <p:cNvSpPr txBox="1"/>
+          <p:nvPr/>
+        </p:nvSpPr>
+        <p:spPr>
+          <a:xfrm>
+            <a:off x="1603512" y="5645657"/>
+            <a:ext cx="1868557" cy="338554"/>
+          </a:xfrm>
+          <a:prstGeom prst="rect">
+            <a:avLst/>
+          </a:prstGeom>
+          <a:noFill/>
+        </p:spPr>
+        <p:txBody>
+          <a:bodyPr wrap="square" rtlCol="0">
+            <a:spAutoFit/>
+          </a:bodyPr>
+          <a:lstStyle/>
+          <a:p>
+            <a:r>
+              <a:rPr lang="en-US" sz="1600" b="1" dirty="0">
                 <a:solidFill>
                   <a:srgbClr val="FF0000"/>
                 </a:solidFill>
               </a:rPr>
-              <a:t>from</a:t>
-            </a:r>
-            <a:r>
-              <a:rPr lang="en-US" sz="1372" dirty="0" smtClean="0"/>
-              <a:t> send the event validated to </a:t>
-            </a:r>
-            <a:r>
-              <a:rPr lang="en-US" sz="1372" dirty="0" smtClean="0">
+              <a:t>&lt;my-event-card&gt;</a:t>
+            </a:r>
+          </a:p>
+        </p:txBody>
+      </p:sp>
+      <p:sp>
+        <p:nvSpPr>
+          <p:cNvPr id="35" name="Rectangle: Rounded Corners 34">
+            <a:extLst>
+              <a:ext uri="{FF2B5EF4-FFF2-40B4-BE49-F238E27FC236}">
+                <a16:creationId xmlns:a16="http://schemas.microsoft.com/office/drawing/2014/main" id="{8A909367-1E57-4289-A2F5-AFF9438F792E}"/>
+              </a:ext>
+            </a:extLst>
+          </p:cNvPr>
+          <p:cNvSpPr/>
+          <p:nvPr/>
+        </p:nvSpPr>
+        <p:spPr>
+          <a:xfrm>
+            <a:off x="4970135" y="5531360"/>
+            <a:ext cx="1991139" cy="764916"/>
+          </a:xfrm>
+          <a:prstGeom prst="roundRect">
+            <a:avLst/>
+          </a:prstGeom>
+          <a:noFill/>
+          <a:ln w="19050">
+            <a:solidFill>
+              <a:schemeClr val="accent6">
+                <a:lumMod val="75000"/>
+              </a:schemeClr>
+            </a:solidFill>
+            <a:prstDash val="dash"/>
+          </a:ln>
+        </p:spPr>
+        <p:style>
+          <a:lnRef idx="2">
+            <a:schemeClr val="dk1"/>
+          </a:lnRef>
+          <a:fillRef idx="1">
+            <a:schemeClr val="lt1"/>
+          </a:fillRef>
+          <a:effectRef idx="0">
+            <a:schemeClr val="dk1"/>
+          </a:effectRef>
+          <a:fontRef idx="minor">
+            <a:schemeClr val="dk1"/>
+          </a:fontRef>
+        </p:style>
+        <p:txBody>
+          <a:bodyPr rtlCol="0" anchor="ctr"/>
+          <a:lstStyle/>
+          <a:p>
+            <a:pPr algn="ctr"/>
+            <a:endParaRPr lang="en-US" dirty="0">
+              <a:ln>
+                <a:solidFill>
+                  <a:srgbClr val="FF0000"/>
+                </a:solidFill>
+              </a:ln>
+              <a:solidFill>
+                <a:srgbClr val="00B050"/>
+              </a:solidFill>
+            </a:endParaRPr>
+          </a:p>
+        </p:txBody>
+      </p:sp>
+      <p:sp>
+        <p:nvSpPr>
+          <p:cNvPr id="36" name="TextBox 35">
+            <a:extLst>
+              <a:ext uri="{FF2B5EF4-FFF2-40B4-BE49-F238E27FC236}">
+                <a16:creationId xmlns:a16="http://schemas.microsoft.com/office/drawing/2014/main" id="{D715F134-7185-48E7-9F95-C6F93D10CD06}"/>
+              </a:ext>
+            </a:extLst>
+          </p:cNvPr>
+          <p:cNvSpPr txBox="1"/>
+          <p:nvPr/>
+        </p:nvSpPr>
+        <p:spPr>
+          <a:xfrm>
+            <a:off x="4970135" y="5619168"/>
+            <a:ext cx="1868557" cy="338554"/>
+          </a:xfrm>
+          <a:prstGeom prst="rect">
+            <a:avLst/>
+          </a:prstGeom>
+          <a:noFill/>
+        </p:spPr>
+        <p:txBody>
+          <a:bodyPr wrap="square" rtlCol="0">
+            <a:spAutoFit/>
+          </a:bodyPr>
+          <a:lstStyle/>
+          <a:p>
+            <a:r>
+              <a:rPr lang="en-US" sz="1600" b="1" dirty="0">
                 <a:solidFill>
                   <a:srgbClr val="FF0000"/>
                 </a:solidFill>
               </a:rPr>
-              <a:t>parent</a:t>
-            </a:r>
-            <a:endParaRPr lang="en-US" sz="1372" dirty="0">
+              <a:t>&lt;event-card&gt;</a:t>
+            </a:r>
+          </a:p>
+        </p:txBody>
+      </p:sp>
+      <p:sp>
+        <p:nvSpPr>
+          <p:cNvPr id="37" name="Rectangle: Rounded Corners 36">
+            <a:extLst>
+              <a:ext uri="{FF2B5EF4-FFF2-40B4-BE49-F238E27FC236}">
+                <a16:creationId xmlns:a16="http://schemas.microsoft.com/office/drawing/2014/main" id="{26628DCB-9F64-4949-AD49-FA00BC3AB05E}"/>
+              </a:ext>
+            </a:extLst>
+          </p:cNvPr>
+          <p:cNvSpPr/>
+          <p:nvPr/>
+        </p:nvSpPr>
+        <p:spPr>
+          <a:xfrm>
+            <a:off x="8055304" y="5494606"/>
+            <a:ext cx="1991139" cy="764916"/>
+          </a:xfrm>
+          <a:prstGeom prst="roundRect">
+            <a:avLst/>
+          </a:prstGeom>
+          <a:noFill/>
+          <a:ln w="19050">
+            <a:solidFill>
+              <a:schemeClr val="accent6">
+                <a:lumMod val="75000"/>
+              </a:schemeClr>
+            </a:solidFill>
+            <a:prstDash val="dash"/>
+          </a:ln>
+        </p:spPr>
+        <p:style>
+          <a:lnRef idx="2">
+            <a:schemeClr val="dk1"/>
+          </a:lnRef>
+          <a:fillRef idx="1">
+            <a:schemeClr val="lt1"/>
+          </a:fillRef>
+          <a:effectRef idx="0">
+            <a:schemeClr val="dk1"/>
+          </a:effectRef>
+          <a:fontRef idx="minor">
+            <a:schemeClr val="dk1"/>
+          </a:fontRef>
+        </p:style>
+        <p:txBody>
+          <a:bodyPr rtlCol="0" anchor="ctr"/>
+          <a:lstStyle/>
+          <a:p>
+            <a:pPr algn="ctr"/>
+            <a:endParaRPr lang="en-US" dirty="0">
+              <a:ln>
+                <a:solidFill>
+                  <a:srgbClr val="FF0000"/>
+                </a:solidFill>
+              </a:ln>
               <a:solidFill>
-                <a:srgbClr val="FF0000"/>
+                <a:srgbClr val="00B050"/>
               </a:solidFill>
             </a:endParaRPr>
           </a:p>
@@ -3695,13 +4754,470 @@
       </p:sp>
       <p:sp>
         <p:nvSpPr>
-          <p:cNvPr id="17" name="Rounded Rectangle 16"/>
+          <p:cNvPr id="38" name="TextBox 37">
+            <a:extLst>
+              <a:ext uri="{FF2B5EF4-FFF2-40B4-BE49-F238E27FC236}">
+                <a16:creationId xmlns:a16="http://schemas.microsoft.com/office/drawing/2014/main" id="{77DAED8E-5C96-4A35-888B-7597896C4C57}"/>
+              </a:ext>
+            </a:extLst>
+          </p:cNvPr>
+          <p:cNvSpPr txBox="1"/>
+          <p:nvPr/>
+        </p:nvSpPr>
+        <p:spPr>
+          <a:xfrm>
+            <a:off x="8177886" y="5583589"/>
+            <a:ext cx="1868557" cy="338554"/>
+          </a:xfrm>
+          <a:prstGeom prst="rect">
+            <a:avLst/>
+          </a:prstGeom>
+          <a:noFill/>
+        </p:spPr>
+        <p:txBody>
+          <a:bodyPr wrap="square" rtlCol="0">
+            <a:spAutoFit/>
+          </a:bodyPr>
+          <a:lstStyle/>
+          <a:p>
+            <a:r>
+              <a:rPr lang="en-US" sz="1600" b="1" dirty="0">
+                <a:solidFill>
+                  <a:srgbClr val="FF0000"/>
+                </a:solidFill>
+              </a:rPr>
+              <a:t>&lt;category-card&gt;</a:t>
+            </a:r>
+          </a:p>
+        </p:txBody>
+      </p:sp>
+      <p:cxnSp>
+        <p:nvCxnSpPr>
+          <p:cNvPr id="39" name="Straight Arrow Connector 38">
+            <a:extLst>
+              <a:ext uri="{FF2B5EF4-FFF2-40B4-BE49-F238E27FC236}">
+                <a16:creationId xmlns:a16="http://schemas.microsoft.com/office/drawing/2014/main" id="{A4D8ACF3-70D5-4999-ABDF-C8979E0DA937}"/>
+              </a:ext>
+            </a:extLst>
+          </p:cNvPr>
+          <p:cNvCxnSpPr>
+            <a:cxnSpLocks/>
+          </p:cNvCxnSpPr>
+          <p:nvPr/>
+        </p:nvCxnSpPr>
+        <p:spPr>
+          <a:xfrm>
+            <a:off x="2521809" y="4832328"/>
+            <a:ext cx="0" cy="662278"/>
+          </a:xfrm>
+          <a:prstGeom prst="straightConnector1">
+            <a:avLst/>
+          </a:prstGeom>
+          <a:ln w="12700">
+            <a:tailEnd type="triangle"/>
+          </a:ln>
+        </p:spPr>
+        <p:style>
+          <a:lnRef idx="1">
+            <a:schemeClr val="accent1"/>
+          </a:lnRef>
+          <a:fillRef idx="0">
+            <a:schemeClr val="accent1"/>
+          </a:fillRef>
+          <a:effectRef idx="0">
+            <a:schemeClr val="accent1"/>
+          </a:effectRef>
+          <a:fontRef idx="minor">
+            <a:schemeClr val="tx1"/>
+          </a:fontRef>
+        </p:style>
+      </p:cxnSp>
+      <p:cxnSp>
+        <p:nvCxnSpPr>
+          <p:cNvPr id="40" name="Straight Arrow Connector 39">
+            <a:extLst>
+              <a:ext uri="{FF2B5EF4-FFF2-40B4-BE49-F238E27FC236}">
+                <a16:creationId xmlns:a16="http://schemas.microsoft.com/office/drawing/2014/main" id="{C7A8BA4B-9D08-4044-BF6B-715F7B15B46B}"/>
+              </a:ext>
+            </a:extLst>
+          </p:cNvPr>
+          <p:cNvCxnSpPr>
+            <a:cxnSpLocks/>
+          </p:cNvCxnSpPr>
+          <p:nvPr/>
+        </p:nvCxnSpPr>
+        <p:spPr>
+          <a:xfrm>
+            <a:off x="6086644" y="4852538"/>
+            <a:ext cx="0" cy="662278"/>
+          </a:xfrm>
+          <a:prstGeom prst="straightConnector1">
+            <a:avLst/>
+          </a:prstGeom>
+          <a:ln w="12700">
+            <a:tailEnd type="triangle"/>
+          </a:ln>
+        </p:spPr>
+        <p:style>
+          <a:lnRef idx="1">
+            <a:schemeClr val="accent1"/>
+          </a:lnRef>
+          <a:fillRef idx="0">
+            <a:schemeClr val="accent1"/>
+          </a:fillRef>
+          <a:effectRef idx="0">
+            <a:schemeClr val="accent1"/>
+          </a:effectRef>
+          <a:fontRef idx="minor">
+            <a:schemeClr val="tx1"/>
+          </a:fontRef>
+        </p:style>
+      </p:cxnSp>
+      <p:cxnSp>
+        <p:nvCxnSpPr>
+          <p:cNvPr id="41" name="Straight Arrow Connector 40">
+            <a:extLst>
+              <a:ext uri="{FF2B5EF4-FFF2-40B4-BE49-F238E27FC236}">
+                <a16:creationId xmlns:a16="http://schemas.microsoft.com/office/drawing/2014/main" id="{7A474A93-9077-4644-ACE9-7A47E061B9D1}"/>
+              </a:ext>
+            </a:extLst>
+          </p:cNvPr>
+          <p:cNvCxnSpPr>
+            <a:cxnSpLocks/>
+          </p:cNvCxnSpPr>
+          <p:nvPr/>
+        </p:nvCxnSpPr>
+        <p:spPr>
+          <a:xfrm>
+            <a:off x="9161148" y="4832328"/>
+            <a:ext cx="0" cy="662278"/>
+          </a:xfrm>
+          <a:prstGeom prst="straightConnector1">
+            <a:avLst/>
+          </a:prstGeom>
+          <a:ln w="12700">
+            <a:tailEnd type="triangle"/>
+          </a:ln>
+        </p:spPr>
+        <p:style>
+          <a:lnRef idx="1">
+            <a:schemeClr val="accent1"/>
+          </a:lnRef>
+          <a:fillRef idx="0">
+            <a:schemeClr val="accent1"/>
+          </a:fillRef>
+          <a:effectRef idx="0">
+            <a:schemeClr val="accent1"/>
+          </a:effectRef>
+          <a:fontRef idx="minor">
+            <a:schemeClr val="tx1"/>
+          </a:fontRef>
+        </p:style>
+      </p:cxnSp>
+      <p:sp>
+        <p:nvSpPr>
+          <p:cNvPr id="42" name="TextBox 41">
+            <a:extLst>
+              <a:ext uri="{FF2B5EF4-FFF2-40B4-BE49-F238E27FC236}">
+                <a16:creationId xmlns:a16="http://schemas.microsoft.com/office/drawing/2014/main" id="{9B1E7CF8-5523-4293-BD37-05F46ED92F56}"/>
+              </a:ext>
+            </a:extLst>
+          </p:cNvPr>
+          <p:cNvSpPr txBox="1"/>
+          <p:nvPr/>
+        </p:nvSpPr>
+        <p:spPr>
+          <a:xfrm>
+            <a:off x="1660238" y="5111026"/>
+            <a:ext cx="802733" cy="338554"/>
+          </a:xfrm>
+          <a:prstGeom prst="rect">
+            <a:avLst/>
+          </a:prstGeom>
+          <a:noFill/>
+        </p:spPr>
+        <p:txBody>
+          <a:bodyPr wrap="square" rtlCol="0">
+            <a:spAutoFit/>
+          </a:bodyPr>
+          <a:lstStyle/>
+          <a:p>
+            <a:r>
+              <a:rPr lang="en-US" sz="1600" b="1" dirty="0">
+                <a:solidFill>
+                  <a:schemeClr val="accent6">
+                    <a:lumMod val="75000"/>
+                  </a:schemeClr>
+                </a:solidFill>
+              </a:rPr>
+              <a:t>PROPS</a:t>
+            </a:r>
+          </a:p>
+        </p:txBody>
+      </p:sp>
+      <p:sp>
+        <p:nvSpPr>
+          <p:cNvPr id="43" name="TextBox 42">
+            <a:extLst>
+              <a:ext uri="{FF2B5EF4-FFF2-40B4-BE49-F238E27FC236}">
+                <a16:creationId xmlns:a16="http://schemas.microsoft.com/office/drawing/2014/main" id="{F9FDF64B-A6B5-4BA7-BD42-6F043348FB6D}"/>
+              </a:ext>
+            </a:extLst>
+          </p:cNvPr>
+          <p:cNvSpPr txBox="1"/>
+          <p:nvPr/>
+        </p:nvSpPr>
+        <p:spPr>
+          <a:xfrm>
+            <a:off x="2578221" y="5095637"/>
+            <a:ext cx="1582188" cy="369332"/>
+          </a:xfrm>
+          <a:prstGeom prst="rect">
+            <a:avLst/>
+          </a:prstGeom>
+          <a:noFill/>
+        </p:spPr>
+        <p:txBody>
+          <a:bodyPr wrap="square" rtlCol="0">
+            <a:spAutoFit/>
+          </a:bodyPr>
+          <a:lstStyle/>
+          <a:p>
+            <a:r>
+              <a:rPr lang="en-US" sz="1800" dirty="0"/>
+              <a:t>my-event-info</a:t>
+            </a:r>
+          </a:p>
+        </p:txBody>
+      </p:sp>
+      <p:sp>
+        <p:nvSpPr>
+          <p:cNvPr id="44" name="TextBox 43">
+            <a:extLst>
+              <a:ext uri="{FF2B5EF4-FFF2-40B4-BE49-F238E27FC236}">
+                <a16:creationId xmlns:a16="http://schemas.microsoft.com/office/drawing/2014/main" id="{43E97D08-FB87-4484-8807-E6A3853EB362}"/>
+              </a:ext>
+            </a:extLst>
+          </p:cNvPr>
+          <p:cNvSpPr txBox="1"/>
+          <p:nvPr/>
+        </p:nvSpPr>
+        <p:spPr>
+          <a:xfrm>
+            <a:off x="5302624" y="5072173"/>
+            <a:ext cx="802733" cy="338554"/>
+          </a:xfrm>
+          <a:prstGeom prst="rect">
+            <a:avLst/>
+          </a:prstGeom>
+          <a:noFill/>
+        </p:spPr>
+        <p:txBody>
+          <a:bodyPr wrap="square" rtlCol="0">
+            <a:spAutoFit/>
+          </a:bodyPr>
+          <a:lstStyle/>
+          <a:p>
+            <a:r>
+              <a:rPr lang="en-US" sz="1600" b="1" dirty="0">
+                <a:solidFill>
+                  <a:schemeClr val="accent6">
+                    <a:lumMod val="75000"/>
+                  </a:schemeClr>
+                </a:solidFill>
+              </a:rPr>
+              <a:t>PROPS</a:t>
+            </a:r>
+          </a:p>
+        </p:txBody>
+      </p:sp>
+      <p:sp>
+        <p:nvSpPr>
+          <p:cNvPr id="45" name="TextBox 44">
+            <a:extLst>
+              <a:ext uri="{FF2B5EF4-FFF2-40B4-BE49-F238E27FC236}">
+                <a16:creationId xmlns:a16="http://schemas.microsoft.com/office/drawing/2014/main" id="{054552D9-F659-46FA-BE65-21E1003D3D45}"/>
+              </a:ext>
+            </a:extLst>
+          </p:cNvPr>
+          <p:cNvSpPr txBox="1"/>
+          <p:nvPr/>
+        </p:nvSpPr>
+        <p:spPr>
+          <a:xfrm>
+            <a:off x="6060420" y="5056784"/>
+            <a:ext cx="1582188" cy="369332"/>
+          </a:xfrm>
+          <a:prstGeom prst="rect">
+            <a:avLst/>
+          </a:prstGeom>
+          <a:noFill/>
+        </p:spPr>
+        <p:txBody>
+          <a:bodyPr wrap="square" rtlCol="0">
+            <a:spAutoFit/>
+          </a:bodyPr>
+          <a:lstStyle/>
+          <a:p>
+            <a:r>
+              <a:rPr lang="en-US" sz="1800" dirty="0"/>
+              <a:t>my-event-info</a:t>
+            </a:r>
+          </a:p>
+        </p:txBody>
+      </p:sp>
+      <p:sp>
+        <p:nvSpPr>
+          <p:cNvPr id="46" name="TextBox 45">
+            <a:extLst>
+              <a:ext uri="{FF2B5EF4-FFF2-40B4-BE49-F238E27FC236}">
+                <a16:creationId xmlns:a16="http://schemas.microsoft.com/office/drawing/2014/main" id="{95428507-1808-489A-8E2C-3FFB7BB922A1}"/>
+              </a:ext>
+            </a:extLst>
+          </p:cNvPr>
+          <p:cNvSpPr txBox="1"/>
+          <p:nvPr/>
+        </p:nvSpPr>
+        <p:spPr>
+          <a:xfrm>
+            <a:off x="8403352" y="5056695"/>
+            <a:ext cx="802733" cy="338554"/>
+          </a:xfrm>
+          <a:prstGeom prst="rect">
+            <a:avLst/>
+          </a:prstGeom>
+          <a:noFill/>
+        </p:spPr>
+        <p:txBody>
+          <a:bodyPr wrap="square" rtlCol="0">
+            <a:spAutoFit/>
+          </a:bodyPr>
+          <a:lstStyle/>
+          <a:p>
+            <a:r>
+              <a:rPr lang="en-US" sz="1600" b="1" dirty="0">
+                <a:solidFill>
+                  <a:schemeClr val="accent6">
+                    <a:lumMod val="75000"/>
+                  </a:schemeClr>
+                </a:solidFill>
+              </a:rPr>
+              <a:t>PROPS</a:t>
+            </a:r>
+          </a:p>
+        </p:txBody>
+      </p:sp>
+      <p:sp>
+        <p:nvSpPr>
+          <p:cNvPr id="47" name="TextBox 46">
+            <a:extLst>
+              <a:ext uri="{FF2B5EF4-FFF2-40B4-BE49-F238E27FC236}">
+                <a16:creationId xmlns:a16="http://schemas.microsoft.com/office/drawing/2014/main" id="{18A527F7-22F1-4068-9E39-F31279AFF5AD}"/>
+              </a:ext>
+            </a:extLst>
+          </p:cNvPr>
+          <p:cNvSpPr txBox="1"/>
+          <p:nvPr/>
+        </p:nvSpPr>
+        <p:spPr>
+          <a:xfrm>
+            <a:off x="3343516" y="176514"/>
+            <a:ext cx="4608957" cy="400110"/>
+          </a:xfrm>
+          <a:prstGeom prst="rect">
+            <a:avLst/>
+          </a:prstGeom>
+          <a:noFill/>
+        </p:spPr>
+        <p:txBody>
+          <a:bodyPr wrap="square" rtlCol="0">
+            <a:spAutoFit/>
+          </a:bodyPr>
+          <a:lstStyle/>
+          <a:p>
+            <a:r>
+              <a:rPr lang="en-US" sz="2000" b="1" dirty="0">
+                <a:solidFill>
+                  <a:srgbClr val="00B0F0"/>
+                </a:solidFill>
+              </a:rPr>
+              <a:t>Update Component Diagram Menu</a:t>
+            </a:r>
+          </a:p>
+        </p:txBody>
+      </p:sp>
+    </p:spTree>
+    <p:extLst>
+      <p:ext uri="{BB962C8B-B14F-4D97-AF65-F5344CB8AC3E}">
+        <p14:creationId xmlns:p14="http://schemas.microsoft.com/office/powerpoint/2010/main" val="849478567"/>
+      </p:ext>
+    </p:extLst>
+  </p:cSld>
+  <p:clrMapOvr>
+    <a:masterClrMapping/>
+  </p:clrMapOvr>
+</p:sld>
+</file>
+
+<file path=ppt/slides/slide3.xml><?xml version="1.0" encoding="utf-8"?>
+<p:sld xmlns:a="http://schemas.openxmlformats.org/drawingml/2006/main" xmlns:r="http://schemas.openxmlformats.org/officeDocument/2006/relationships" xmlns:p="http://schemas.openxmlformats.org/presentationml/2006/main">
+  <p:cSld>
+    <p:spTree>
+      <p:nvGrpSpPr>
+        <p:cNvPr id="1" name=""/>
+        <p:cNvGrpSpPr/>
+        <p:nvPr/>
+      </p:nvGrpSpPr>
+      <p:grpSpPr>
+        <a:xfrm>
+          <a:off x="0" y="0"/>
+          <a:ext cx="0" cy="0"/>
+          <a:chOff x="0" y="0"/>
+          <a:chExt cx="0" cy="0"/>
+        </a:xfrm>
+      </p:grpSpPr>
+      <p:sp>
+        <p:nvSpPr>
+          <p:cNvPr id="4" name="TextBox 3"/>
+          <p:cNvSpPr txBox="1"/>
+          <p:nvPr/>
+        </p:nvSpPr>
+        <p:spPr>
+          <a:xfrm>
+            <a:off x="1009380" y="479624"/>
+            <a:ext cx="639919" cy="303481"/>
+          </a:xfrm>
+          <a:prstGeom prst="rect">
+            <a:avLst/>
+          </a:prstGeom>
+          <a:noFill/>
+        </p:spPr>
+        <p:txBody>
+          <a:bodyPr wrap="none" rtlCol="0">
+            <a:spAutoFit/>
+          </a:bodyPr>
+          <a:lstStyle/>
+          <a:p>
+            <a:r>
+              <a:rPr lang="en-US" sz="1372" b="1" i="1" dirty="0">
+                <a:solidFill>
+                  <a:srgbClr val="FF0000"/>
+                </a:solidFill>
+              </a:rPr>
+              <a:t>&lt;app&gt;</a:t>
+            </a:r>
+          </a:p>
+        </p:txBody>
+      </p:sp>
+      <p:sp>
+        <p:nvSpPr>
+          <p:cNvPr id="5" name="Rounded Rectangle 4"/>
           <p:cNvSpPr/>
           <p:nvPr/>
         </p:nvSpPr>
         <p:spPr>
           <a:xfrm>
-            <a:off x="3056973" y="2408786"/>
+            <a:off x="523323" y="309043"/>
             <a:ext cx="1650319" cy="1166483"/>
           </a:xfrm>
           <a:prstGeom prst="roundRect">
@@ -3742,13 +5258,13 @@
       </p:sp>
       <p:sp>
         <p:nvSpPr>
-          <p:cNvPr id="18" name="TextBox 17"/>
+          <p:cNvPr id="6" name="TextBox 5"/>
           <p:cNvSpPr txBox="1"/>
           <p:nvPr/>
         </p:nvSpPr>
         <p:spPr>
           <a:xfrm>
-            <a:off x="3418703" y="2992027"/>
+            <a:off x="885053" y="892284"/>
             <a:ext cx="926857" cy="303481"/>
           </a:xfrm>
           <a:prstGeom prst="rect">
@@ -3763,23 +5279,22 @@
           <a:lstStyle/>
           <a:p>
             <a:r>
-              <a:rPr lang="en-US" sz="1372" dirty="0" smtClean="0"/>
+              <a:rPr lang="en-US" sz="1372" dirty="0"/>
               <a:t>Students[]</a:t>
             </a:r>
-            <a:endParaRPr lang="en-US" sz="1372" dirty="0"/>
-          </a:p>
-        </p:txBody>
-      </p:sp>
-      <p:sp>
-        <p:nvSpPr>
-          <p:cNvPr id="19" name="TextBox 18"/>
+          </a:p>
+        </p:txBody>
+      </p:sp>
+      <p:sp>
+        <p:nvSpPr>
+          <p:cNvPr id="7" name="TextBox 6"/>
           <p:cNvSpPr txBox="1"/>
           <p:nvPr/>
         </p:nvSpPr>
         <p:spPr>
           <a:xfrm>
-            <a:off x="3666083" y="4779442"/>
-            <a:ext cx="713657" cy="303481"/>
+            <a:off x="119555" y="1627265"/>
+            <a:ext cx="3384709" cy="303481"/>
           </a:xfrm>
           <a:prstGeom prst="rect">
             <a:avLst/>
@@ -3793,30 +5308,54 @@
           <a:lstStyle/>
           <a:p>
             <a:r>
-              <a:rPr lang="en-US" sz="1372" b="1" i="1" dirty="0" smtClean="0">
+              <a:rPr lang="en-US" sz="1372" dirty="0"/>
+              <a:t>// A component with a list of student as data</a:t>
+            </a:r>
+          </a:p>
+        </p:txBody>
+      </p:sp>
+      <p:sp>
+        <p:nvSpPr>
+          <p:cNvPr id="8" name="TextBox 7"/>
+          <p:cNvSpPr txBox="1"/>
+          <p:nvPr/>
+        </p:nvSpPr>
+        <p:spPr>
+          <a:xfrm>
+            <a:off x="1009380" y="2556074"/>
+            <a:ext cx="639919" cy="303481"/>
+          </a:xfrm>
+          <a:prstGeom prst="rect">
+            <a:avLst/>
+          </a:prstGeom>
+          <a:noFill/>
+        </p:spPr>
+        <p:txBody>
+          <a:bodyPr wrap="none" rtlCol="0">
+            <a:spAutoFit/>
+          </a:bodyPr>
+          <a:lstStyle/>
+          <a:p>
+            <a:r>
+              <a:rPr lang="en-US" sz="1372" b="1" i="1" dirty="0">
                 <a:solidFill>
                   <a:srgbClr val="FF0000"/>
                 </a:solidFill>
               </a:rPr>
-              <a:t>&lt;from&gt;</a:t>
-            </a:r>
-            <a:endParaRPr lang="en-US" sz="1372" b="1" i="1" dirty="0">
-              <a:solidFill>
-                <a:srgbClr val="FF0000"/>
-              </a:solidFill>
-            </a:endParaRPr>
-          </a:p>
-        </p:txBody>
-      </p:sp>
-      <p:sp>
-        <p:nvSpPr>
-          <p:cNvPr id="20" name="Rounded Rectangle 19"/>
+              <a:t>&lt;app&gt;</a:t>
+            </a:r>
+          </a:p>
+        </p:txBody>
+      </p:sp>
+      <p:sp>
+        <p:nvSpPr>
+          <p:cNvPr id="9" name="Rounded Rectangle 8"/>
           <p:cNvSpPr/>
           <p:nvPr/>
         </p:nvSpPr>
         <p:spPr>
           <a:xfrm>
-            <a:off x="3180026" y="4608861"/>
+            <a:off x="523323" y="2385493"/>
             <a:ext cx="1650319" cy="1166483"/>
           </a:xfrm>
           <a:prstGeom prst="roundRect">
@@ -3857,13 +5396,13 @@
       </p:sp>
       <p:sp>
         <p:nvSpPr>
-          <p:cNvPr id="21" name="TextBox 20"/>
+          <p:cNvPr id="10" name="TextBox 9"/>
           <p:cNvSpPr txBox="1"/>
           <p:nvPr/>
         </p:nvSpPr>
         <p:spPr>
           <a:xfrm>
-            <a:off x="3541756" y="5192102"/>
+            <a:off x="885053" y="2968734"/>
             <a:ext cx="926857" cy="303481"/>
           </a:xfrm>
           <a:prstGeom prst="rect">
@@ -3878,30 +5417,115 @@
           <a:lstStyle/>
           <a:p>
             <a:r>
-              <a:rPr lang="en-US" sz="1372" dirty="0" smtClean="0"/>
+              <a:rPr lang="en-US" sz="1372" dirty="0"/>
               <a:t>Students[]</a:t>
             </a:r>
-            <a:endParaRPr lang="en-US" sz="1372" dirty="0"/>
-          </a:p>
-        </p:txBody>
-      </p:sp>
-      <p:sp>
-        <p:nvSpPr>
-          <p:cNvPr id="22" name="Right Arrow 21"/>
+          </a:p>
+        </p:txBody>
+      </p:sp>
+      <p:sp>
+        <p:nvSpPr>
+          <p:cNvPr id="11" name="TextBox 10"/>
+          <p:cNvSpPr txBox="1"/>
+          <p:nvPr/>
+        </p:nvSpPr>
+        <p:spPr>
+          <a:xfrm>
+            <a:off x="464251" y="3703715"/>
+            <a:ext cx="2183996" cy="303481"/>
+          </a:xfrm>
+          <a:prstGeom prst="rect">
+            <a:avLst/>
+          </a:prstGeom>
+          <a:noFill/>
+        </p:spPr>
+        <p:txBody>
+          <a:bodyPr wrap="none" rtlCol="0">
+            <a:spAutoFit/>
+          </a:bodyPr>
+          <a:lstStyle/>
+          <a:p>
+            <a:r>
+              <a:rPr lang="en-US" sz="1372" dirty="0"/>
+              <a:t>// </a:t>
+            </a:r>
+            <a:r>
+              <a:rPr lang="en-US" sz="1372" dirty="0">
+                <a:solidFill>
+                  <a:srgbClr val="FF0000"/>
+                </a:solidFill>
+              </a:rPr>
+              <a:t>app</a:t>
+            </a:r>
+            <a:r>
+              <a:rPr lang="en-US" sz="1372" dirty="0"/>
+              <a:t> send student to </a:t>
+            </a:r>
+            <a:r>
+              <a:rPr lang="en-US" sz="1372" dirty="0">
+                <a:solidFill>
+                  <a:srgbClr val="FF0000"/>
+                </a:solidFill>
+              </a:rPr>
+              <a:t>card </a:t>
+            </a:r>
+          </a:p>
+        </p:txBody>
+      </p:sp>
+      <p:sp>
+        <p:nvSpPr>
+          <p:cNvPr id="12" name="TextBox 11"/>
+          <p:cNvSpPr txBox="1"/>
+          <p:nvPr/>
+        </p:nvSpPr>
+        <p:spPr>
+          <a:xfrm>
+            <a:off x="1009380" y="4803105"/>
+            <a:ext cx="848309" cy="303481"/>
+          </a:xfrm>
+          <a:prstGeom prst="rect">
+            <a:avLst/>
+          </a:prstGeom>
+          <a:noFill/>
+        </p:spPr>
+        <p:txBody>
+          <a:bodyPr wrap="none" rtlCol="0">
+            <a:spAutoFit/>
+          </a:bodyPr>
+          <a:lstStyle/>
+          <a:p>
+            <a:r>
+              <a:rPr lang="en-US" sz="1372" b="1" i="1" dirty="0">
+                <a:solidFill>
+                  <a:srgbClr val="FF0000"/>
+                </a:solidFill>
+              </a:rPr>
+              <a:t>&lt;parent&gt;</a:t>
+            </a:r>
+          </a:p>
+        </p:txBody>
+      </p:sp>
+      <p:sp>
+        <p:nvSpPr>
+          <p:cNvPr id="13" name="Rounded Rectangle 12"/>
           <p:cNvSpPr/>
           <p:nvPr/>
         </p:nvSpPr>
         <p:spPr>
           <a:xfrm>
-            <a:off x="2197551" y="2768367"/>
-            <a:ext cx="696809" cy="333683"/>
-          </a:xfrm>
-          <a:prstGeom prst="rightArrow">
-            <a:avLst/>
-          </a:prstGeom>
-          <a:solidFill>
-            <a:schemeClr val="accent6"/>
-          </a:solidFill>
+            <a:off x="523323" y="4632524"/>
+            <a:ext cx="1650319" cy="1166483"/>
+          </a:xfrm>
+          <a:prstGeom prst="roundRect">
+            <a:avLst/>
+          </a:prstGeom>
+          <a:noFill/>
+          <a:ln>
+            <a:solidFill>
+              <a:srgbClr val="FF0000"/>
+            </a:solidFill>
+            <a:prstDash val="lgDash"/>
+          </a:ln>
         </p:spPr>
         <p:style>
           <a:lnRef idx="2">
@@ -3920,12 +5544,7 @@
           </a:fontRef>
         </p:style>
         <p:txBody>
-          <a:bodyPr rot="0" spcFirstLastPara="0" vertOverflow="overflow" horzOverflow="overflow" vert="horz" wrap="square" lIns="69681" tIns="34840" rIns="69681" bIns="34840" numCol="1" spcCol="0" rtlCol="0" fromWordArt="0" anchor="ctr" anchorCtr="0" forceAA="0" compatLnSpc="1">
-            <a:prstTxWarp prst="textNoShape">
-              <a:avLst/>
-            </a:prstTxWarp>
-            <a:noAutofit/>
-          </a:bodyPr>
+          <a:bodyPr rtlCol="0" anchor="ctr"/>
           <a:lstStyle/>
           <a:p>
             <a:pPr algn="ctr"/>
@@ -3935,14 +5554,14 @@
       </p:sp>
       <p:sp>
         <p:nvSpPr>
-          <p:cNvPr id="23" name="TextBox 22"/>
+          <p:cNvPr id="14" name="TextBox 13"/>
           <p:cNvSpPr txBox="1"/>
           <p:nvPr/>
         </p:nvSpPr>
         <p:spPr>
           <a:xfrm>
-            <a:off x="2156606" y="3120474"/>
-            <a:ext cx="735714" cy="303481"/>
+            <a:off x="885053" y="5215765"/>
+            <a:ext cx="926857" cy="303481"/>
           </a:xfrm>
           <a:prstGeom prst="rect">
             <a:avLst/>
@@ -3956,23 +5575,22 @@
           <a:lstStyle/>
           <a:p>
             <a:r>
-              <a:rPr lang="en-US" sz="1372" dirty="0" smtClean="0"/>
-              <a:t>student</a:t>
-            </a:r>
-            <a:endParaRPr lang="en-US" sz="1372" dirty="0"/>
-          </a:p>
-        </p:txBody>
-      </p:sp>
-      <p:sp>
-        <p:nvSpPr>
-          <p:cNvPr id="24" name="TextBox 23"/>
+              <a:rPr lang="en-US" sz="1372" dirty="0"/>
+              <a:t>Students[]</a:t>
+            </a:r>
+          </a:p>
+        </p:txBody>
+      </p:sp>
+      <p:sp>
+        <p:nvSpPr>
+          <p:cNvPr id="15" name="TextBox 14"/>
           <p:cNvSpPr txBox="1"/>
           <p:nvPr/>
         </p:nvSpPr>
         <p:spPr>
           <a:xfrm>
-            <a:off x="2188492" y="2550268"/>
-            <a:ext cx="670248" cy="303481"/>
+            <a:off x="394083" y="6064417"/>
+            <a:ext cx="3216522" cy="303481"/>
           </a:xfrm>
           <a:prstGeom prst="rect">
             <a:avLst/>
@@ -3986,76 +5604,53 @@
           <a:lstStyle/>
           <a:p>
             <a:r>
-              <a:rPr lang="en-US" sz="1372" b="1" dirty="0" smtClean="0">
-                <a:solidFill>
-                  <a:schemeClr val="accent6"/>
-                </a:solidFill>
-              </a:rPr>
-              <a:t>PROPS</a:t>
-            </a:r>
-            <a:endParaRPr lang="en-US" sz="1372" b="1" dirty="0">
-              <a:solidFill>
-                <a:schemeClr val="accent6"/>
-              </a:solidFill>
-            </a:endParaRPr>
-          </a:p>
-        </p:txBody>
-      </p:sp>
-      <p:sp>
-        <p:nvSpPr>
-          <p:cNvPr id="25" name="TextBox 24"/>
-          <p:cNvSpPr txBox="1"/>
-          <p:nvPr/>
-        </p:nvSpPr>
-        <p:spPr>
-          <a:xfrm>
-            <a:off x="3562171" y="2587817"/>
-            <a:ext cx="680251" cy="303481"/>
-          </a:xfrm>
-          <a:prstGeom prst="rect">
-            <a:avLst/>
-          </a:prstGeom>
-          <a:noFill/>
-        </p:spPr>
-        <p:txBody>
-          <a:bodyPr wrap="none" rtlCol="0">
-            <a:spAutoFit/>
-          </a:bodyPr>
-          <a:lstStyle/>
-          <a:p>
-            <a:r>
-              <a:rPr lang="en-US" sz="1372" b="1" i="1" dirty="0" smtClean="0">
+              <a:rPr lang="en-US" sz="1372" dirty="0"/>
+              <a:t>// </a:t>
+            </a:r>
+            <a:r>
+              <a:rPr lang="en-US" sz="1372" dirty="0">
                 <a:solidFill>
                   <a:srgbClr val="FF0000"/>
                 </a:solidFill>
               </a:rPr>
-              <a:t>&lt;card&gt;</a:t>
-            </a:r>
-            <a:endParaRPr lang="en-US" sz="1372" b="1" i="1" dirty="0">
-              <a:solidFill>
-                <a:srgbClr val="FF0000"/>
-              </a:solidFill>
-            </a:endParaRPr>
-          </a:p>
-        </p:txBody>
-      </p:sp>
-      <p:sp>
-        <p:nvSpPr>
-          <p:cNvPr id="26" name="Right Arrow 25"/>
+              <a:t>from</a:t>
+            </a:r>
+            <a:r>
+              <a:rPr lang="en-US" sz="1372" dirty="0"/>
+              <a:t> send the event validated to </a:t>
+            </a:r>
+            <a:r>
+              <a:rPr lang="en-US" sz="1372" dirty="0">
+                <a:solidFill>
+                  <a:srgbClr val="FF0000"/>
+                </a:solidFill>
+              </a:rPr>
+              <a:t>parent</a:t>
+            </a:r>
+          </a:p>
+        </p:txBody>
+      </p:sp>
+      <p:sp>
+        <p:nvSpPr>
+          <p:cNvPr id="17" name="Rounded Rectangle 16"/>
           <p:cNvSpPr/>
           <p:nvPr/>
         </p:nvSpPr>
         <p:spPr>
-          <a:xfrm flipH="1">
-            <a:off x="2387600" y="5000637"/>
-            <a:ext cx="792424" cy="400041"/>
-          </a:xfrm>
-          <a:prstGeom prst="rightArrow">
-            <a:avLst/>
-          </a:prstGeom>
-          <a:solidFill>
-            <a:srgbClr val="FF0000"/>
-          </a:solidFill>
+          <a:xfrm>
+            <a:off x="3056973" y="2408786"/>
+            <a:ext cx="1650319" cy="1166483"/>
+          </a:xfrm>
+          <a:prstGeom prst="roundRect">
+            <a:avLst/>
+          </a:prstGeom>
+          <a:noFill/>
+          <a:ln>
+            <a:solidFill>
+              <a:srgbClr val="FF0000"/>
+            </a:solidFill>
+            <a:prstDash val="lgDash"/>
+          </a:ln>
         </p:spPr>
         <p:style>
           <a:lnRef idx="2">
@@ -4074,12 +5669,7 @@
           </a:fontRef>
         </p:style>
         <p:txBody>
-          <a:bodyPr rot="0" spcFirstLastPara="0" vertOverflow="overflow" horzOverflow="overflow" vert="horz" wrap="square" lIns="69681" tIns="34840" rIns="69681" bIns="34840" numCol="1" spcCol="0" rtlCol="0" fromWordArt="0" anchor="ctr" anchorCtr="0" forceAA="0" compatLnSpc="1">
-            <a:prstTxWarp prst="textNoShape">
-              <a:avLst/>
-            </a:prstTxWarp>
-            <a:noAutofit/>
-          </a:bodyPr>
+          <a:bodyPr rtlCol="0" anchor="ctr"/>
           <a:lstStyle/>
           <a:p>
             <a:pPr algn="ctr"/>
@@ -4089,14 +5679,14 @@
       </p:sp>
       <p:sp>
         <p:nvSpPr>
-          <p:cNvPr id="27" name="TextBox 26"/>
+          <p:cNvPr id="18" name="TextBox 17"/>
           <p:cNvSpPr txBox="1"/>
           <p:nvPr/>
         </p:nvSpPr>
         <p:spPr>
           <a:xfrm>
-            <a:off x="2523616" y="5336639"/>
-            <a:ext cx="701474" cy="303481"/>
+            <a:off x="3418703" y="2992027"/>
+            <a:ext cx="926857" cy="303481"/>
           </a:xfrm>
           <a:prstGeom prst="rect">
             <a:avLst/>
@@ -4110,91 +5700,22 @@
           <a:lstStyle/>
           <a:p>
             <a:r>
-              <a:rPr lang="en-US" sz="1372" dirty="0" err="1" smtClean="0"/>
-              <a:t>valided</a:t>
-            </a:r>
-            <a:endParaRPr lang="en-US" sz="1372" dirty="0"/>
-          </a:p>
-        </p:txBody>
-      </p:sp>
-      <p:sp>
-        <p:nvSpPr>
-          <p:cNvPr id="28" name="TextBox 27"/>
+              <a:rPr lang="en-US" sz="1372" dirty="0"/>
+              <a:t>Students[]</a:t>
+            </a:r>
+          </a:p>
+        </p:txBody>
+      </p:sp>
+      <p:sp>
+        <p:nvSpPr>
+          <p:cNvPr id="19" name="TextBox 18"/>
           <p:cNvSpPr txBox="1"/>
           <p:nvPr/>
         </p:nvSpPr>
         <p:spPr>
           <a:xfrm>
-            <a:off x="2574806" y="4621286"/>
-            <a:ext cx="558166" cy="303481"/>
-          </a:xfrm>
-          <a:prstGeom prst="rect">
-            <a:avLst/>
-          </a:prstGeom>
-          <a:noFill/>
-        </p:spPr>
-        <p:txBody>
-          <a:bodyPr wrap="none" rtlCol="0">
-            <a:spAutoFit/>
-          </a:bodyPr>
-          <a:lstStyle/>
-          <a:p>
-            <a:r>
-              <a:rPr lang="en-US" sz="1372" b="1" dirty="0" smtClean="0">
-                <a:solidFill>
-                  <a:srgbClr val="FF0000"/>
-                </a:solidFill>
-              </a:rPr>
-              <a:t>EMIT</a:t>
-            </a:r>
-            <a:endParaRPr lang="en-US" sz="1372" b="1" dirty="0">
-              <a:solidFill>
-                <a:srgbClr val="FF0000"/>
-              </a:solidFill>
-            </a:endParaRPr>
-          </a:p>
-        </p:txBody>
-      </p:sp>
-      <p:cxnSp>
-        <p:nvCxnSpPr>
-          <p:cNvPr id="30" name="Straight Connector 29"/>
-          <p:cNvCxnSpPr/>
-          <p:nvPr/>
-        </p:nvCxnSpPr>
-        <p:spPr>
-          <a:xfrm>
-            <a:off x="5733143" y="0"/>
-            <a:ext cx="29028" cy="6858000"/>
-          </a:xfrm>
-          <a:prstGeom prst="line">
-            <a:avLst/>
-          </a:prstGeom>
-        </p:spPr>
-        <p:style>
-          <a:lnRef idx="1">
-            <a:schemeClr val="accent1"/>
-          </a:lnRef>
-          <a:fillRef idx="0">
-            <a:schemeClr val="accent1"/>
-          </a:fillRef>
-          <a:effectRef idx="0">
-            <a:schemeClr val="accent1"/>
-          </a:effectRef>
-          <a:fontRef idx="minor">
-            <a:schemeClr val="tx1"/>
-          </a:fontRef>
-        </p:style>
-      </p:cxnSp>
-      <p:sp>
-        <p:nvSpPr>
-          <p:cNvPr id="31" name="TextBox 30"/>
-          <p:cNvSpPr txBox="1"/>
-          <p:nvPr/>
-        </p:nvSpPr>
-        <p:spPr>
-          <a:xfrm>
-            <a:off x="6720447" y="481416"/>
-            <a:ext cx="639919" cy="303481"/>
+            <a:off x="3666083" y="4779442"/>
+            <a:ext cx="713657" cy="303481"/>
           </a:xfrm>
           <a:prstGeom prst="rect">
             <a:avLst/>
@@ -4213,20 +5734,20 @@
                   <a:srgbClr val="FF0000"/>
                 </a:solidFill>
               </a:rPr>
-              <a:t>&lt;app&gt;</a:t>
-            </a:r>
-          </a:p>
-        </p:txBody>
-      </p:sp>
-      <p:sp>
-        <p:nvSpPr>
-          <p:cNvPr id="32" name="Rounded Rectangle 31"/>
+              <a:t>&lt;from&gt;</a:t>
+            </a:r>
+          </a:p>
+        </p:txBody>
+      </p:sp>
+      <p:sp>
+        <p:nvSpPr>
+          <p:cNvPr id="20" name="Rounded Rectangle 19"/>
           <p:cNvSpPr/>
           <p:nvPr/>
         </p:nvSpPr>
         <p:spPr>
           <a:xfrm>
-            <a:off x="6234390" y="310835"/>
+            <a:off x="3180026" y="4608861"/>
             <a:ext cx="1650319" cy="1166483"/>
           </a:xfrm>
           <a:prstGeom prst="roundRect">
@@ -4267,13 +5788,13 @@
       </p:sp>
       <p:sp>
         <p:nvSpPr>
-          <p:cNvPr id="33" name="TextBox 32"/>
+          <p:cNvPr id="21" name="TextBox 20"/>
           <p:cNvSpPr txBox="1"/>
           <p:nvPr/>
         </p:nvSpPr>
         <p:spPr>
           <a:xfrm>
-            <a:off x="6596120" y="894076"/>
+            <a:off x="3541756" y="5192102"/>
             <a:ext cx="926857" cy="303481"/>
           </a:xfrm>
           <a:prstGeom prst="rect">
@@ -4288,80 +5809,29 @@
           <a:lstStyle/>
           <a:p>
             <a:r>
-              <a:rPr lang="en-US" sz="1372" dirty="0" smtClean="0"/>
+              <a:rPr lang="en-US" sz="1372" dirty="0"/>
               <a:t>Students[]</a:t>
             </a:r>
-            <a:endParaRPr lang="en-US" sz="1372" dirty="0"/>
-          </a:p>
-        </p:txBody>
-      </p:sp>
-      <p:sp>
-        <p:nvSpPr>
-          <p:cNvPr id="34" name="TextBox 33"/>
-          <p:cNvSpPr txBox="1"/>
-          <p:nvPr/>
-        </p:nvSpPr>
-        <p:spPr>
-          <a:xfrm>
-            <a:off x="6234390" y="1613780"/>
-            <a:ext cx="2858411" cy="303481"/>
-          </a:xfrm>
-          <a:prstGeom prst="rect">
-            <a:avLst/>
-          </a:prstGeom>
-          <a:noFill/>
-        </p:spPr>
-        <p:txBody>
-          <a:bodyPr wrap="none" rtlCol="0">
-            <a:spAutoFit/>
-          </a:bodyPr>
-          <a:lstStyle/>
-          <a:p>
-            <a:r>
-              <a:rPr lang="en-US" sz="1372" dirty="0" smtClean="0"/>
-              <a:t>// </a:t>
-            </a:r>
-            <a:r>
-              <a:rPr lang="en-US" sz="1372" dirty="0" smtClean="0">
-                <a:solidFill>
-                  <a:srgbClr val="FF0000"/>
-                </a:solidFill>
-              </a:rPr>
-              <a:t>app</a:t>
-            </a:r>
-            <a:r>
-              <a:rPr lang="en-US" sz="1372" dirty="0" smtClean="0"/>
-              <a:t>  provides students to anymore</a:t>
-            </a:r>
-            <a:endParaRPr lang="en-US" sz="1372" dirty="0">
-              <a:solidFill>
-                <a:srgbClr val="FF0000"/>
-              </a:solidFill>
-            </a:endParaRPr>
-          </a:p>
-        </p:txBody>
-      </p:sp>
-      <p:sp>
-        <p:nvSpPr>
-          <p:cNvPr id="35" name="Rounded Rectangle 34"/>
+          </a:p>
+        </p:txBody>
+      </p:sp>
+      <p:sp>
+        <p:nvSpPr>
+          <p:cNvPr id="22" name="Right Arrow 21"/>
           <p:cNvSpPr/>
           <p:nvPr/>
         </p:nvSpPr>
         <p:spPr>
           <a:xfrm>
-            <a:off x="9792269" y="2129025"/>
-            <a:ext cx="1650319" cy="1166483"/>
-          </a:xfrm>
-          <a:prstGeom prst="roundRect">
-            <a:avLst/>
-          </a:prstGeom>
-          <a:noFill/>
-          <a:ln>
-            <a:solidFill>
-              <a:srgbClr val="FF0000"/>
-            </a:solidFill>
-            <a:prstDash val="lgDash"/>
-          </a:ln>
+            <a:off x="2197551" y="2768367"/>
+            <a:ext cx="696809" cy="333683"/>
+          </a:xfrm>
+          <a:prstGeom prst="rightArrow">
+            <a:avLst/>
+          </a:prstGeom>
+          <a:solidFill>
+            <a:schemeClr val="accent6"/>
+          </a:solidFill>
         </p:spPr>
         <p:style>
           <a:lnRef idx="2">
@@ -4380,7 +5850,12 @@
           </a:fontRef>
         </p:style>
         <p:txBody>
-          <a:bodyPr rtlCol="0" anchor="ctr"/>
+          <a:bodyPr rot="0" spcFirstLastPara="0" vertOverflow="overflow" horzOverflow="overflow" vert="horz" wrap="square" lIns="69681" tIns="34840" rIns="69681" bIns="34840" numCol="1" spcCol="0" rtlCol="0" fromWordArt="0" anchor="ctr" anchorCtr="0" forceAA="0" compatLnSpc="1">
+            <a:prstTxWarp prst="textNoShape">
+              <a:avLst/>
+            </a:prstTxWarp>
+            <a:noAutofit/>
+          </a:bodyPr>
           <a:lstStyle/>
           <a:p>
             <a:pPr algn="ctr"/>
@@ -4390,14 +5865,14 @@
       </p:sp>
       <p:sp>
         <p:nvSpPr>
-          <p:cNvPr id="36" name="TextBox 35"/>
+          <p:cNvPr id="23" name="TextBox 22"/>
           <p:cNvSpPr txBox="1"/>
           <p:nvPr/>
         </p:nvSpPr>
         <p:spPr>
           <a:xfrm>
-            <a:off x="10153999" y="2712266"/>
-            <a:ext cx="926857" cy="303481"/>
+            <a:off x="2156606" y="3120474"/>
+            <a:ext cx="735714" cy="303481"/>
           </a:xfrm>
           <a:prstGeom prst="rect">
             <a:avLst/>
@@ -4411,23 +5886,22 @@
           <a:lstStyle/>
           <a:p>
             <a:r>
-              <a:rPr lang="en-US" sz="1372" dirty="0" smtClean="0"/>
-              <a:t>Students[]</a:t>
-            </a:r>
-            <a:endParaRPr lang="en-US" sz="1372" dirty="0"/>
-          </a:p>
-        </p:txBody>
-      </p:sp>
-      <p:sp>
-        <p:nvSpPr>
-          <p:cNvPr id="40" name="TextBox 39"/>
+              <a:rPr lang="en-US" sz="1372" dirty="0"/>
+              <a:t>student</a:t>
+            </a:r>
+          </a:p>
+        </p:txBody>
+      </p:sp>
+      <p:sp>
+        <p:nvSpPr>
+          <p:cNvPr id="24" name="TextBox 23"/>
           <p:cNvSpPr txBox="1"/>
           <p:nvPr/>
         </p:nvSpPr>
         <p:spPr>
           <a:xfrm>
-            <a:off x="10297467" y="2308056"/>
-            <a:ext cx="819455" cy="303481"/>
+            <a:off x="2188492" y="2550268"/>
+            <a:ext cx="670248" cy="303481"/>
           </a:xfrm>
           <a:prstGeom prst="rect">
             <a:avLst/>
@@ -4441,37 +5915,65 @@
           <a:lstStyle/>
           <a:p>
             <a:r>
-              <a:rPr lang="en-US" sz="1372" b="1" i="1" dirty="0" smtClean="0">
+              <a:rPr lang="en-US" sz="1372" b="1" dirty="0">
+                <a:solidFill>
+                  <a:schemeClr val="accent6"/>
+                </a:solidFill>
+              </a:rPr>
+              <a:t>PROPS</a:t>
+            </a:r>
+          </a:p>
+        </p:txBody>
+      </p:sp>
+      <p:sp>
+        <p:nvSpPr>
+          <p:cNvPr id="25" name="TextBox 24"/>
+          <p:cNvSpPr txBox="1"/>
+          <p:nvPr/>
+        </p:nvSpPr>
+        <p:spPr>
+          <a:xfrm>
+            <a:off x="3562171" y="2587817"/>
+            <a:ext cx="680251" cy="303481"/>
+          </a:xfrm>
+          <a:prstGeom prst="rect">
+            <a:avLst/>
+          </a:prstGeom>
+          <a:noFill/>
+        </p:spPr>
+        <p:txBody>
+          <a:bodyPr wrap="none" rtlCol="0">
+            <a:spAutoFit/>
+          </a:bodyPr>
+          <a:lstStyle/>
+          <a:p>
+            <a:r>
+              <a:rPr lang="en-US" sz="1372" b="1" i="1" dirty="0">
                 <a:solidFill>
                   <a:srgbClr val="FF0000"/>
                 </a:solidFill>
               </a:rPr>
-              <a:t>&lt;dialog&gt;</a:t>
-            </a:r>
-            <a:endParaRPr lang="en-US" sz="1372" b="1" i="1" dirty="0">
-              <a:solidFill>
-                <a:srgbClr val="FF0000"/>
-              </a:solidFill>
-            </a:endParaRPr>
-          </a:p>
-        </p:txBody>
-      </p:sp>
-      <p:sp>
-        <p:nvSpPr>
-          <p:cNvPr id="41" name="Right Arrow 40"/>
+              <a:t>&lt;card&gt;</a:t>
+            </a:r>
+          </a:p>
+        </p:txBody>
+      </p:sp>
+      <p:sp>
+        <p:nvSpPr>
+          <p:cNvPr id="26" name="Right Arrow 25"/>
           <p:cNvSpPr/>
           <p:nvPr/>
         </p:nvSpPr>
         <p:spPr>
-          <a:xfrm>
-            <a:off x="7846423" y="727951"/>
-            <a:ext cx="696809" cy="333683"/>
+          <a:xfrm flipH="1">
+            <a:off x="2387600" y="5000637"/>
+            <a:ext cx="792424" cy="400041"/>
           </a:xfrm>
           <a:prstGeom prst="rightArrow">
             <a:avLst/>
           </a:prstGeom>
           <a:solidFill>
-            <a:srgbClr val="FFFF00"/>
+            <a:srgbClr val="FF0000"/>
           </a:solidFill>
         </p:spPr>
         <p:style>
@@ -4506,14 +6008,14 @@
       </p:sp>
       <p:sp>
         <p:nvSpPr>
-          <p:cNvPr id="42" name="TextBox 41"/>
+          <p:cNvPr id="27" name="TextBox 26"/>
           <p:cNvSpPr txBox="1"/>
           <p:nvPr/>
         </p:nvSpPr>
         <p:spPr>
           <a:xfrm>
-            <a:off x="7837364" y="509852"/>
-            <a:ext cx="838756" cy="303481"/>
+            <a:off x="2523616" y="5336639"/>
+            <a:ext cx="701474" cy="303481"/>
           </a:xfrm>
           <a:prstGeom prst="rect">
             <a:avLst/>
@@ -4527,26 +6029,23 @@
           <a:lstStyle/>
           <a:p>
             <a:r>
-              <a:rPr lang="en-US" sz="1372" b="1" dirty="0">
-                <a:solidFill>
-                  <a:schemeClr val="accent4"/>
-                </a:solidFill>
-              </a:rPr>
-              <a:t>PROVIDE</a:t>
-            </a:r>
-          </a:p>
-        </p:txBody>
-      </p:sp>
-      <p:sp>
-        <p:nvSpPr>
-          <p:cNvPr id="43" name="TextBox 42"/>
+              <a:rPr lang="en-US" sz="1372" dirty="0" err="1"/>
+              <a:t>valided</a:t>
+            </a:r>
+            <a:endParaRPr lang="en-US" sz="1372" dirty="0"/>
+          </a:p>
+        </p:txBody>
+      </p:sp>
+      <p:sp>
+        <p:nvSpPr>
+          <p:cNvPr id="28" name="TextBox 27"/>
           <p:cNvSpPr txBox="1"/>
           <p:nvPr/>
         </p:nvSpPr>
         <p:spPr>
           <a:xfrm>
-            <a:off x="7991050" y="1073307"/>
-            <a:ext cx="926857" cy="303481"/>
+            <a:off x="2574806" y="4621286"/>
+            <a:ext cx="558166" cy="303481"/>
           </a:xfrm>
           <a:prstGeom prst="rect">
             <a:avLst/>
@@ -4560,30 +6059,100 @@
           <a:lstStyle/>
           <a:p>
             <a:r>
-              <a:rPr lang="en-US" sz="1372" dirty="0" smtClean="0"/>
-              <a:t>Students[]</a:t>
-            </a:r>
-            <a:endParaRPr lang="en-US" sz="1372" dirty="0"/>
-          </a:p>
-        </p:txBody>
-      </p:sp>
-      <p:sp>
-        <p:nvSpPr>
-          <p:cNvPr id="44" name="Right Arrow 43"/>
+              <a:rPr lang="en-US" sz="1372" b="1" dirty="0">
+                <a:solidFill>
+                  <a:srgbClr val="FF0000"/>
+                </a:solidFill>
+              </a:rPr>
+              <a:t>EMIT</a:t>
+            </a:r>
+          </a:p>
+        </p:txBody>
+      </p:sp>
+      <p:cxnSp>
+        <p:nvCxnSpPr>
+          <p:cNvPr id="30" name="Straight Connector 29"/>
+          <p:cNvCxnSpPr/>
+          <p:nvPr/>
+        </p:nvCxnSpPr>
+        <p:spPr>
+          <a:xfrm>
+            <a:off x="5733143" y="0"/>
+            <a:ext cx="29028" cy="6858000"/>
+          </a:xfrm>
+          <a:prstGeom prst="line">
+            <a:avLst/>
+          </a:prstGeom>
+        </p:spPr>
+        <p:style>
+          <a:lnRef idx="1">
+            <a:schemeClr val="accent1"/>
+          </a:lnRef>
+          <a:fillRef idx="0">
+            <a:schemeClr val="accent1"/>
+          </a:fillRef>
+          <a:effectRef idx="0">
+            <a:schemeClr val="accent1"/>
+          </a:effectRef>
+          <a:fontRef idx="minor">
+            <a:schemeClr val="tx1"/>
+          </a:fontRef>
+        </p:style>
+      </p:cxnSp>
+      <p:sp>
+        <p:nvSpPr>
+          <p:cNvPr id="31" name="TextBox 30"/>
+          <p:cNvSpPr txBox="1"/>
+          <p:nvPr/>
+        </p:nvSpPr>
+        <p:spPr>
+          <a:xfrm>
+            <a:off x="6720447" y="481416"/>
+            <a:ext cx="639919" cy="303481"/>
+          </a:xfrm>
+          <a:prstGeom prst="rect">
+            <a:avLst/>
+          </a:prstGeom>
+          <a:noFill/>
+        </p:spPr>
+        <p:txBody>
+          <a:bodyPr wrap="none" rtlCol="0">
+            <a:spAutoFit/>
+          </a:bodyPr>
+          <a:lstStyle/>
+          <a:p>
+            <a:r>
+              <a:rPr lang="en-US" sz="1372" b="1" i="1" dirty="0">
+                <a:solidFill>
+                  <a:srgbClr val="FF0000"/>
+                </a:solidFill>
+              </a:rPr>
+              <a:t>&lt;app&gt;</a:t>
+            </a:r>
+          </a:p>
+        </p:txBody>
+      </p:sp>
+      <p:sp>
+        <p:nvSpPr>
+          <p:cNvPr id="32" name="Rounded Rectangle 31"/>
           <p:cNvSpPr/>
           <p:nvPr/>
         </p:nvSpPr>
         <p:spPr>
           <a:xfrm>
-            <a:off x="9135788" y="2542676"/>
-            <a:ext cx="696809" cy="333683"/>
-          </a:xfrm>
-          <a:prstGeom prst="rightArrow">
-            <a:avLst/>
-          </a:prstGeom>
-          <a:solidFill>
-            <a:srgbClr val="FFFF00"/>
-          </a:solidFill>
+            <a:off x="6234390" y="310835"/>
+            <a:ext cx="1650319" cy="1166483"/>
+          </a:xfrm>
+          <a:prstGeom prst="roundRect">
+            <a:avLst/>
+          </a:prstGeom>
+          <a:noFill/>
+          <a:ln>
+            <a:solidFill>
+              <a:srgbClr val="FF0000"/>
+            </a:solidFill>
+            <a:prstDash val="lgDash"/>
+          </a:ln>
         </p:spPr>
         <p:style>
           <a:lnRef idx="2">
@@ -4602,12 +6171,7 @@
           </a:fontRef>
         </p:style>
         <p:txBody>
-          <a:bodyPr rot="0" spcFirstLastPara="0" vertOverflow="overflow" horzOverflow="overflow" vert="horz" wrap="square" lIns="69681" tIns="34840" rIns="69681" bIns="34840" numCol="1" spcCol="0" rtlCol="0" fromWordArt="0" anchor="ctr" anchorCtr="0" forceAA="0" compatLnSpc="1">
-            <a:prstTxWarp prst="textNoShape">
-              <a:avLst/>
-            </a:prstTxWarp>
-            <a:noAutofit/>
-          </a:bodyPr>
+          <a:bodyPr rtlCol="0" anchor="ctr"/>
           <a:lstStyle/>
           <a:p>
             <a:pPr algn="ctr"/>
@@ -4617,14 +6181,14 @@
       </p:sp>
       <p:sp>
         <p:nvSpPr>
-          <p:cNvPr id="45" name="TextBox 44"/>
+          <p:cNvPr id="33" name="TextBox 32"/>
           <p:cNvSpPr txBox="1"/>
           <p:nvPr/>
         </p:nvSpPr>
         <p:spPr>
           <a:xfrm>
-            <a:off x="9126729" y="2324577"/>
-            <a:ext cx="668645" cy="303481"/>
+            <a:off x="6596120" y="894076"/>
+            <a:ext cx="926857" cy="303481"/>
           </a:xfrm>
           <a:prstGeom prst="rect">
             <a:avLst/>
@@ -4638,31 +6202,22 @@
           <a:lstStyle/>
           <a:p>
             <a:r>
-              <a:rPr lang="en-US" sz="1372" b="1" dirty="0" smtClean="0">
-                <a:solidFill>
-                  <a:schemeClr val="accent4"/>
-                </a:solidFill>
-              </a:rPr>
-              <a:t>INJECT</a:t>
-            </a:r>
-            <a:endParaRPr lang="en-US" sz="1372" b="1" dirty="0">
-              <a:solidFill>
-                <a:schemeClr val="accent4"/>
-              </a:solidFill>
-            </a:endParaRPr>
-          </a:p>
-        </p:txBody>
-      </p:sp>
-      <p:sp>
-        <p:nvSpPr>
-          <p:cNvPr id="46" name="TextBox 45"/>
+              <a:rPr lang="en-US" sz="1372" dirty="0"/>
+              <a:t>Students[]</a:t>
+            </a:r>
+          </a:p>
+        </p:txBody>
+      </p:sp>
+      <p:sp>
+        <p:nvSpPr>
+          <p:cNvPr id="34" name="TextBox 33"/>
           <p:cNvSpPr txBox="1"/>
           <p:nvPr/>
         </p:nvSpPr>
         <p:spPr>
           <a:xfrm>
-            <a:off x="9280415" y="2888032"/>
-            <a:ext cx="926857" cy="303481"/>
+            <a:off x="6234390" y="1613780"/>
+            <a:ext cx="2858411" cy="303481"/>
           </a:xfrm>
           <a:prstGeom prst="rect">
             <a:avLst/>
@@ -4676,50 +6231,20 @@
           <a:lstStyle/>
           <a:p>
             <a:r>
-              <a:rPr lang="en-US" sz="1372" dirty="0" smtClean="0"/>
-              <a:t>Students[]</a:t>
-            </a:r>
-            <a:endParaRPr lang="en-US" sz="1372" dirty="0"/>
-          </a:p>
-        </p:txBody>
-      </p:sp>
-      <p:sp>
-        <p:nvSpPr>
-          <p:cNvPr id="47" name="TextBox 46"/>
-          <p:cNvSpPr txBox="1"/>
-          <p:nvPr/>
-        </p:nvSpPr>
-        <p:spPr>
-          <a:xfrm>
-            <a:off x="8917907" y="3423528"/>
-            <a:ext cx="2987100" cy="303481"/>
-          </a:xfrm>
-          <a:prstGeom prst="rect">
-            <a:avLst/>
-          </a:prstGeom>
-          <a:noFill/>
-        </p:spPr>
-        <p:txBody>
-          <a:bodyPr wrap="none" rtlCol="0">
-            <a:spAutoFit/>
-          </a:bodyPr>
-          <a:lstStyle/>
-          <a:p>
-            <a:r>
-              <a:rPr lang="en-US" sz="1372" dirty="0" smtClean="0"/>
+              <a:rPr lang="en-US" sz="1372" dirty="0"/>
               <a:t>// </a:t>
             </a:r>
             <a:r>
-              <a:rPr lang="en-US" sz="1372" dirty="0" smtClean="0">
+              <a:rPr lang="en-US" sz="1372" dirty="0">
                 <a:solidFill>
                   <a:srgbClr val="FF0000"/>
                 </a:solidFill>
               </a:rPr>
-              <a:t>dialog </a:t>
-            </a:r>
-            <a:r>
-              <a:rPr lang="en-US" sz="1372" dirty="0" smtClean="0"/>
-              <a:t> gets students from a provider</a:t>
+              <a:t>app</a:t>
+            </a:r>
+            <a:r>
+              <a:rPr lang="en-US" sz="1372" dirty="0"/>
+              <a:t>  provides students to anymore</a:t>
             </a:r>
             <a:endParaRPr lang="en-US" sz="1372" dirty="0">
               <a:solidFill>
@@ -4731,47 +6256,14 @@
       </p:sp>
       <p:sp>
         <p:nvSpPr>
-          <p:cNvPr id="48" name="TextBox 47"/>
-          <p:cNvSpPr txBox="1"/>
-          <p:nvPr/>
-        </p:nvSpPr>
-        <p:spPr>
-          <a:xfrm>
-            <a:off x="6561502" y="4305380"/>
-            <a:ext cx="1215717" cy="303481"/>
-          </a:xfrm>
-          <a:prstGeom prst="rect">
-            <a:avLst/>
-          </a:prstGeom>
-          <a:noFill/>
-        </p:spPr>
-        <p:txBody>
-          <a:bodyPr wrap="none" rtlCol="0">
-            <a:spAutoFit/>
-          </a:bodyPr>
-          <a:lstStyle/>
-          <a:p>
-            <a:r>
-              <a:rPr lang="en-US" sz="1372" b="1" i="1" dirty="0">
-                <a:solidFill>
-                  <a:srgbClr val="7030A0"/>
-                </a:solidFill>
-              </a:rPr>
-              <a:t>&lt;router-view&gt;</a:t>
-            </a:r>
-          </a:p>
-        </p:txBody>
-      </p:sp>
-      <p:sp>
-        <p:nvSpPr>
-          <p:cNvPr id="49" name="Rounded Rectangle 48"/>
+          <p:cNvPr id="35" name="Rounded Rectangle 34"/>
           <p:cNvSpPr/>
           <p:nvPr/>
         </p:nvSpPr>
         <p:spPr>
           <a:xfrm>
-            <a:off x="6217868" y="4170157"/>
-            <a:ext cx="1866945" cy="584334"/>
+            <a:off x="9792269" y="2129025"/>
+            <a:ext cx="1650319" cy="1166483"/>
           </a:xfrm>
           <a:prstGeom prst="roundRect">
             <a:avLst/>
@@ -4779,7 +6271,7 @@
           <a:noFill/>
           <a:ln>
             <a:solidFill>
-              <a:srgbClr val="7030A0"/>
+              <a:srgbClr val="FF0000"/>
             </a:solidFill>
             <a:prstDash val="lgDash"/>
           </a:ln>
@@ -4811,14 +6303,14 @@
       </p:sp>
       <p:sp>
         <p:nvSpPr>
-          <p:cNvPr id="50" name="TextBox 49"/>
+          <p:cNvPr id="36" name="TextBox 35"/>
           <p:cNvSpPr txBox="1"/>
           <p:nvPr/>
         </p:nvSpPr>
         <p:spPr>
           <a:xfrm>
-            <a:off x="8256742" y="4317805"/>
-            <a:ext cx="2229136" cy="303481"/>
+            <a:off x="10153999" y="2712266"/>
+            <a:ext cx="926857" cy="303481"/>
           </a:xfrm>
           <a:prstGeom prst="rect">
             <a:avLst/>
@@ -4832,15 +6324,423 @@
           <a:lstStyle/>
           <a:p>
             <a:r>
-              <a:rPr lang="en-US" sz="1372" dirty="0" smtClean="0"/>
+              <a:rPr lang="en-US" sz="1372" dirty="0"/>
+              <a:t>Students[]</a:t>
+            </a:r>
+          </a:p>
+        </p:txBody>
+      </p:sp>
+      <p:sp>
+        <p:nvSpPr>
+          <p:cNvPr id="40" name="TextBox 39"/>
+          <p:cNvSpPr txBox="1"/>
+          <p:nvPr/>
+        </p:nvSpPr>
+        <p:spPr>
+          <a:xfrm>
+            <a:off x="10297467" y="2308056"/>
+            <a:ext cx="819455" cy="303481"/>
+          </a:xfrm>
+          <a:prstGeom prst="rect">
+            <a:avLst/>
+          </a:prstGeom>
+          <a:noFill/>
+        </p:spPr>
+        <p:txBody>
+          <a:bodyPr wrap="none" rtlCol="0">
+            <a:spAutoFit/>
+          </a:bodyPr>
+          <a:lstStyle/>
+          <a:p>
+            <a:r>
+              <a:rPr lang="en-US" sz="1372" b="1" i="1" dirty="0">
+                <a:solidFill>
+                  <a:srgbClr val="FF0000"/>
+                </a:solidFill>
+              </a:rPr>
+              <a:t>&lt;dialog&gt;</a:t>
+            </a:r>
+          </a:p>
+        </p:txBody>
+      </p:sp>
+      <p:sp>
+        <p:nvSpPr>
+          <p:cNvPr id="41" name="Right Arrow 40"/>
+          <p:cNvSpPr/>
+          <p:nvPr/>
+        </p:nvSpPr>
+        <p:spPr>
+          <a:xfrm>
+            <a:off x="7846423" y="727951"/>
+            <a:ext cx="696809" cy="333683"/>
+          </a:xfrm>
+          <a:prstGeom prst="rightArrow">
+            <a:avLst/>
+          </a:prstGeom>
+          <a:solidFill>
+            <a:srgbClr val="FFFF00"/>
+          </a:solidFill>
+        </p:spPr>
+        <p:style>
+          <a:lnRef idx="2">
+            <a:schemeClr val="accent1">
+              <a:shade val="50000"/>
+            </a:schemeClr>
+          </a:lnRef>
+          <a:fillRef idx="1">
+            <a:schemeClr val="accent1"/>
+          </a:fillRef>
+          <a:effectRef idx="0">
+            <a:schemeClr val="accent1"/>
+          </a:effectRef>
+          <a:fontRef idx="minor">
+            <a:schemeClr val="lt1"/>
+          </a:fontRef>
+        </p:style>
+        <p:txBody>
+          <a:bodyPr rot="0" spcFirstLastPara="0" vertOverflow="overflow" horzOverflow="overflow" vert="horz" wrap="square" lIns="69681" tIns="34840" rIns="69681" bIns="34840" numCol="1" spcCol="0" rtlCol="0" fromWordArt="0" anchor="ctr" anchorCtr="0" forceAA="0" compatLnSpc="1">
+            <a:prstTxWarp prst="textNoShape">
+              <a:avLst/>
+            </a:prstTxWarp>
+            <a:noAutofit/>
+          </a:bodyPr>
+          <a:lstStyle/>
+          <a:p>
+            <a:pPr algn="ctr"/>
+            <a:endParaRPr lang="en-US" sz="1372"/>
+          </a:p>
+        </p:txBody>
+      </p:sp>
+      <p:sp>
+        <p:nvSpPr>
+          <p:cNvPr id="42" name="TextBox 41"/>
+          <p:cNvSpPr txBox="1"/>
+          <p:nvPr/>
+        </p:nvSpPr>
+        <p:spPr>
+          <a:xfrm>
+            <a:off x="7837364" y="509852"/>
+            <a:ext cx="838756" cy="303481"/>
+          </a:xfrm>
+          <a:prstGeom prst="rect">
+            <a:avLst/>
+          </a:prstGeom>
+          <a:noFill/>
+        </p:spPr>
+        <p:txBody>
+          <a:bodyPr wrap="none" rtlCol="0">
+            <a:spAutoFit/>
+          </a:bodyPr>
+          <a:lstStyle/>
+          <a:p>
+            <a:r>
+              <a:rPr lang="en-US" sz="1372" b="1" dirty="0">
+                <a:solidFill>
+                  <a:schemeClr val="accent4"/>
+                </a:solidFill>
+              </a:rPr>
+              <a:t>PROVIDE</a:t>
+            </a:r>
+          </a:p>
+        </p:txBody>
+      </p:sp>
+      <p:sp>
+        <p:nvSpPr>
+          <p:cNvPr id="43" name="TextBox 42"/>
+          <p:cNvSpPr txBox="1"/>
+          <p:nvPr/>
+        </p:nvSpPr>
+        <p:spPr>
+          <a:xfrm>
+            <a:off x="7991050" y="1073307"/>
+            <a:ext cx="926857" cy="303481"/>
+          </a:xfrm>
+          <a:prstGeom prst="rect">
+            <a:avLst/>
+          </a:prstGeom>
+          <a:noFill/>
+        </p:spPr>
+        <p:txBody>
+          <a:bodyPr wrap="none" rtlCol="0">
+            <a:spAutoFit/>
+          </a:bodyPr>
+          <a:lstStyle/>
+          <a:p>
+            <a:r>
+              <a:rPr lang="en-US" sz="1372" dirty="0"/>
+              <a:t>Students[]</a:t>
+            </a:r>
+          </a:p>
+        </p:txBody>
+      </p:sp>
+      <p:sp>
+        <p:nvSpPr>
+          <p:cNvPr id="44" name="Right Arrow 43"/>
+          <p:cNvSpPr/>
+          <p:nvPr/>
+        </p:nvSpPr>
+        <p:spPr>
+          <a:xfrm>
+            <a:off x="9135788" y="2542676"/>
+            <a:ext cx="696809" cy="333683"/>
+          </a:xfrm>
+          <a:prstGeom prst="rightArrow">
+            <a:avLst/>
+          </a:prstGeom>
+          <a:solidFill>
+            <a:srgbClr val="FFFF00"/>
+          </a:solidFill>
+        </p:spPr>
+        <p:style>
+          <a:lnRef idx="2">
+            <a:schemeClr val="accent1">
+              <a:shade val="50000"/>
+            </a:schemeClr>
+          </a:lnRef>
+          <a:fillRef idx="1">
+            <a:schemeClr val="accent1"/>
+          </a:fillRef>
+          <a:effectRef idx="0">
+            <a:schemeClr val="accent1"/>
+          </a:effectRef>
+          <a:fontRef idx="minor">
+            <a:schemeClr val="lt1"/>
+          </a:fontRef>
+        </p:style>
+        <p:txBody>
+          <a:bodyPr rot="0" spcFirstLastPara="0" vertOverflow="overflow" horzOverflow="overflow" vert="horz" wrap="square" lIns="69681" tIns="34840" rIns="69681" bIns="34840" numCol="1" spcCol="0" rtlCol="0" fromWordArt="0" anchor="ctr" anchorCtr="0" forceAA="0" compatLnSpc="1">
+            <a:prstTxWarp prst="textNoShape">
+              <a:avLst/>
+            </a:prstTxWarp>
+            <a:noAutofit/>
+          </a:bodyPr>
+          <a:lstStyle/>
+          <a:p>
+            <a:pPr algn="ctr"/>
+            <a:endParaRPr lang="en-US" sz="1372"/>
+          </a:p>
+        </p:txBody>
+      </p:sp>
+      <p:sp>
+        <p:nvSpPr>
+          <p:cNvPr id="45" name="TextBox 44"/>
+          <p:cNvSpPr txBox="1"/>
+          <p:nvPr/>
+        </p:nvSpPr>
+        <p:spPr>
+          <a:xfrm>
+            <a:off x="9126729" y="2324577"/>
+            <a:ext cx="668645" cy="303481"/>
+          </a:xfrm>
+          <a:prstGeom prst="rect">
+            <a:avLst/>
+          </a:prstGeom>
+          <a:noFill/>
+        </p:spPr>
+        <p:txBody>
+          <a:bodyPr wrap="none" rtlCol="0">
+            <a:spAutoFit/>
+          </a:bodyPr>
+          <a:lstStyle/>
+          <a:p>
+            <a:r>
+              <a:rPr lang="en-US" sz="1372" b="1" dirty="0">
+                <a:solidFill>
+                  <a:schemeClr val="accent4"/>
+                </a:solidFill>
+              </a:rPr>
+              <a:t>INJECT</a:t>
+            </a:r>
+          </a:p>
+        </p:txBody>
+      </p:sp>
+      <p:sp>
+        <p:nvSpPr>
+          <p:cNvPr id="46" name="TextBox 45"/>
+          <p:cNvSpPr txBox="1"/>
+          <p:nvPr/>
+        </p:nvSpPr>
+        <p:spPr>
+          <a:xfrm>
+            <a:off x="9280415" y="2888032"/>
+            <a:ext cx="926857" cy="303481"/>
+          </a:xfrm>
+          <a:prstGeom prst="rect">
+            <a:avLst/>
+          </a:prstGeom>
+          <a:noFill/>
+        </p:spPr>
+        <p:txBody>
+          <a:bodyPr wrap="none" rtlCol="0">
+            <a:spAutoFit/>
+          </a:bodyPr>
+          <a:lstStyle/>
+          <a:p>
+            <a:r>
+              <a:rPr lang="en-US" sz="1372" dirty="0"/>
+              <a:t>Students[]</a:t>
+            </a:r>
+          </a:p>
+        </p:txBody>
+      </p:sp>
+      <p:sp>
+        <p:nvSpPr>
+          <p:cNvPr id="47" name="TextBox 46"/>
+          <p:cNvSpPr txBox="1"/>
+          <p:nvPr/>
+        </p:nvSpPr>
+        <p:spPr>
+          <a:xfrm>
+            <a:off x="8917907" y="3423528"/>
+            <a:ext cx="2987100" cy="303481"/>
+          </a:xfrm>
+          <a:prstGeom prst="rect">
+            <a:avLst/>
+          </a:prstGeom>
+          <a:noFill/>
+        </p:spPr>
+        <p:txBody>
+          <a:bodyPr wrap="none" rtlCol="0">
+            <a:spAutoFit/>
+          </a:bodyPr>
+          <a:lstStyle/>
+          <a:p>
+            <a:r>
+              <a:rPr lang="en-US" sz="1372" dirty="0"/>
               <a:t>// </a:t>
             </a:r>
             <a:r>
-              <a:rPr lang="en-US" sz="1372" dirty="0" err="1" smtClean="0"/>
+              <a:rPr lang="en-US" sz="1372" dirty="0">
+                <a:solidFill>
+                  <a:srgbClr val="FF0000"/>
+                </a:solidFill>
+              </a:rPr>
+              <a:t>dialog </a:t>
+            </a:r>
+            <a:r>
+              <a:rPr lang="en-US" sz="1372" dirty="0"/>
+              <a:t> gets students from a provider</a:t>
+            </a:r>
+            <a:endParaRPr lang="en-US" sz="1372" dirty="0">
+              <a:solidFill>
+                <a:srgbClr val="FF0000"/>
+              </a:solidFill>
+            </a:endParaRPr>
+          </a:p>
+        </p:txBody>
+      </p:sp>
+      <p:sp>
+        <p:nvSpPr>
+          <p:cNvPr id="48" name="TextBox 47"/>
+          <p:cNvSpPr txBox="1"/>
+          <p:nvPr/>
+        </p:nvSpPr>
+        <p:spPr>
+          <a:xfrm>
+            <a:off x="6561502" y="4305380"/>
+            <a:ext cx="1215717" cy="303481"/>
+          </a:xfrm>
+          <a:prstGeom prst="rect">
+            <a:avLst/>
+          </a:prstGeom>
+          <a:noFill/>
+        </p:spPr>
+        <p:txBody>
+          <a:bodyPr wrap="none" rtlCol="0">
+            <a:spAutoFit/>
+          </a:bodyPr>
+          <a:lstStyle/>
+          <a:p>
+            <a:r>
+              <a:rPr lang="en-US" sz="1372" b="1" i="1" dirty="0">
+                <a:solidFill>
+                  <a:srgbClr val="7030A0"/>
+                </a:solidFill>
+              </a:rPr>
+              <a:t>&lt;router-view&gt;</a:t>
+            </a:r>
+          </a:p>
+        </p:txBody>
+      </p:sp>
+      <p:sp>
+        <p:nvSpPr>
+          <p:cNvPr id="49" name="Rounded Rectangle 48"/>
+          <p:cNvSpPr/>
+          <p:nvPr/>
+        </p:nvSpPr>
+        <p:spPr>
+          <a:xfrm>
+            <a:off x="6217868" y="4170157"/>
+            <a:ext cx="1866945" cy="584334"/>
+          </a:xfrm>
+          <a:prstGeom prst="roundRect">
+            <a:avLst/>
+          </a:prstGeom>
+          <a:noFill/>
+          <a:ln>
+            <a:solidFill>
+              <a:srgbClr val="7030A0"/>
+            </a:solidFill>
+            <a:prstDash val="lgDash"/>
+          </a:ln>
+        </p:spPr>
+        <p:style>
+          <a:lnRef idx="2">
+            <a:schemeClr val="accent1">
+              <a:shade val="50000"/>
+            </a:schemeClr>
+          </a:lnRef>
+          <a:fillRef idx="1">
+            <a:schemeClr val="accent1"/>
+          </a:fillRef>
+          <a:effectRef idx="0">
+            <a:schemeClr val="accent1"/>
+          </a:effectRef>
+          <a:fontRef idx="minor">
+            <a:schemeClr val="lt1"/>
+          </a:fontRef>
+        </p:style>
+        <p:txBody>
+          <a:bodyPr rtlCol="0" anchor="ctr"/>
+          <a:lstStyle/>
+          <a:p>
+            <a:pPr algn="ctr"/>
+            <a:endParaRPr lang="en-US" sz="1372"/>
+          </a:p>
+        </p:txBody>
+      </p:sp>
+      <p:sp>
+        <p:nvSpPr>
+          <p:cNvPr id="50" name="TextBox 49"/>
+          <p:cNvSpPr txBox="1"/>
+          <p:nvPr/>
+        </p:nvSpPr>
+        <p:spPr>
+          <a:xfrm>
+            <a:off x="8256742" y="4317805"/>
+            <a:ext cx="2229136" cy="303481"/>
+          </a:xfrm>
+          <a:prstGeom prst="rect">
+            <a:avLst/>
+          </a:prstGeom>
+          <a:noFill/>
+        </p:spPr>
+        <p:txBody>
+          <a:bodyPr wrap="none" rtlCol="0">
+            <a:spAutoFit/>
+          </a:bodyPr>
+          <a:lstStyle/>
+          <a:p>
+            <a:r>
+              <a:rPr lang="en-US" sz="1372" dirty="0"/>
+              <a:t>// </a:t>
+            </a:r>
+            <a:r>
+              <a:rPr lang="en-US" sz="1372" dirty="0" err="1"/>
               <a:t>Vue</a:t>
             </a:r>
             <a:r>
-              <a:rPr lang="en-US" sz="1372" dirty="0" smtClean="0"/>
+              <a:rPr lang="en-US" sz="1372" dirty="0"/>
               <a:t> JS built-in component</a:t>
             </a:r>
             <a:endParaRPr lang="en-US" sz="1372" dirty="0">

</xml_diff>

<commit_message>
#17 Update component diagram
</commit_message>
<xml_diff>
--- a/docs/COMPONENT-DIAGRAM.pptx
+++ b/docs/COMPONENT-DIAGRAM.pptx
@@ -7,6 +7,7 @@
   <p:sldIdLst>
     <p:sldId id="256" r:id="rId2"/>
     <p:sldId id="258" r:id="rId3"/>
+    <p:sldId id="259" r:id="rId4"/>
   </p:sldIdLst>
   <p:sldSz cx="12192000" cy="6858000"/>
   <p:notesSz cx="6858000" cy="9144000"/>
@@ -105,6 +106,11 @@
       </a:defRPr>
     </a:lvl9pPr>
   </p:defaultTextStyle>
+  <p:extLst>
+    <p:ext uri="{EFAFB233-063F-42B5-8137-9DF3F51BA10A}">
+      <p15:sldGuideLst xmlns:p15="http://schemas.microsoft.com/office/powerpoint/2012/main"/>
+    </p:ext>
+  </p:extLst>
 </p:presentation>
 </file>
 
@@ -150,10 +156,9 @@
           </a:lstStyle>
           <a:p>
             <a:r>
-              <a:rPr lang="en-US" smtClean="0"/>
+              <a:rPr lang="en-US"/>
               <a:t>Click to edit Master title style</a:t>
             </a:r>
-            <a:endParaRPr lang="en-US"/>
           </a:p>
         </p:txBody>
       </p:sp>
@@ -215,10 +220,9 @@
           </a:lstStyle>
           <a:p>
             <a:r>
-              <a:rPr lang="en-US" smtClean="0"/>
+              <a:rPr lang="en-US"/>
               <a:t>Click to edit Master subtitle style</a:t>
             </a:r>
-            <a:endParaRPr lang="en-US"/>
           </a:p>
         </p:txBody>
       </p:sp>
@@ -239,7 +243,7 @@
           <a:p>
             <a:fld id="{28BE630F-C39C-4DB9-8258-0B48CA067079}" type="datetimeFigureOut">
               <a:rPr lang="en-US" smtClean="0"/>
-              <a:t>11/25/2021</a:t>
+              <a:t>12/1/2021</a:t>
             </a:fld>
             <a:endParaRPr lang="en-US"/>
           </a:p>
@@ -333,10 +337,9 @@
           <a:lstStyle/>
           <a:p>
             <a:r>
-              <a:rPr lang="en-US" smtClean="0"/>
+              <a:rPr lang="en-US"/>
               <a:t>Click to edit Master title style</a:t>
             </a:r>
-            <a:endParaRPr lang="en-US"/>
           </a:p>
         </p:txBody>
       </p:sp>
@@ -357,38 +360,37 @@
           <a:p>
             <a:pPr lvl="0"/>
             <a:r>
-              <a:rPr lang="en-US" smtClean="0"/>
+              <a:rPr lang="en-US"/>
               <a:t>Click to edit Master text styles</a:t>
             </a:r>
           </a:p>
           <a:p>
             <a:pPr lvl="1"/>
             <a:r>
-              <a:rPr lang="en-US" smtClean="0"/>
+              <a:rPr lang="en-US"/>
               <a:t>Second level</a:t>
             </a:r>
           </a:p>
           <a:p>
             <a:pPr lvl="2"/>
             <a:r>
-              <a:rPr lang="en-US" smtClean="0"/>
+              <a:rPr lang="en-US"/>
               <a:t>Third level</a:t>
             </a:r>
           </a:p>
           <a:p>
             <a:pPr lvl="3"/>
             <a:r>
-              <a:rPr lang="en-US" smtClean="0"/>
+              <a:rPr lang="en-US"/>
               <a:t>Fourth level</a:t>
             </a:r>
           </a:p>
           <a:p>
             <a:pPr lvl="4"/>
             <a:r>
-              <a:rPr lang="en-US" smtClean="0"/>
+              <a:rPr lang="en-US"/>
               <a:t>Fifth level</a:t>
             </a:r>
-            <a:endParaRPr lang="en-US"/>
           </a:p>
         </p:txBody>
       </p:sp>
@@ -409,7 +411,7 @@
           <a:p>
             <a:fld id="{28BE630F-C39C-4DB9-8258-0B48CA067079}" type="datetimeFigureOut">
               <a:rPr lang="en-US" smtClean="0"/>
-              <a:t>11/25/2021</a:t>
+              <a:t>12/1/2021</a:t>
             </a:fld>
             <a:endParaRPr lang="en-US"/>
           </a:p>
@@ -508,10 +510,9 @@
           <a:lstStyle/>
           <a:p>
             <a:r>
-              <a:rPr lang="en-US" smtClean="0"/>
+              <a:rPr lang="en-US"/>
               <a:t>Click to edit Master title style</a:t>
             </a:r>
-            <a:endParaRPr lang="en-US"/>
           </a:p>
         </p:txBody>
       </p:sp>
@@ -537,38 +538,37 @@
           <a:p>
             <a:pPr lvl="0"/>
             <a:r>
-              <a:rPr lang="en-US" smtClean="0"/>
+              <a:rPr lang="en-US"/>
               <a:t>Click to edit Master text styles</a:t>
             </a:r>
           </a:p>
           <a:p>
             <a:pPr lvl="1"/>
             <a:r>
-              <a:rPr lang="en-US" smtClean="0"/>
+              <a:rPr lang="en-US"/>
               <a:t>Second level</a:t>
             </a:r>
           </a:p>
           <a:p>
             <a:pPr lvl="2"/>
             <a:r>
-              <a:rPr lang="en-US" smtClean="0"/>
+              <a:rPr lang="en-US"/>
               <a:t>Third level</a:t>
             </a:r>
           </a:p>
           <a:p>
             <a:pPr lvl="3"/>
             <a:r>
-              <a:rPr lang="en-US" smtClean="0"/>
+              <a:rPr lang="en-US"/>
               <a:t>Fourth level</a:t>
             </a:r>
           </a:p>
           <a:p>
             <a:pPr lvl="4"/>
             <a:r>
-              <a:rPr lang="en-US" smtClean="0"/>
+              <a:rPr lang="en-US"/>
               <a:t>Fifth level</a:t>
             </a:r>
-            <a:endParaRPr lang="en-US"/>
           </a:p>
         </p:txBody>
       </p:sp>
@@ -589,7 +589,7 @@
           <a:p>
             <a:fld id="{28BE630F-C39C-4DB9-8258-0B48CA067079}" type="datetimeFigureOut">
               <a:rPr lang="en-US" smtClean="0"/>
-              <a:t>11/25/2021</a:t>
+              <a:t>12/1/2021</a:t>
             </a:fld>
             <a:endParaRPr lang="en-US"/>
           </a:p>
@@ -683,10 +683,9 @@
           <a:lstStyle/>
           <a:p>
             <a:r>
-              <a:rPr lang="en-US" smtClean="0"/>
+              <a:rPr lang="en-US"/>
               <a:t>Click to edit Master title style</a:t>
             </a:r>
-            <a:endParaRPr lang="en-US"/>
           </a:p>
         </p:txBody>
       </p:sp>
@@ -707,38 +706,37 @@
           <a:p>
             <a:pPr lvl="0"/>
             <a:r>
-              <a:rPr lang="en-US" smtClean="0"/>
+              <a:rPr lang="en-US"/>
               <a:t>Click to edit Master text styles</a:t>
             </a:r>
           </a:p>
           <a:p>
             <a:pPr lvl="1"/>
             <a:r>
-              <a:rPr lang="en-US" smtClean="0"/>
+              <a:rPr lang="en-US"/>
               <a:t>Second level</a:t>
             </a:r>
           </a:p>
           <a:p>
             <a:pPr lvl="2"/>
             <a:r>
-              <a:rPr lang="en-US" smtClean="0"/>
+              <a:rPr lang="en-US"/>
               <a:t>Third level</a:t>
             </a:r>
           </a:p>
           <a:p>
             <a:pPr lvl="3"/>
             <a:r>
-              <a:rPr lang="en-US" smtClean="0"/>
+              <a:rPr lang="en-US"/>
               <a:t>Fourth level</a:t>
             </a:r>
           </a:p>
           <a:p>
             <a:pPr lvl="4"/>
             <a:r>
-              <a:rPr lang="en-US" smtClean="0"/>
+              <a:rPr lang="en-US"/>
               <a:t>Fifth level</a:t>
             </a:r>
-            <a:endParaRPr lang="en-US"/>
           </a:p>
         </p:txBody>
       </p:sp>
@@ -759,7 +757,7 @@
           <a:p>
             <a:fld id="{28BE630F-C39C-4DB9-8258-0B48CA067079}" type="datetimeFigureOut">
               <a:rPr lang="en-US" smtClean="0"/>
-              <a:t>11/25/2021</a:t>
+              <a:t>12/1/2021</a:t>
             </a:fld>
             <a:endParaRPr lang="en-US"/>
           </a:p>
@@ -862,10 +860,9 @@
           </a:lstStyle>
           <a:p>
             <a:r>
-              <a:rPr lang="en-US" smtClean="0"/>
+              <a:rPr lang="en-US"/>
               <a:t>Click to edit Master title style</a:t>
             </a:r>
-            <a:endParaRPr lang="en-US"/>
           </a:p>
         </p:txBody>
       </p:sp>
@@ -982,7 +979,7 @@
           <a:p>
             <a:pPr lvl="0"/>
             <a:r>
-              <a:rPr lang="en-US" smtClean="0"/>
+              <a:rPr lang="en-US"/>
               <a:t>Click to edit Master text styles</a:t>
             </a:r>
           </a:p>
@@ -1005,7 +1002,7 @@
           <a:p>
             <a:fld id="{28BE630F-C39C-4DB9-8258-0B48CA067079}" type="datetimeFigureOut">
               <a:rPr lang="en-US" smtClean="0"/>
-              <a:t>11/25/2021</a:t>
+              <a:t>12/1/2021</a:t>
             </a:fld>
             <a:endParaRPr lang="en-US"/>
           </a:p>
@@ -1099,10 +1096,9 @@
           <a:lstStyle/>
           <a:p>
             <a:r>
-              <a:rPr lang="en-US" smtClean="0"/>
+              <a:rPr lang="en-US"/>
               <a:t>Click to edit Master title style</a:t>
             </a:r>
-            <a:endParaRPr lang="en-US"/>
           </a:p>
         </p:txBody>
       </p:sp>
@@ -1128,38 +1124,37 @@
           <a:p>
             <a:pPr lvl="0"/>
             <a:r>
-              <a:rPr lang="en-US" smtClean="0"/>
+              <a:rPr lang="en-US"/>
               <a:t>Click to edit Master text styles</a:t>
             </a:r>
           </a:p>
           <a:p>
             <a:pPr lvl="1"/>
             <a:r>
-              <a:rPr lang="en-US" smtClean="0"/>
+              <a:rPr lang="en-US"/>
               <a:t>Second level</a:t>
             </a:r>
           </a:p>
           <a:p>
             <a:pPr lvl="2"/>
             <a:r>
-              <a:rPr lang="en-US" smtClean="0"/>
+              <a:rPr lang="en-US"/>
               <a:t>Third level</a:t>
             </a:r>
           </a:p>
           <a:p>
             <a:pPr lvl="3"/>
             <a:r>
-              <a:rPr lang="en-US" smtClean="0"/>
+              <a:rPr lang="en-US"/>
               <a:t>Fourth level</a:t>
             </a:r>
           </a:p>
           <a:p>
             <a:pPr lvl="4"/>
             <a:r>
-              <a:rPr lang="en-US" smtClean="0"/>
+              <a:rPr lang="en-US"/>
               <a:t>Fifth level</a:t>
             </a:r>
-            <a:endParaRPr lang="en-US"/>
           </a:p>
         </p:txBody>
       </p:sp>
@@ -1185,38 +1180,37 @@
           <a:p>
             <a:pPr lvl="0"/>
             <a:r>
-              <a:rPr lang="en-US" smtClean="0"/>
+              <a:rPr lang="en-US"/>
               <a:t>Click to edit Master text styles</a:t>
             </a:r>
           </a:p>
           <a:p>
             <a:pPr lvl="1"/>
             <a:r>
-              <a:rPr lang="en-US" smtClean="0"/>
+              <a:rPr lang="en-US"/>
               <a:t>Second level</a:t>
             </a:r>
           </a:p>
           <a:p>
             <a:pPr lvl="2"/>
             <a:r>
-              <a:rPr lang="en-US" smtClean="0"/>
+              <a:rPr lang="en-US"/>
               <a:t>Third level</a:t>
             </a:r>
           </a:p>
           <a:p>
             <a:pPr lvl="3"/>
             <a:r>
-              <a:rPr lang="en-US" smtClean="0"/>
+              <a:rPr lang="en-US"/>
               <a:t>Fourth level</a:t>
             </a:r>
           </a:p>
           <a:p>
             <a:pPr lvl="4"/>
             <a:r>
-              <a:rPr lang="en-US" smtClean="0"/>
+              <a:rPr lang="en-US"/>
               <a:t>Fifth level</a:t>
             </a:r>
-            <a:endParaRPr lang="en-US"/>
           </a:p>
         </p:txBody>
       </p:sp>
@@ -1237,7 +1231,7 @@
           <a:p>
             <a:fld id="{28BE630F-C39C-4DB9-8258-0B48CA067079}" type="datetimeFigureOut">
               <a:rPr lang="en-US" smtClean="0"/>
-              <a:t>11/25/2021</a:t>
+              <a:t>12/1/2021</a:t>
             </a:fld>
             <a:endParaRPr lang="en-US"/>
           </a:p>
@@ -1336,10 +1330,9 @@
           <a:lstStyle/>
           <a:p>
             <a:r>
-              <a:rPr lang="en-US" smtClean="0"/>
+              <a:rPr lang="en-US"/>
               <a:t>Click to edit Master title style</a:t>
             </a:r>
-            <a:endParaRPr lang="en-US"/>
           </a:p>
         </p:txBody>
       </p:sp>
@@ -1402,7 +1395,7 @@
           <a:p>
             <a:pPr lvl="0"/>
             <a:r>
-              <a:rPr lang="en-US" smtClean="0"/>
+              <a:rPr lang="en-US"/>
               <a:t>Click to edit Master text styles</a:t>
             </a:r>
           </a:p>
@@ -1430,38 +1423,37 @@
           <a:p>
             <a:pPr lvl="0"/>
             <a:r>
-              <a:rPr lang="en-US" smtClean="0"/>
+              <a:rPr lang="en-US"/>
               <a:t>Click to edit Master text styles</a:t>
             </a:r>
           </a:p>
           <a:p>
             <a:pPr lvl="1"/>
             <a:r>
-              <a:rPr lang="en-US" smtClean="0"/>
+              <a:rPr lang="en-US"/>
               <a:t>Second level</a:t>
             </a:r>
           </a:p>
           <a:p>
             <a:pPr lvl="2"/>
             <a:r>
-              <a:rPr lang="en-US" smtClean="0"/>
+              <a:rPr lang="en-US"/>
               <a:t>Third level</a:t>
             </a:r>
           </a:p>
           <a:p>
             <a:pPr lvl="3"/>
             <a:r>
-              <a:rPr lang="en-US" smtClean="0"/>
+              <a:rPr lang="en-US"/>
               <a:t>Fourth level</a:t>
             </a:r>
           </a:p>
           <a:p>
             <a:pPr lvl="4"/>
             <a:r>
-              <a:rPr lang="en-US" smtClean="0"/>
+              <a:rPr lang="en-US"/>
               <a:t>Fifth level</a:t>
             </a:r>
-            <a:endParaRPr lang="en-US"/>
           </a:p>
         </p:txBody>
       </p:sp>
@@ -1524,7 +1516,7 @@
           <a:p>
             <a:pPr lvl="0"/>
             <a:r>
-              <a:rPr lang="en-US" smtClean="0"/>
+              <a:rPr lang="en-US"/>
               <a:t>Click to edit Master text styles</a:t>
             </a:r>
           </a:p>
@@ -1552,38 +1544,37 @@
           <a:p>
             <a:pPr lvl="0"/>
             <a:r>
-              <a:rPr lang="en-US" smtClean="0"/>
+              <a:rPr lang="en-US"/>
               <a:t>Click to edit Master text styles</a:t>
             </a:r>
           </a:p>
           <a:p>
             <a:pPr lvl="1"/>
             <a:r>
-              <a:rPr lang="en-US" smtClean="0"/>
+              <a:rPr lang="en-US"/>
               <a:t>Second level</a:t>
             </a:r>
           </a:p>
           <a:p>
             <a:pPr lvl="2"/>
             <a:r>
-              <a:rPr lang="en-US" smtClean="0"/>
+              <a:rPr lang="en-US"/>
               <a:t>Third level</a:t>
             </a:r>
           </a:p>
           <a:p>
             <a:pPr lvl="3"/>
             <a:r>
-              <a:rPr lang="en-US" smtClean="0"/>
+              <a:rPr lang="en-US"/>
               <a:t>Fourth level</a:t>
             </a:r>
           </a:p>
           <a:p>
             <a:pPr lvl="4"/>
             <a:r>
-              <a:rPr lang="en-US" smtClean="0"/>
+              <a:rPr lang="en-US"/>
               <a:t>Fifth level</a:t>
             </a:r>
-            <a:endParaRPr lang="en-US"/>
           </a:p>
         </p:txBody>
       </p:sp>
@@ -1604,7 +1595,7 @@
           <a:p>
             <a:fld id="{28BE630F-C39C-4DB9-8258-0B48CA067079}" type="datetimeFigureOut">
               <a:rPr lang="en-US" smtClean="0"/>
-              <a:t>11/25/2021</a:t>
+              <a:t>12/1/2021</a:t>
             </a:fld>
             <a:endParaRPr lang="en-US"/>
           </a:p>
@@ -1698,10 +1689,9 @@
           <a:lstStyle/>
           <a:p>
             <a:r>
-              <a:rPr lang="en-US" smtClean="0"/>
+              <a:rPr lang="en-US"/>
               <a:t>Click to edit Master title style</a:t>
             </a:r>
-            <a:endParaRPr lang="en-US"/>
           </a:p>
         </p:txBody>
       </p:sp>
@@ -1722,7 +1712,7 @@
           <a:p>
             <a:fld id="{28BE630F-C39C-4DB9-8258-0B48CA067079}" type="datetimeFigureOut">
               <a:rPr lang="en-US" smtClean="0"/>
-              <a:t>11/25/2021</a:t>
+              <a:t>12/1/2021</a:t>
             </a:fld>
             <a:endParaRPr lang="en-US"/>
           </a:p>
@@ -1817,7 +1807,7 @@
           <a:p>
             <a:fld id="{28BE630F-C39C-4DB9-8258-0B48CA067079}" type="datetimeFigureOut">
               <a:rPr lang="en-US" smtClean="0"/>
-              <a:t>11/25/2021</a:t>
+              <a:t>12/1/2021</a:t>
             </a:fld>
             <a:endParaRPr lang="en-US"/>
           </a:p>
@@ -1920,10 +1910,9 @@
           </a:lstStyle>
           <a:p>
             <a:r>
-              <a:rPr lang="en-US" smtClean="0"/>
+              <a:rPr lang="en-US"/>
               <a:t>Click to edit Master title style</a:t>
             </a:r>
-            <a:endParaRPr lang="en-US"/>
           </a:p>
         </p:txBody>
       </p:sp>
@@ -1977,38 +1966,37 @@
           <a:p>
             <a:pPr lvl="0"/>
             <a:r>
-              <a:rPr lang="en-US" smtClean="0"/>
+              <a:rPr lang="en-US"/>
               <a:t>Click to edit Master text styles</a:t>
             </a:r>
           </a:p>
           <a:p>
             <a:pPr lvl="1"/>
             <a:r>
-              <a:rPr lang="en-US" smtClean="0"/>
+              <a:rPr lang="en-US"/>
               <a:t>Second level</a:t>
             </a:r>
           </a:p>
           <a:p>
             <a:pPr lvl="2"/>
             <a:r>
-              <a:rPr lang="en-US" smtClean="0"/>
+              <a:rPr lang="en-US"/>
               <a:t>Third level</a:t>
             </a:r>
           </a:p>
           <a:p>
             <a:pPr lvl="3"/>
             <a:r>
-              <a:rPr lang="en-US" smtClean="0"/>
+              <a:rPr lang="en-US"/>
               <a:t>Fourth level</a:t>
             </a:r>
           </a:p>
           <a:p>
             <a:pPr lvl="4"/>
             <a:r>
-              <a:rPr lang="en-US" smtClean="0"/>
+              <a:rPr lang="en-US"/>
               <a:t>Fifth level</a:t>
             </a:r>
-            <a:endParaRPr lang="en-US"/>
           </a:p>
         </p:txBody>
       </p:sp>
@@ -2071,7 +2059,7 @@
           <a:p>
             <a:pPr lvl="0"/>
             <a:r>
-              <a:rPr lang="en-US" smtClean="0"/>
+              <a:rPr lang="en-US"/>
               <a:t>Click to edit Master text styles</a:t>
             </a:r>
           </a:p>
@@ -2094,7 +2082,7 @@
           <a:p>
             <a:fld id="{28BE630F-C39C-4DB9-8258-0B48CA067079}" type="datetimeFigureOut">
               <a:rPr lang="en-US" smtClean="0"/>
-              <a:t>11/25/2021</a:t>
+              <a:t>12/1/2021</a:t>
             </a:fld>
             <a:endParaRPr lang="en-US"/>
           </a:p>
@@ -2197,10 +2185,9 @@
           </a:lstStyle>
           <a:p>
             <a:r>
-              <a:rPr lang="en-US" smtClean="0"/>
+              <a:rPr lang="en-US"/>
               <a:t>Click to edit Master title style</a:t>
             </a:r>
-            <a:endParaRPr lang="en-US"/>
           </a:p>
         </p:txBody>
       </p:sp>
@@ -2324,7 +2311,7 @@
           <a:p>
             <a:pPr lvl="0"/>
             <a:r>
-              <a:rPr lang="en-US" smtClean="0"/>
+              <a:rPr lang="en-US"/>
               <a:t>Click to edit Master text styles</a:t>
             </a:r>
           </a:p>
@@ -2347,7 +2334,7 @@
           <a:p>
             <a:fld id="{28BE630F-C39C-4DB9-8258-0B48CA067079}" type="datetimeFigureOut">
               <a:rPr lang="en-US" smtClean="0"/>
-              <a:t>11/25/2021</a:t>
+              <a:t>12/1/2021</a:t>
             </a:fld>
             <a:endParaRPr lang="en-US"/>
           </a:p>
@@ -2456,10 +2443,9 @@
           <a:lstStyle/>
           <a:p>
             <a:r>
-              <a:rPr lang="en-US" smtClean="0"/>
+              <a:rPr lang="en-US"/>
               <a:t>Click to edit Master title style</a:t>
             </a:r>
-            <a:endParaRPr lang="en-US"/>
           </a:p>
         </p:txBody>
       </p:sp>
@@ -2490,38 +2476,37 @@
           <a:p>
             <a:pPr lvl="0"/>
             <a:r>
-              <a:rPr lang="en-US" smtClean="0"/>
+              <a:rPr lang="en-US"/>
               <a:t>Click to edit Master text styles</a:t>
             </a:r>
           </a:p>
           <a:p>
             <a:pPr lvl="1"/>
             <a:r>
-              <a:rPr lang="en-US" smtClean="0"/>
+              <a:rPr lang="en-US"/>
               <a:t>Second level</a:t>
             </a:r>
           </a:p>
           <a:p>
             <a:pPr lvl="2"/>
             <a:r>
-              <a:rPr lang="en-US" smtClean="0"/>
+              <a:rPr lang="en-US"/>
               <a:t>Third level</a:t>
             </a:r>
           </a:p>
           <a:p>
             <a:pPr lvl="3"/>
             <a:r>
-              <a:rPr lang="en-US" smtClean="0"/>
+              <a:rPr lang="en-US"/>
               <a:t>Fourth level</a:t>
             </a:r>
           </a:p>
           <a:p>
             <a:pPr lvl="4"/>
             <a:r>
-              <a:rPr lang="en-US" smtClean="0"/>
+              <a:rPr lang="en-US"/>
               <a:t>Fifth level</a:t>
             </a:r>
-            <a:endParaRPr lang="en-US"/>
           </a:p>
         </p:txBody>
       </p:sp>
@@ -2560,7 +2545,7 @@
           <a:p>
             <a:fld id="{28BE630F-C39C-4DB9-8258-0B48CA067079}" type="datetimeFigureOut">
               <a:rPr lang="en-US" smtClean="0"/>
-              <a:t>11/25/2021</a:t>
+              <a:t>12/1/2021</a:t>
             </a:fld>
             <a:endParaRPr lang="en-US"/>
           </a:p>
@@ -3323,10 +3308,9 @@
           <a:lstStyle/>
           <a:p>
             <a:r>
-              <a:rPr lang="en-US" sz="1372" dirty="0" smtClean="0"/>
+              <a:rPr lang="en-US" sz="1372" dirty="0"/>
               <a:t>Students[]</a:t>
             </a:r>
-            <a:endParaRPr lang="en-US" sz="1372" dirty="0"/>
           </a:p>
         </p:txBody>
       </p:sp>
@@ -3353,10 +3337,9 @@
           <a:lstStyle/>
           <a:p>
             <a:r>
-              <a:rPr lang="en-US" sz="1372" dirty="0" smtClean="0"/>
+              <a:rPr lang="en-US" sz="1372" dirty="0"/>
               <a:t>// A component with a list of student as data</a:t>
             </a:r>
-            <a:endParaRPr lang="en-US" sz="1372" dirty="0"/>
           </a:p>
         </p:txBody>
       </p:sp>
@@ -3463,10 +3446,9 @@
           <a:lstStyle/>
           <a:p>
             <a:r>
-              <a:rPr lang="en-US" sz="1372" dirty="0" smtClean="0"/>
+              <a:rPr lang="en-US" sz="1372" dirty="0"/>
               <a:t>Students[]</a:t>
             </a:r>
-            <a:endParaRPr lang="en-US" sz="1372" dirty="0"/>
           </a:p>
         </p:txBody>
       </p:sp>
@@ -3493,11 +3475,11 @@
           <a:lstStyle/>
           <a:p>
             <a:r>
-              <a:rPr lang="en-US" sz="1372" dirty="0" smtClean="0"/>
+              <a:rPr lang="en-US" sz="1372" dirty="0"/>
               <a:t>// </a:t>
             </a:r>
             <a:r>
-              <a:rPr lang="en-US" sz="1372" dirty="0" smtClean="0">
+              <a:rPr lang="en-US" sz="1372" dirty="0">
                 <a:solidFill>
                   <a:srgbClr val="FF0000"/>
                 </a:solidFill>
@@ -3505,22 +3487,17 @@
               <a:t>app</a:t>
             </a:r>
             <a:r>
-              <a:rPr lang="en-US" sz="1372" dirty="0" smtClean="0"/>
+              <a:rPr lang="en-US" sz="1372" dirty="0"/>
               <a:t> send student to </a:t>
             </a:r>
             <a:r>
-              <a:rPr lang="en-US" sz="1372" dirty="0" smtClean="0">
+              <a:rPr lang="en-US" sz="1372" dirty="0">
                 <a:solidFill>
                   <a:srgbClr val="FF0000"/>
                 </a:solidFill>
               </a:rPr>
               <a:t>card </a:t>
             </a:r>
-            <a:endParaRPr lang="en-US" sz="1372" dirty="0">
-              <a:solidFill>
-                <a:srgbClr val="FF0000"/>
-              </a:solidFill>
-            </a:endParaRPr>
           </a:p>
         </p:txBody>
       </p:sp>
@@ -3547,18 +3524,13 @@
           <a:lstStyle/>
           <a:p>
             <a:r>
-              <a:rPr lang="en-US" sz="1372" b="1" i="1" dirty="0" smtClean="0">
+              <a:rPr lang="en-US" sz="1372" b="1" i="1" dirty="0">
                 <a:solidFill>
                   <a:srgbClr val="FF0000"/>
                 </a:solidFill>
               </a:rPr>
               <a:t>&lt;parent&gt;</a:t>
             </a:r>
-            <a:endParaRPr lang="en-US" sz="1372" b="1" i="1" dirty="0">
-              <a:solidFill>
-                <a:srgbClr val="FF0000"/>
-              </a:solidFill>
-            </a:endParaRPr>
           </a:p>
         </p:txBody>
       </p:sp>
@@ -3632,10 +3604,9 @@
           <a:lstStyle/>
           <a:p>
             <a:r>
-              <a:rPr lang="en-US" sz="1372" dirty="0" smtClean="0"/>
+              <a:rPr lang="en-US" sz="1372" dirty="0"/>
               <a:t>Students[]</a:t>
             </a:r>
-            <a:endParaRPr lang="en-US" sz="1372" dirty="0"/>
           </a:p>
         </p:txBody>
       </p:sp>
@@ -3662,11 +3633,11 @@
           <a:lstStyle/>
           <a:p>
             <a:r>
-              <a:rPr lang="en-US" sz="1372" dirty="0" smtClean="0"/>
+              <a:rPr lang="en-US" sz="1372" dirty="0"/>
               <a:t>// </a:t>
             </a:r>
             <a:r>
-              <a:rPr lang="en-US" sz="1372" dirty="0" smtClean="0">
+              <a:rPr lang="en-US" sz="1372" dirty="0">
                 <a:solidFill>
                   <a:srgbClr val="FF0000"/>
                 </a:solidFill>
@@ -3674,22 +3645,17 @@
               <a:t>from</a:t>
             </a:r>
             <a:r>
-              <a:rPr lang="en-US" sz="1372" dirty="0" smtClean="0"/>
+              <a:rPr lang="en-US" sz="1372" dirty="0"/>
               <a:t> send the event validated to </a:t>
             </a:r>
             <a:r>
-              <a:rPr lang="en-US" sz="1372" dirty="0" smtClean="0">
+              <a:rPr lang="en-US" sz="1372" dirty="0">
                 <a:solidFill>
                   <a:srgbClr val="FF0000"/>
                 </a:solidFill>
               </a:rPr>
               <a:t>parent</a:t>
             </a:r>
-            <a:endParaRPr lang="en-US" sz="1372" dirty="0">
-              <a:solidFill>
-                <a:srgbClr val="FF0000"/>
-              </a:solidFill>
-            </a:endParaRPr>
           </a:p>
         </p:txBody>
       </p:sp>
@@ -3763,10 +3729,9 @@
           <a:lstStyle/>
           <a:p>
             <a:r>
-              <a:rPr lang="en-US" sz="1372" dirty="0" smtClean="0"/>
+              <a:rPr lang="en-US" sz="1372" dirty="0"/>
               <a:t>Students[]</a:t>
             </a:r>
-            <a:endParaRPr lang="en-US" sz="1372" dirty="0"/>
           </a:p>
         </p:txBody>
       </p:sp>
@@ -3793,18 +3758,13 @@
           <a:lstStyle/>
           <a:p>
             <a:r>
-              <a:rPr lang="en-US" sz="1372" b="1" i="1" dirty="0" smtClean="0">
+              <a:rPr lang="en-US" sz="1372" b="1" i="1" dirty="0">
                 <a:solidFill>
                   <a:srgbClr val="FF0000"/>
                 </a:solidFill>
               </a:rPr>
               <a:t>&lt;from&gt;</a:t>
             </a:r>
-            <a:endParaRPr lang="en-US" sz="1372" b="1" i="1" dirty="0">
-              <a:solidFill>
-                <a:srgbClr val="FF0000"/>
-              </a:solidFill>
-            </a:endParaRPr>
           </a:p>
         </p:txBody>
       </p:sp>
@@ -3878,10 +3838,9 @@
           <a:lstStyle/>
           <a:p>
             <a:r>
-              <a:rPr lang="en-US" sz="1372" dirty="0" smtClean="0"/>
+              <a:rPr lang="en-US" sz="1372" dirty="0"/>
               <a:t>Students[]</a:t>
             </a:r>
-            <a:endParaRPr lang="en-US" sz="1372" dirty="0"/>
           </a:p>
         </p:txBody>
       </p:sp>
@@ -3956,10 +3915,9 @@
           <a:lstStyle/>
           <a:p>
             <a:r>
-              <a:rPr lang="en-US" sz="1372" dirty="0" smtClean="0"/>
+              <a:rPr lang="en-US" sz="1372" dirty="0"/>
               <a:t>student</a:t>
             </a:r>
-            <a:endParaRPr lang="en-US" sz="1372" dirty="0"/>
           </a:p>
         </p:txBody>
       </p:sp>
@@ -3986,18 +3944,13 @@
           <a:lstStyle/>
           <a:p>
             <a:r>
-              <a:rPr lang="en-US" sz="1372" b="1" dirty="0" smtClean="0">
+              <a:rPr lang="en-US" sz="1372" b="1" dirty="0">
                 <a:solidFill>
                   <a:schemeClr val="accent6"/>
                 </a:solidFill>
               </a:rPr>
               <a:t>PROPS</a:t>
             </a:r>
-            <a:endParaRPr lang="en-US" sz="1372" b="1" dirty="0">
-              <a:solidFill>
-                <a:schemeClr val="accent6"/>
-              </a:solidFill>
-            </a:endParaRPr>
           </a:p>
         </p:txBody>
       </p:sp>
@@ -4024,18 +3977,13 @@
           <a:lstStyle/>
           <a:p>
             <a:r>
-              <a:rPr lang="en-US" sz="1372" b="1" i="1" dirty="0" smtClean="0">
+              <a:rPr lang="en-US" sz="1372" b="1" i="1" dirty="0">
                 <a:solidFill>
                   <a:srgbClr val="FF0000"/>
                 </a:solidFill>
               </a:rPr>
               <a:t>&lt;card&gt;</a:t>
             </a:r>
-            <a:endParaRPr lang="en-US" sz="1372" b="1" i="1" dirty="0">
-              <a:solidFill>
-                <a:srgbClr val="FF0000"/>
-              </a:solidFill>
-            </a:endParaRPr>
           </a:p>
         </p:txBody>
       </p:sp>
@@ -4110,7 +4058,7 @@
           <a:lstStyle/>
           <a:p>
             <a:r>
-              <a:rPr lang="en-US" sz="1372" dirty="0" err="1" smtClean="0"/>
+              <a:rPr lang="en-US" sz="1372" dirty="0" err="1"/>
               <a:t>valided</a:t>
             </a:r>
             <a:endParaRPr lang="en-US" sz="1372" dirty="0"/>
@@ -4140,18 +4088,13 @@
           <a:lstStyle/>
           <a:p>
             <a:r>
-              <a:rPr lang="en-US" sz="1372" b="1" dirty="0" smtClean="0">
+              <a:rPr lang="en-US" sz="1372" b="1" dirty="0">
                 <a:solidFill>
                   <a:srgbClr val="FF0000"/>
                 </a:solidFill>
               </a:rPr>
               <a:t>EMIT</a:t>
             </a:r>
-            <a:endParaRPr lang="en-US" sz="1372" b="1" dirty="0">
-              <a:solidFill>
-                <a:srgbClr val="FF0000"/>
-              </a:solidFill>
-            </a:endParaRPr>
           </a:p>
         </p:txBody>
       </p:sp>
@@ -4288,10 +4231,9 @@
           <a:lstStyle/>
           <a:p>
             <a:r>
-              <a:rPr lang="en-US" sz="1372" dirty="0" smtClean="0"/>
+              <a:rPr lang="en-US" sz="1372" dirty="0"/>
               <a:t>Students[]</a:t>
             </a:r>
-            <a:endParaRPr lang="en-US" sz="1372" dirty="0"/>
           </a:p>
         </p:txBody>
       </p:sp>
@@ -4318,11 +4260,11 @@
           <a:lstStyle/>
           <a:p>
             <a:r>
-              <a:rPr lang="en-US" sz="1372" dirty="0" smtClean="0"/>
+              <a:rPr lang="en-US" sz="1372" dirty="0"/>
               <a:t>// </a:t>
             </a:r>
             <a:r>
-              <a:rPr lang="en-US" sz="1372" dirty="0" smtClean="0">
+              <a:rPr lang="en-US" sz="1372" dirty="0">
                 <a:solidFill>
                   <a:srgbClr val="FF0000"/>
                 </a:solidFill>
@@ -4330,7 +4272,7 @@
               <a:t>app</a:t>
             </a:r>
             <a:r>
-              <a:rPr lang="en-US" sz="1372" dirty="0" smtClean="0"/>
+              <a:rPr lang="en-US" sz="1372" dirty="0"/>
               <a:t>  provides students to anymore</a:t>
             </a:r>
             <a:endParaRPr lang="en-US" sz="1372" dirty="0">
@@ -4411,10 +4353,9 @@
           <a:lstStyle/>
           <a:p>
             <a:r>
-              <a:rPr lang="en-US" sz="1372" dirty="0" smtClean="0"/>
+              <a:rPr lang="en-US" sz="1372" dirty="0"/>
               <a:t>Students[]</a:t>
             </a:r>
-            <a:endParaRPr lang="en-US" sz="1372" dirty="0"/>
           </a:p>
         </p:txBody>
       </p:sp>
@@ -4441,18 +4382,13 @@
           <a:lstStyle/>
           <a:p>
             <a:r>
-              <a:rPr lang="en-US" sz="1372" b="1" i="1" dirty="0" smtClean="0">
+              <a:rPr lang="en-US" sz="1372" b="1" i="1" dirty="0">
                 <a:solidFill>
                   <a:srgbClr val="FF0000"/>
                 </a:solidFill>
               </a:rPr>
               <a:t>&lt;dialog&gt;</a:t>
             </a:r>
-            <a:endParaRPr lang="en-US" sz="1372" b="1" i="1" dirty="0">
-              <a:solidFill>
-                <a:srgbClr val="FF0000"/>
-              </a:solidFill>
-            </a:endParaRPr>
           </a:p>
         </p:txBody>
       </p:sp>
@@ -4560,10 +4496,9 @@
           <a:lstStyle/>
           <a:p>
             <a:r>
-              <a:rPr lang="en-US" sz="1372" dirty="0" smtClean="0"/>
+              <a:rPr lang="en-US" sz="1372" dirty="0"/>
               <a:t>Students[]</a:t>
             </a:r>
-            <a:endParaRPr lang="en-US" sz="1372" dirty="0"/>
           </a:p>
         </p:txBody>
       </p:sp>
@@ -4638,18 +4573,13 @@
           <a:lstStyle/>
           <a:p>
             <a:r>
-              <a:rPr lang="en-US" sz="1372" b="1" dirty="0" smtClean="0">
+              <a:rPr lang="en-US" sz="1372" b="1" dirty="0">
                 <a:solidFill>
                   <a:schemeClr val="accent4"/>
                 </a:solidFill>
               </a:rPr>
               <a:t>INJECT</a:t>
             </a:r>
-            <a:endParaRPr lang="en-US" sz="1372" b="1" dirty="0">
-              <a:solidFill>
-                <a:schemeClr val="accent4"/>
-              </a:solidFill>
-            </a:endParaRPr>
           </a:p>
         </p:txBody>
       </p:sp>
@@ -4676,10 +4606,9 @@
           <a:lstStyle/>
           <a:p>
             <a:r>
-              <a:rPr lang="en-US" sz="1372" dirty="0" smtClean="0"/>
+              <a:rPr lang="en-US" sz="1372" dirty="0"/>
               <a:t>Students[]</a:t>
             </a:r>
-            <a:endParaRPr lang="en-US" sz="1372" dirty="0"/>
           </a:p>
         </p:txBody>
       </p:sp>
@@ -4706,11 +4635,11 @@
           <a:lstStyle/>
           <a:p>
             <a:r>
-              <a:rPr lang="en-US" sz="1372" dirty="0" smtClean="0"/>
+              <a:rPr lang="en-US" sz="1372" dirty="0"/>
               <a:t>// </a:t>
             </a:r>
             <a:r>
-              <a:rPr lang="en-US" sz="1372" dirty="0" smtClean="0">
+              <a:rPr lang="en-US" sz="1372" dirty="0">
                 <a:solidFill>
                   <a:srgbClr val="FF0000"/>
                 </a:solidFill>
@@ -4718,7 +4647,7 @@
               <a:t>dialog </a:t>
             </a:r>
             <a:r>
-              <a:rPr lang="en-US" sz="1372" dirty="0" smtClean="0"/>
+              <a:rPr lang="en-US" sz="1372" dirty="0"/>
               <a:t> gets students from a provider</a:t>
             </a:r>
             <a:endParaRPr lang="en-US" sz="1372" dirty="0">
@@ -4832,15 +4761,15 @@
           <a:lstStyle/>
           <a:p>
             <a:r>
-              <a:rPr lang="en-US" sz="1372" dirty="0" smtClean="0"/>
+              <a:rPr lang="en-US" sz="1372" dirty="0"/>
               <a:t>// </a:t>
             </a:r>
             <a:r>
-              <a:rPr lang="en-US" sz="1372" dirty="0" err="1" smtClean="0"/>
+              <a:rPr lang="en-US" sz="1372" dirty="0" err="1"/>
               <a:t>Vue</a:t>
             </a:r>
             <a:r>
-              <a:rPr lang="en-US" sz="1372" dirty="0" smtClean="0"/>
+              <a:rPr lang="en-US" sz="1372" dirty="0"/>
               <a:t> JS built-in component</a:t>
             </a:r>
             <a:endParaRPr lang="en-US" sz="1372" dirty="0">
@@ -4855,6 +4784,1977 @@
     <p:extLst>
       <p:ext uri="{BB962C8B-B14F-4D97-AF65-F5344CB8AC3E}">
         <p14:creationId xmlns:p14="http://schemas.microsoft.com/office/powerpoint/2010/main" val="3109588190"/>
+      </p:ext>
+    </p:extLst>
+  </p:cSld>
+  <p:clrMapOvr>
+    <a:masterClrMapping/>
+  </p:clrMapOvr>
+</p:sld>
+</file>
+
+<file path=ppt/slides/slide3.xml><?xml version="1.0" encoding="utf-8"?>
+<p:sld xmlns:a="http://schemas.openxmlformats.org/drawingml/2006/main" xmlns:r="http://schemas.openxmlformats.org/officeDocument/2006/relationships" xmlns:p="http://schemas.openxmlformats.org/presentationml/2006/main">
+  <p:cSld>
+    <p:spTree>
+      <p:nvGrpSpPr>
+        <p:cNvPr id="1" name=""/>
+        <p:cNvGrpSpPr/>
+        <p:nvPr/>
+      </p:nvGrpSpPr>
+      <p:grpSpPr>
+        <a:xfrm>
+          <a:off x="0" y="0"/>
+          <a:ext cx="0" cy="0"/>
+          <a:chOff x="0" y="0"/>
+          <a:chExt cx="0" cy="0"/>
+        </a:xfrm>
+      </p:grpSpPr>
+      <p:sp>
+        <p:nvSpPr>
+          <p:cNvPr id="4" name="Rectangle: Rounded Corners 3">
+            <a:extLst>
+              <a:ext uri="{FF2B5EF4-FFF2-40B4-BE49-F238E27FC236}">
+                <a16:creationId xmlns:a16="http://schemas.microsoft.com/office/drawing/2014/main" id="{D59A2BF1-37A9-4CF3-8698-286F687133D2}"/>
+              </a:ext>
+            </a:extLst>
+          </p:cNvPr>
+          <p:cNvSpPr/>
+          <p:nvPr/>
+        </p:nvSpPr>
+        <p:spPr>
+          <a:xfrm>
+            <a:off x="1089993" y="1001460"/>
+            <a:ext cx="1731626" cy="1049466"/>
+          </a:xfrm>
+          <a:prstGeom prst="roundRect">
+            <a:avLst/>
+          </a:prstGeom>
+          <a:noFill/>
+          <a:ln w="19050">
+            <a:solidFill>
+              <a:schemeClr val="accent6">
+                <a:lumMod val="75000"/>
+              </a:schemeClr>
+            </a:solidFill>
+            <a:prstDash val="dash"/>
+          </a:ln>
+        </p:spPr>
+        <p:style>
+          <a:lnRef idx="2">
+            <a:schemeClr val="dk1"/>
+          </a:lnRef>
+          <a:fillRef idx="1">
+            <a:schemeClr val="lt1"/>
+          </a:fillRef>
+          <a:effectRef idx="0">
+            <a:schemeClr val="dk1"/>
+          </a:effectRef>
+          <a:fontRef idx="minor">
+            <a:schemeClr val="dk1"/>
+          </a:fontRef>
+        </p:style>
+        <p:txBody>
+          <a:bodyPr rtlCol="0" anchor="ctr"/>
+          <a:lstStyle/>
+          <a:p>
+            <a:pPr algn="ctr"/>
+            <a:endParaRPr lang="en-US" dirty="0">
+              <a:solidFill>
+                <a:srgbClr val="00B050"/>
+              </a:solidFill>
+            </a:endParaRPr>
+          </a:p>
+        </p:txBody>
+      </p:sp>
+      <p:sp>
+        <p:nvSpPr>
+          <p:cNvPr id="5" name="Rectangle: Rounded Corners 4">
+            <a:extLst>
+              <a:ext uri="{FF2B5EF4-FFF2-40B4-BE49-F238E27FC236}">
+                <a16:creationId xmlns:a16="http://schemas.microsoft.com/office/drawing/2014/main" id="{D3713C84-3554-4730-A3B5-C4CD61B9C689}"/>
+              </a:ext>
+            </a:extLst>
+          </p:cNvPr>
+          <p:cNvSpPr/>
+          <p:nvPr/>
+        </p:nvSpPr>
+        <p:spPr>
+          <a:xfrm>
+            <a:off x="1603512" y="4087622"/>
+            <a:ext cx="1991139" cy="764916"/>
+          </a:xfrm>
+          <a:prstGeom prst="roundRect">
+            <a:avLst/>
+          </a:prstGeom>
+          <a:noFill/>
+          <a:ln w="19050">
+            <a:solidFill>
+              <a:schemeClr val="accent6">
+                <a:lumMod val="75000"/>
+              </a:schemeClr>
+            </a:solidFill>
+            <a:prstDash val="dash"/>
+          </a:ln>
+        </p:spPr>
+        <p:style>
+          <a:lnRef idx="2">
+            <a:schemeClr val="dk1"/>
+          </a:lnRef>
+          <a:fillRef idx="1">
+            <a:schemeClr val="lt1"/>
+          </a:fillRef>
+          <a:effectRef idx="0">
+            <a:schemeClr val="dk1"/>
+          </a:effectRef>
+          <a:fontRef idx="minor">
+            <a:schemeClr val="dk1"/>
+          </a:fontRef>
+        </p:style>
+        <p:txBody>
+          <a:bodyPr rtlCol="0" anchor="ctr"/>
+          <a:lstStyle/>
+          <a:p>
+            <a:pPr algn="ctr"/>
+            <a:endParaRPr lang="en-US" dirty="0">
+              <a:ln>
+                <a:solidFill>
+                  <a:srgbClr val="FF0000"/>
+                </a:solidFill>
+              </a:ln>
+              <a:solidFill>
+                <a:srgbClr val="00B050"/>
+              </a:solidFill>
+            </a:endParaRPr>
+          </a:p>
+        </p:txBody>
+      </p:sp>
+      <p:sp>
+        <p:nvSpPr>
+          <p:cNvPr id="6" name="Rectangle: Rounded Corners 5">
+            <a:extLst>
+              <a:ext uri="{FF2B5EF4-FFF2-40B4-BE49-F238E27FC236}">
+                <a16:creationId xmlns:a16="http://schemas.microsoft.com/office/drawing/2014/main" id="{81C581C1-B279-4582-AF88-AF9F30E69C6C}"/>
+              </a:ext>
+            </a:extLst>
+          </p:cNvPr>
+          <p:cNvSpPr/>
+          <p:nvPr/>
+        </p:nvSpPr>
+        <p:spPr>
+          <a:xfrm>
+            <a:off x="2650434" y="2429271"/>
+            <a:ext cx="6453809" cy="1049466"/>
+          </a:xfrm>
+          <a:prstGeom prst="roundRect">
+            <a:avLst/>
+          </a:prstGeom>
+          <a:noFill/>
+          <a:ln w="19050">
+            <a:solidFill>
+              <a:schemeClr val="accent5">
+                <a:lumMod val="75000"/>
+              </a:schemeClr>
+            </a:solidFill>
+            <a:prstDash val="dash"/>
+          </a:ln>
+        </p:spPr>
+        <p:style>
+          <a:lnRef idx="2">
+            <a:schemeClr val="dk1"/>
+          </a:lnRef>
+          <a:fillRef idx="1">
+            <a:schemeClr val="lt1"/>
+          </a:fillRef>
+          <a:effectRef idx="0">
+            <a:schemeClr val="dk1"/>
+          </a:effectRef>
+          <a:fontRef idx="minor">
+            <a:schemeClr val="dk1"/>
+          </a:fontRef>
+        </p:style>
+        <p:txBody>
+          <a:bodyPr rtlCol="0" anchor="ctr"/>
+          <a:lstStyle/>
+          <a:p>
+            <a:pPr algn="ctr"/>
+            <a:endParaRPr lang="en-US" dirty="0">
+              <a:solidFill>
+                <a:srgbClr val="00B050"/>
+              </a:solidFill>
+            </a:endParaRPr>
+          </a:p>
+        </p:txBody>
+      </p:sp>
+      <p:sp>
+        <p:nvSpPr>
+          <p:cNvPr id="7" name="TextBox 6">
+            <a:extLst>
+              <a:ext uri="{FF2B5EF4-FFF2-40B4-BE49-F238E27FC236}">
+                <a16:creationId xmlns:a16="http://schemas.microsoft.com/office/drawing/2014/main" id="{EDEFA91B-9C2A-4AA6-8E9A-66E1C6AC429A}"/>
+              </a:ext>
+            </a:extLst>
+          </p:cNvPr>
+          <p:cNvSpPr txBox="1"/>
+          <p:nvPr/>
+        </p:nvSpPr>
+        <p:spPr>
+          <a:xfrm>
+            <a:off x="1603512" y="4175430"/>
+            <a:ext cx="1868557" cy="338554"/>
+          </a:xfrm>
+          <a:prstGeom prst="rect">
+            <a:avLst/>
+          </a:prstGeom>
+          <a:noFill/>
+        </p:spPr>
+        <p:txBody>
+          <a:bodyPr wrap="square" rtlCol="0">
+            <a:spAutoFit/>
+          </a:bodyPr>
+          <a:lstStyle/>
+          <a:p>
+            <a:r>
+              <a:rPr lang="en-US" sz="1600" b="1" dirty="0">
+                <a:solidFill>
+                  <a:srgbClr val="FF0000"/>
+                </a:solidFill>
+              </a:rPr>
+              <a:t>&lt;my-event-view&gt;</a:t>
+            </a:r>
+          </a:p>
+        </p:txBody>
+      </p:sp>
+      <p:sp>
+        <p:nvSpPr>
+          <p:cNvPr id="8" name="TextBox 7">
+            <a:extLst>
+              <a:ext uri="{FF2B5EF4-FFF2-40B4-BE49-F238E27FC236}">
+                <a16:creationId xmlns:a16="http://schemas.microsoft.com/office/drawing/2014/main" id="{7EEB9209-F332-469F-B676-F91820B1C50B}"/>
+              </a:ext>
+            </a:extLst>
+          </p:cNvPr>
+          <p:cNvSpPr txBox="1"/>
+          <p:nvPr/>
+        </p:nvSpPr>
+        <p:spPr>
+          <a:xfrm>
+            <a:off x="1618669" y="1187639"/>
+            <a:ext cx="959552" cy="338554"/>
+          </a:xfrm>
+          <a:prstGeom prst="rect">
+            <a:avLst/>
+          </a:prstGeom>
+          <a:noFill/>
+        </p:spPr>
+        <p:txBody>
+          <a:bodyPr wrap="square" rtlCol="0">
+            <a:spAutoFit/>
+          </a:bodyPr>
+          <a:lstStyle/>
+          <a:p>
+            <a:r>
+              <a:rPr lang="en-US" sz="1600" b="1" dirty="0">
+                <a:solidFill>
+                  <a:srgbClr val="FF0000"/>
+                </a:solidFill>
+              </a:rPr>
+              <a:t>&lt;app&gt;</a:t>
+            </a:r>
+          </a:p>
+        </p:txBody>
+      </p:sp>
+      <p:sp>
+        <p:nvSpPr>
+          <p:cNvPr id="9" name="TextBox 8">
+            <a:extLst>
+              <a:ext uri="{FF2B5EF4-FFF2-40B4-BE49-F238E27FC236}">
+                <a16:creationId xmlns:a16="http://schemas.microsoft.com/office/drawing/2014/main" id="{D865D8F0-C317-477C-B951-7B66E1AC3D31}"/>
+              </a:ext>
+            </a:extLst>
+          </p:cNvPr>
+          <p:cNvSpPr txBox="1"/>
+          <p:nvPr/>
+        </p:nvSpPr>
+        <p:spPr>
+          <a:xfrm>
+            <a:off x="4995240" y="2784727"/>
+            <a:ext cx="1551334" cy="338554"/>
+          </a:xfrm>
+          <a:prstGeom prst="rect">
+            <a:avLst/>
+          </a:prstGeom>
+          <a:noFill/>
+        </p:spPr>
+        <p:txBody>
+          <a:bodyPr wrap="square" rtlCol="0">
+            <a:spAutoFit/>
+          </a:bodyPr>
+          <a:lstStyle/>
+          <a:p>
+            <a:r>
+              <a:rPr lang="en-US" sz="1600" b="1" dirty="0">
+                <a:solidFill>
+                  <a:srgbClr val="7030A0"/>
+                </a:solidFill>
+              </a:rPr>
+              <a:t>&lt;router-view&gt;</a:t>
+            </a:r>
+          </a:p>
+        </p:txBody>
+      </p:sp>
+      <p:sp>
+        <p:nvSpPr>
+          <p:cNvPr id="10" name="Rectangle: Rounded Corners 9">
+            <a:extLst>
+              <a:ext uri="{FF2B5EF4-FFF2-40B4-BE49-F238E27FC236}">
+                <a16:creationId xmlns:a16="http://schemas.microsoft.com/office/drawing/2014/main" id="{B22EB351-2E20-45D6-A6EB-11E22C48CB2D}"/>
+              </a:ext>
+            </a:extLst>
+          </p:cNvPr>
+          <p:cNvSpPr/>
+          <p:nvPr/>
+        </p:nvSpPr>
+        <p:spPr>
+          <a:xfrm>
+            <a:off x="8042052" y="4034617"/>
+            <a:ext cx="1991139" cy="732666"/>
+          </a:xfrm>
+          <a:prstGeom prst="roundRect">
+            <a:avLst/>
+          </a:prstGeom>
+          <a:noFill/>
+          <a:ln w="19050">
+            <a:solidFill>
+              <a:schemeClr val="accent6">
+                <a:lumMod val="75000"/>
+              </a:schemeClr>
+            </a:solidFill>
+            <a:prstDash val="dash"/>
+          </a:ln>
+        </p:spPr>
+        <p:style>
+          <a:lnRef idx="2">
+            <a:schemeClr val="dk1"/>
+          </a:lnRef>
+          <a:fillRef idx="1">
+            <a:schemeClr val="lt1"/>
+          </a:fillRef>
+          <a:effectRef idx="0">
+            <a:schemeClr val="dk1"/>
+          </a:effectRef>
+          <a:fontRef idx="minor">
+            <a:schemeClr val="dk1"/>
+          </a:fontRef>
+        </p:style>
+        <p:txBody>
+          <a:bodyPr rtlCol="0" anchor="ctr"/>
+          <a:lstStyle/>
+          <a:p>
+            <a:pPr algn="ctr"/>
+            <a:endParaRPr lang="en-US" dirty="0">
+              <a:ln>
+                <a:solidFill>
+                  <a:srgbClr val="FF0000"/>
+                </a:solidFill>
+              </a:ln>
+              <a:solidFill>
+                <a:srgbClr val="00B050"/>
+              </a:solidFill>
+            </a:endParaRPr>
+          </a:p>
+        </p:txBody>
+      </p:sp>
+      <p:sp>
+        <p:nvSpPr>
+          <p:cNvPr id="11" name="TextBox 10">
+            <a:extLst>
+              <a:ext uri="{FF2B5EF4-FFF2-40B4-BE49-F238E27FC236}">
+                <a16:creationId xmlns:a16="http://schemas.microsoft.com/office/drawing/2014/main" id="{06E84DD0-5C27-4794-A754-E430D9D1206E}"/>
+              </a:ext>
+            </a:extLst>
+          </p:cNvPr>
+          <p:cNvSpPr txBox="1"/>
+          <p:nvPr/>
+        </p:nvSpPr>
+        <p:spPr>
+          <a:xfrm>
+            <a:off x="8358812" y="4122425"/>
+            <a:ext cx="1674379" cy="338554"/>
+          </a:xfrm>
+          <a:prstGeom prst="rect">
+            <a:avLst/>
+          </a:prstGeom>
+          <a:noFill/>
+        </p:spPr>
+        <p:txBody>
+          <a:bodyPr wrap="square" rtlCol="0">
+            <a:spAutoFit/>
+          </a:bodyPr>
+          <a:lstStyle/>
+          <a:p>
+            <a:r>
+              <a:rPr lang="en-US" sz="1600" b="1" dirty="0">
+                <a:solidFill>
+                  <a:srgbClr val="FF0000"/>
+                </a:solidFill>
+              </a:rPr>
+              <a:t>&lt;category-view&gt;</a:t>
+            </a:r>
+          </a:p>
+        </p:txBody>
+      </p:sp>
+      <p:sp>
+        <p:nvSpPr>
+          <p:cNvPr id="12" name="Rectangle: Rounded Corners 11">
+            <a:extLst>
+              <a:ext uri="{FF2B5EF4-FFF2-40B4-BE49-F238E27FC236}">
+                <a16:creationId xmlns:a16="http://schemas.microsoft.com/office/drawing/2014/main" id="{276D1DA9-7396-4164-B9CF-25674264C44C}"/>
+              </a:ext>
+            </a:extLst>
+          </p:cNvPr>
+          <p:cNvSpPr/>
+          <p:nvPr/>
+        </p:nvSpPr>
+        <p:spPr>
+          <a:xfrm>
+            <a:off x="4641573" y="1001460"/>
+            <a:ext cx="1991139" cy="676910"/>
+          </a:xfrm>
+          <a:prstGeom prst="roundRect">
+            <a:avLst/>
+          </a:prstGeom>
+          <a:noFill/>
+          <a:ln w="19050">
+            <a:solidFill>
+              <a:schemeClr val="accent6">
+                <a:lumMod val="75000"/>
+              </a:schemeClr>
+            </a:solidFill>
+            <a:prstDash val="dash"/>
+          </a:ln>
+        </p:spPr>
+        <p:style>
+          <a:lnRef idx="2">
+            <a:schemeClr val="dk1"/>
+          </a:lnRef>
+          <a:fillRef idx="1">
+            <a:schemeClr val="lt1"/>
+          </a:fillRef>
+          <a:effectRef idx="0">
+            <a:schemeClr val="dk1"/>
+          </a:effectRef>
+          <a:fontRef idx="minor">
+            <a:schemeClr val="dk1"/>
+          </a:fontRef>
+        </p:style>
+        <p:txBody>
+          <a:bodyPr rtlCol="0" anchor="ctr"/>
+          <a:lstStyle/>
+          <a:p>
+            <a:pPr algn="ctr"/>
+            <a:endParaRPr lang="en-US" dirty="0">
+              <a:ln>
+                <a:solidFill>
+                  <a:srgbClr val="FF0000"/>
+                </a:solidFill>
+              </a:ln>
+              <a:solidFill>
+                <a:srgbClr val="00B050"/>
+              </a:solidFill>
+            </a:endParaRPr>
+          </a:p>
+        </p:txBody>
+      </p:sp>
+      <p:sp>
+        <p:nvSpPr>
+          <p:cNvPr id="13" name="TextBox 12">
+            <a:extLst>
+              <a:ext uri="{FF2B5EF4-FFF2-40B4-BE49-F238E27FC236}">
+                <a16:creationId xmlns:a16="http://schemas.microsoft.com/office/drawing/2014/main" id="{8509FE97-A828-4B81-950F-E8DCE50881D7}"/>
+              </a:ext>
+            </a:extLst>
+          </p:cNvPr>
+          <p:cNvSpPr txBox="1"/>
+          <p:nvPr/>
+        </p:nvSpPr>
+        <p:spPr>
+          <a:xfrm>
+            <a:off x="4793891" y="1034098"/>
+            <a:ext cx="1756075" cy="338554"/>
+          </a:xfrm>
+          <a:prstGeom prst="rect">
+            <a:avLst/>
+          </a:prstGeom>
+          <a:noFill/>
+        </p:spPr>
+        <p:txBody>
+          <a:bodyPr wrap="square" rtlCol="0">
+            <a:spAutoFit/>
+          </a:bodyPr>
+          <a:lstStyle/>
+          <a:p>
+            <a:pPr algn="ctr"/>
+            <a:r>
+              <a:rPr lang="en-US" sz="1600" b="1" dirty="0">
+                <a:solidFill>
+                  <a:srgbClr val="FF0000"/>
+                </a:solidFill>
+              </a:rPr>
+              <a:t>&lt;Navigation&gt;</a:t>
+            </a:r>
+          </a:p>
+        </p:txBody>
+      </p:sp>
+      <p:cxnSp>
+        <p:nvCxnSpPr>
+          <p:cNvPr id="14" name="Straight Arrow Connector 13">
+            <a:extLst>
+              <a:ext uri="{FF2B5EF4-FFF2-40B4-BE49-F238E27FC236}">
+                <a16:creationId xmlns:a16="http://schemas.microsoft.com/office/drawing/2014/main" id="{BF48B5A6-AA12-4D3E-9D6A-2CE816DDA5D7}"/>
+              </a:ext>
+            </a:extLst>
+          </p:cNvPr>
+          <p:cNvCxnSpPr>
+            <a:cxnSpLocks/>
+            <a:stCxn id="12" idx="2"/>
+          </p:cNvCxnSpPr>
+          <p:nvPr/>
+        </p:nvCxnSpPr>
+        <p:spPr>
+          <a:xfrm>
+            <a:off x="5637143" y="1678370"/>
+            <a:ext cx="0" cy="750901"/>
+          </a:xfrm>
+          <a:prstGeom prst="straightConnector1">
+            <a:avLst/>
+          </a:prstGeom>
+          <a:ln w="12700">
+            <a:tailEnd type="triangle"/>
+          </a:ln>
+        </p:spPr>
+        <p:style>
+          <a:lnRef idx="1">
+            <a:schemeClr val="accent1"/>
+          </a:lnRef>
+          <a:fillRef idx="0">
+            <a:schemeClr val="accent1"/>
+          </a:fillRef>
+          <a:effectRef idx="0">
+            <a:schemeClr val="accent1"/>
+          </a:effectRef>
+          <a:fontRef idx="minor">
+            <a:schemeClr val="tx1"/>
+          </a:fontRef>
+        </p:style>
+      </p:cxnSp>
+      <p:cxnSp>
+        <p:nvCxnSpPr>
+          <p:cNvPr id="15" name="Straight Arrow Connector 14">
+            <a:extLst>
+              <a:ext uri="{FF2B5EF4-FFF2-40B4-BE49-F238E27FC236}">
+                <a16:creationId xmlns:a16="http://schemas.microsoft.com/office/drawing/2014/main" id="{4E2A1A83-440F-4349-8A4A-031C62E2CF1F}"/>
+              </a:ext>
+            </a:extLst>
+          </p:cNvPr>
+          <p:cNvCxnSpPr>
+            <a:cxnSpLocks/>
+          </p:cNvCxnSpPr>
+          <p:nvPr/>
+        </p:nvCxnSpPr>
+        <p:spPr>
+          <a:xfrm>
+            <a:off x="2671320" y="3429000"/>
+            <a:ext cx="0" cy="662278"/>
+          </a:xfrm>
+          <a:prstGeom prst="straightConnector1">
+            <a:avLst/>
+          </a:prstGeom>
+          <a:ln w="12700">
+            <a:tailEnd type="triangle"/>
+          </a:ln>
+        </p:spPr>
+        <p:style>
+          <a:lnRef idx="1">
+            <a:schemeClr val="accent1"/>
+          </a:lnRef>
+          <a:fillRef idx="0">
+            <a:schemeClr val="accent1"/>
+          </a:fillRef>
+          <a:effectRef idx="0">
+            <a:schemeClr val="accent1"/>
+          </a:effectRef>
+          <a:fontRef idx="minor">
+            <a:schemeClr val="tx1"/>
+          </a:fontRef>
+        </p:style>
+      </p:cxnSp>
+      <p:cxnSp>
+        <p:nvCxnSpPr>
+          <p:cNvPr id="16" name="Straight Arrow Connector 15">
+            <a:extLst>
+              <a:ext uri="{FF2B5EF4-FFF2-40B4-BE49-F238E27FC236}">
+                <a16:creationId xmlns:a16="http://schemas.microsoft.com/office/drawing/2014/main" id="{40903009-FEF1-419C-AA23-F390FEE0F93B}"/>
+              </a:ext>
+            </a:extLst>
+          </p:cNvPr>
+          <p:cNvCxnSpPr>
+            <a:cxnSpLocks/>
+          </p:cNvCxnSpPr>
+          <p:nvPr/>
+        </p:nvCxnSpPr>
+        <p:spPr>
+          <a:xfrm>
+            <a:off x="9090628" y="3429000"/>
+            <a:ext cx="0" cy="559904"/>
+          </a:xfrm>
+          <a:prstGeom prst="straightConnector1">
+            <a:avLst/>
+          </a:prstGeom>
+          <a:ln w="12700">
+            <a:tailEnd type="triangle"/>
+          </a:ln>
+        </p:spPr>
+        <p:style>
+          <a:lnRef idx="1">
+            <a:schemeClr val="accent1"/>
+          </a:lnRef>
+          <a:fillRef idx="0">
+            <a:schemeClr val="accent1"/>
+          </a:fillRef>
+          <a:effectRef idx="0">
+            <a:schemeClr val="accent1"/>
+          </a:effectRef>
+          <a:fontRef idx="minor">
+            <a:schemeClr val="tx1"/>
+          </a:fontRef>
+        </p:style>
+      </p:cxnSp>
+      <p:sp>
+        <p:nvSpPr>
+          <p:cNvPr id="17" name="TextBox 16">
+            <a:extLst>
+              <a:ext uri="{FF2B5EF4-FFF2-40B4-BE49-F238E27FC236}">
+                <a16:creationId xmlns:a16="http://schemas.microsoft.com/office/drawing/2014/main" id="{4853A453-95F0-4560-A6D3-80396C7F899D}"/>
+              </a:ext>
+            </a:extLst>
+          </p:cNvPr>
+          <p:cNvSpPr txBox="1"/>
+          <p:nvPr/>
+        </p:nvSpPr>
+        <p:spPr>
+          <a:xfrm>
+            <a:off x="2623929" y="3490580"/>
+            <a:ext cx="1344815" cy="338554"/>
+          </a:xfrm>
+          <a:prstGeom prst="rect">
+            <a:avLst/>
+          </a:prstGeom>
+          <a:noFill/>
+        </p:spPr>
+        <p:txBody>
+          <a:bodyPr wrap="square" rtlCol="0">
+            <a:spAutoFit/>
+          </a:bodyPr>
+          <a:lstStyle/>
+          <a:p>
+            <a:r>
+              <a:rPr lang="en-US" sz="1600" dirty="0"/>
+              <a:t>/my-event</a:t>
+            </a:r>
+          </a:p>
+        </p:txBody>
+      </p:sp>
+      <p:sp>
+        <p:nvSpPr>
+          <p:cNvPr id="18" name="TextBox 17">
+            <a:extLst>
+              <a:ext uri="{FF2B5EF4-FFF2-40B4-BE49-F238E27FC236}">
+                <a16:creationId xmlns:a16="http://schemas.microsoft.com/office/drawing/2014/main" id="{BAF7ED05-2577-4685-B558-C35EBBC91328}"/>
+              </a:ext>
+            </a:extLst>
+          </p:cNvPr>
+          <p:cNvSpPr txBox="1"/>
+          <p:nvPr/>
+        </p:nvSpPr>
+        <p:spPr>
+          <a:xfrm>
+            <a:off x="9022896" y="3429000"/>
+            <a:ext cx="995568" cy="338554"/>
+          </a:xfrm>
+          <a:prstGeom prst="rect">
+            <a:avLst/>
+          </a:prstGeom>
+          <a:noFill/>
+        </p:spPr>
+        <p:txBody>
+          <a:bodyPr wrap="square" rtlCol="0">
+            <a:spAutoFit/>
+          </a:bodyPr>
+          <a:lstStyle/>
+          <a:p>
+            <a:r>
+              <a:rPr lang="en-US" sz="1600" dirty="0"/>
+              <a:t>/category</a:t>
+            </a:r>
+          </a:p>
+        </p:txBody>
+      </p:sp>
+      <p:sp>
+        <p:nvSpPr>
+          <p:cNvPr id="19" name="Arrow: Right 18">
+            <a:extLst>
+              <a:ext uri="{FF2B5EF4-FFF2-40B4-BE49-F238E27FC236}">
+                <a16:creationId xmlns:a16="http://schemas.microsoft.com/office/drawing/2014/main" id="{565C4167-37FE-4DF5-BDAD-E60A1D49DF76}"/>
+              </a:ext>
+            </a:extLst>
+          </p:cNvPr>
+          <p:cNvSpPr/>
+          <p:nvPr/>
+        </p:nvSpPr>
+        <p:spPr>
+          <a:xfrm>
+            <a:off x="2623929" y="1340215"/>
+            <a:ext cx="630475" cy="324613"/>
+          </a:xfrm>
+          <a:prstGeom prst="rightArrow">
+            <a:avLst/>
+          </a:prstGeom>
+          <a:solidFill>
+            <a:srgbClr val="FFFF00"/>
+          </a:solidFill>
+        </p:spPr>
+        <p:style>
+          <a:lnRef idx="2">
+            <a:schemeClr val="accent1">
+              <a:shade val="50000"/>
+            </a:schemeClr>
+          </a:lnRef>
+          <a:fillRef idx="1">
+            <a:schemeClr val="accent1"/>
+          </a:fillRef>
+          <a:effectRef idx="0">
+            <a:schemeClr val="accent1"/>
+          </a:effectRef>
+          <a:fontRef idx="minor">
+            <a:schemeClr val="lt1"/>
+          </a:fontRef>
+        </p:style>
+        <p:txBody>
+          <a:bodyPr rtlCol="0" anchor="ctr"/>
+          <a:lstStyle/>
+          <a:p>
+            <a:pPr algn="ctr"/>
+            <a:endParaRPr lang="en-US"/>
+          </a:p>
+        </p:txBody>
+      </p:sp>
+      <p:sp>
+        <p:nvSpPr>
+          <p:cNvPr id="20" name="TextBox 19">
+            <a:extLst>
+              <a:ext uri="{FF2B5EF4-FFF2-40B4-BE49-F238E27FC236}">
+                <a16:creationId xmlns:a16="http://schemas.microsoft.com/office/drawing/2014/main" id="{32863896-D60E-4E67-AF1F-FEA24325EB0C}"/>
+              </a:ext>
+            </a:extLst>
+          </p:cNvPr>
+          <p:cNvSpPr txBox="1"/>
+          <p:nvPr/>
+        </p:nvSpPr>
+        <p:spPr>
+          <a:xfrm>
+            <a:off x="2527428" y="1043066"/>
+            <a:ext cx="995568" cy="338554"/>
+          </a:xfrm>
+          <a:prstGeom prst="rect">
+            <a:avLst/>
+          </a:prstGeom>
+          <a:noFill/>
+        </p:spPr>
+        <p:txBody>
+          <a:bodyPr wrap="square" rtlCol="0">
+            <a:spAutoFit/>
+          </a:bodyPr>
+          <a:lstStyle/>
+          <a:p>
+            <a:r>
+              <a:rPr lang="en-US" sz="1600" b="1" dirty="0">
+                <a:solidFill>
+                  <a:schemeClr val="accent4">
+                    <a:lumMod val="75000"/>
+                  </a:schemeClr>
+                </a:solidFill>
+              </a:rPr>
+              <a:t>PROVIDE</a:t>
+            </a:r>
+          </a:p>
+        </p:txBody>
+      </p:sp>
+      <p:sp>
+        <p:nvSpPr>
+          <p:cNvPr id="21" name="TextBox 20">
+            <a:extLst>
+              <a:ext uri="{FF2B5EF4-FFF2-40B4-BE49-F238E27FC236}">
+                <a16:creationId xmlns:a16="http://schemas.microsoft.com/office/drawing/2014/main" id="{98AFAAC7-A459-47C7-99C2-B119ED0EC99B}"/>
+              </a:ext>
+            </a:extLst>
+          </p:cNvPr>
+          <p:cNvSpPr txBox="1"/>
+          <p:nvPr/>
+        </p:nvSpPr>
+        <p:spPr>
+          <a:xfrm>
+            <a:off x="2527428" y="1623423"/>
+            <a:ext cx="2114144" cy="584775"/>
+          </a:xfrm>
+          <a:prstGeom prst="rect">
+            <a:avLst/>
+          </a:prstGeom>
+          <a:noFill/>
+        </p:spPr>
+        <p:txBody>
+          <a:bodyPr wrap="square" rtlCol="0">
+            <a:spAutoFit/>
+          </a:bodyPr>
+          <a:lstStyle/>
+          <a:p>
+            <a:r>
+              <a:rPr lang="en-US" sz="1600" dirty="0"/>
+              <a:t>my-event-info</a:t>
+            </a:r>
+          </a:p>
+          <a:p>
+            <a:r>
+              <a:rPr lang="en-US" sz="1600" dirty="0"/>
+              <a:t>category-info</a:t>
+            </a:r>
+          </a:p>
+        </p:txBody>
+      </p:sp>
+      <p:sp>
+        <p:nvSpPr>
+          <p:cNvPr id="22" name="Arrow: Right 21">
+            <a:extLst>
+              <a:ext uri="{FF2B5EF4-FFF2-40B4-BE49-F238E27FC236}">
+                <a16:creationId xmlns:a16="http://schemas.microsoft.com/office/drawing/2014/main" id="{5DD4657B-538D-4591-A253-0B8E6C9452C6}"/>
+              </a:ext>
+            </a:extLst>
+          </p:cNvPr>
+          <p:cNvSpPr/>
+          <p:nvPr/>
+        </p:nvSpPr>
+        <p:spPr>
+          <a:xfrm>
+            <a:off x="7450043" y="4238015"/>
+            <a:ext cx="630475" cy="324613"/>
+          </a:xfrm>
+          <a:prstGeom prst="rightArrow">
+            <a:avLst/>
+          </a:prstGeom>
+          <a:solidFill>
+            <a:srgbClr val="FFFF00"/>
+          </a:solidFill>
+        </p:spPr>
+        <p:style>
+          <a:lnRef idx="2">
+            <a:schemeClr val="accent1">
+              <a:shade val="50000"/>
+            </a:schemeClr>
+          </a:lnRef>
+          <a:fillRef idx="1">
+            <a:schemeClr val="accent1"/>
+          </a:fillRef>
+          <a:effectRef idx="0">
+            <a:schemeClr val="accent1"/>
+          </a:effectRef>
+          <a:fontRef idx="minor">
+            <a:schemeClr val="lt1"/>
+          </a:fontRef>
+        </p:style>
+        <p:txBody>
+          <a:bodyPr rtlCol="0" anchor="ctr"/>
+          <a:lstStyle/>
+          <a:p>
+            <a:pPr algn="ctr"/>
+            <a:endParaRPr lang="en-US"/>
+          </a:p>
+        </p:txBody>
+      </p:sp>
+      <p:sp>
+        <p:nvSpPr>
+          <p:cNvPr id="23" name="TextBox 22">
+            <a:extLst>
+              <a:ext uri="{FF2B5EF4-FFF2-40B4-BE49-F238E27FC236}">
+                <a16:creationId xmlns:a16="http://schemas.microsoft.com/office/drawing/2014/main" id="{D4EE0705-7990-46B9-B36E-8530A4AF413E}"/>
+              </a:ext>
+            </a:extLst>
+          </p:cNvPr>
+          <p:cNvSpPr txBox="1"/>
+          <p:nvPr/>
+        </p:nvSpPr>
+        <p:spPr>
+          <a:xfrm>
+            <a:off x="7416932" y="3989899"/>
+            <a:ext cx="802733" cy="338554"/>
+          </a:xfrm>
+          <a:prstGeom prst="rect">
+            <a:avLst/>
+          </a:prstGeom>
+          <a:noFill/>
+        </p:spPr>
+        <p:txBody>
+          <a:bodyPr wrap="square" rtlCol="0">
+            <a:spAutoFit/>
+          </a:bodyPr>
+          <a:lstStyle/>
+          <a:p>
+            <a:r>
+              <a:rPr lang="en-US" sz="1600" b="1" dirty="0">
+                <a:solidFill>
+                  <a:schemeClr val="accent4">
+                    <a:lumMod val="75000"/>
+                  </a:schemeClr>
+                </a:solidFill>
+              </a:rPr>
+              <a:t>INJECT</a:t>
+            </a:r>
+          </a:p>
+        </p:txBody>
+      </p:sp>
+      <p:sp>
+        <p:nvSpPr>
+          <p:cNvPr id="24" name="TextBox 23">
+            <a:extLst>
+              <a:ext uri="{FF2B5EF4-FFF2-40B4-BE49-F238E27FC236}">
+                <a16:creationId xmlns:a16="http://schemas.microsoft.com/office/drawing/2014/main" id="{C954DB1B-4E68-44BA-B037-016D70504A66}"/>
+              </a:ext>
+            </a:extLst>
+          </p:cNvPr>
+          <p:cNvSpPr txBox="1"/>
+          <p:nvPr/>
+        </p:nvSpPr>
+        <p:spPr>
+          <a:xfrm>
+            <a:off x="7057269" y="4498523"/>
+            <a:ext cx="1301543" cy="338554"/>
+          </a:xfrm>
+          <a:prstGeom prst="rect">
+            <a:avLst/>
+          </a:prstGeom>
+          <a:noFill/>
+        </p:spPr>
+        <p:txBody>
+          <a:bodyPr wrap="square" rtlCol="0">
+            <a:spAutoFit/>
+          </a:bodyPr>
+          <a:lstStyle/>
+          <a:p>
+            <a:r>
+              <a:rPr lang="en-US" sz="1600" dirty="0"/>
+              <a:t>category-info</a:t>
+            </a:r>
+          </a:p>
+        </p:txBody>
+      </p:sp>
+      <p:cxnSp>
+        <p:nvCxnSpPr>
+          <p:cNvPr id="25" name="Straight Arrow Connector 24">
+            <a:extLst>
+              <a:ext uri="{FF2B5EF4-FFF2-40B4-BE49-F238E27FC236}">
+                <a16:creationId xmlns:a16="http://schemas.microsoft.com/office/drawing/2014/main" id="{ECEFBD23-565F-4D70-BB3F-6C0FDD57628C}"/>
+              </a:ext>
+            </a:extLst>
+          </p:cNvPr>
+          <p:cNvCxnSpPr>
+            <a:cxnSpLocks/>
+          </p:cNvCxnSpPr>
+          <p:nvPr/>
+        </p:nvCxnSpPr>
+        <p:spPr>
+          <a:xfrm>
+            <a:off x="5829298" y="3490580"/>
+            <a:ext cx="0" cy="498324"/>
+          </a:xfrm>
+          <a:prstGeom prst="straightConnector1">
+            <a:avLst/>
+          </a:prstGeom>
+          <a:ln w="12700">
+            <a:tailEnd type="triangle"/>
+          </a:ln>
+        </p:spPr>
+        <p:style>
+          <a:lnRef idx="1">
+            <a:schemeClr val="accent1"/>
+          </a:lnRef>
+          <a:fillRef idx="0">
+            <a:schemeClr val="accent1"/>
+          </a:fillRef>
+          <a:effectRef idx="0">
+            <a:schemeClr val="accent1"/>
+          </a:effectRef>
+          <a:fontRef idx="minor">
+            <a:schemeClr val="tx1"/>
+          </a:fontRef>
+        </p:style>
+      </p:cxnSp>
+      <p:sp>
+        <p:nvSpPr>
+          <p:cNvPr id="26" name="TextBox 25">
+            <a:extLst>
+              <a:ext uri="{FF2B5EF4-FFF2-40B4-BE49-F238E27FC236}">
+                <a16:creationId xmlns:a16="http://schemas.microsoft.com/office/drawing/2014/main" id="{F49BF017-BAA5-42A8-B389-95BB73DD6778}"/>
+              </a:ext>
+            </a:extLst>
+          </p:cNvPr>
+          <p:cNvSpPr txBox="1"/>
+          <p:nvPr/>
+        </p:nvSpPr>
+        <p:spPr>
+          <a:xfrm>
+            <a:off x="5833582" y="3478737"/>
+            <a:ext cx="1344815" cy="338554"/>
+          </a:xfrm>
+          <a:prstGeom prst="rect">
+            <a:avLst/>
+          </a:prstGeom>
+          <a:noFill/>
+        </p:spPr>
+        <p:txBody>
+          <a:bodyPr wrap="square" rtlCol="0">
+            <a:spAutoFit/>
+          </a:bodyPr>
+          <a:lstStyle/>
+          <a:p>
+            <a:r>
+              <a:rPr lang="en-US" sz="1600" dirty="0"/>
+              <a:t>/event</a:t>
+            </a:r>
+          </a:p>
+        </p:txBody>
+      </p:sp>
+      <p:sp>
+        <p:nvSpPr>
+          <p:cNvPr id="27" name="Rectangle: Rounded Corners 26">
+            <a:extLst>
+              <a:ext uri="{FF2B5EF4-FFF2-40B4-BE49-F238E27FC236}">
+                <a16:creationId xmlns:a16="http://schemas.microsoft.com/office/drawing/2014/main" id="{20FDC8A1-8409-41D4-8AED-8E5AA6EA7A7B}"/>
+              </a:ext>
+            </a:extLst>
+          </p:cNvPr>
+          <p:cNvSpPr/>
+          <p:nvPr/>
+        </p:nvSpPr>
+        <p:spPr>
+          <a:xfrm>
+            <a:off x="5008511" y="4003470"/>
+            <a:ext cx="1991139" cy="833607"/>
+          </a:xfrm>
+          <a:prstGeom prst="roundRect">
+            <a:avLst/>
+          </a:prstGeom>
+          <a:noFill/>
+          <a:ln w="19050">
+            <a:solidFill>
+              <a:schemeClr val="accent6">
+                <a:lumMod val="75000"/>
+              </a:schemeClr>
+            </a:solidFill>
+            <a:prstDash val="dash"/>
+          </a:ln>
+        </p:spPr>
+        <p:style>
+          <a:lnRef idx="2">
+            <a:schemeClr val="dk1"/>
+          </a:lnRef>
+          <a:fillRef idx="1">
+            <a:schemeClr val="lt1"/>
+          </a:fillRef>
+          <a:effectRef idx="0">
+            <a:schemeClr val="dk1"/>
+          </a:effectRef>
+          <a:fontRef idx="minor">
+            <a:schemeClr val="dk1"/>
+          </a:fontRef>
+        </p:style>
+        <p:txBody>
+          <a:bodyPr rtlCol="0" anchor="ctr"/>
+          <a:lstStyle/>
+          <a:p>
+            <a:pPr algn="ctr"/>
+            <a:endParaRPr lang="en-US" dirty="0">
+              <a:ln>
+                <a:solidFill>
+                  <a:srgbClr val="FF0000"/>
+                </a:solidFill>
+              </a:ln>
+              <a:solidFill>
+                <a:srgbClr val="00B050"/>
+              </a:solidFill>
+            </a:endParaRPr>
+          </a:p>
+        </p:txBody>
+      </p:sp>
+      <p:sp>
+        <p:nvSpPr>
+          <p:cNvPr id="28" name="TextBox 27">
+            <a:extLst>
+              <a:ext uri="{FF2B5EF4-FFF2-40B4-BE49-F238E27FC236}">
+                <a16:creationId xmlns:a16="http://schemas.microsoft.com/office/drawing/2014/main" id="{74B735DF-0E18-4852-B02E-4511201D4B1F}"/>
+              </a:ext>
+            </a:extLst>
+          </p:cNvPr>
+          <p:cNvSpPr txBox="1"/>
+          <p:nvPr/>
+        </p:nvSpPr>
+        <p:spPr>
+          <a:xfrm>
+            <a:off x="5059703" y="4091278"/>
+            <a:ext cx="1817366" cy="338554"/>
+          </a:xfrm>
+          <a:prstGeom prst="rect">
+            <a:avLst/>
+          </a:prstGeom>
+          <a:noFill/>
+        </p:spPr>
+        <p:txBody>
+          <a:bodyPr wrap="square" rtlCol="0">
+            <a:spAutoFit/>
+          </a:bodyPr>
+          <a:lstStyle/>
+          <a:p>
+            <a:r>
+              <a:rPr lang="en-US" sz="1600" b="1" dirty="0">
+                <a:solidFill>
+                  <a:srgbClr val="FF0000"/>
+                </a:solidFill>
+              </a:rPr>
+              <a:t>&lt;event-view&gt;</a:t>
+            </a:r>
+          </a:p>
+        </p:txBody>
+      </p:sp>
+      <p:sp>
+        <p:nvSpPr>
+          <p:cNvPr id="29" name="TextBox 28">
+            <a:extLst>
+              <a:ext uri="{FF2B5EF4-FFF2-40B4-BE49-F238E27FC236}">
+                <a16:creationId xmlns:a16="http://schemas.microsoft.com/office/drawing/2014/main" id="{EDFEBAB1-8988-42B9-A90A-449B0E600DB2}"/>
+              </a:ext>
+            </a:extLst>
+          </p:cNvPr>
+          <p:cNvSpPr txBox="1"/>
+          <p:nvPr/>
+        </p:nvSpPr>
+        <p:spPr>
+          <a:xfrm>
+            <a:off x="3753401" y="4513984"/>
+            <a:ext cx="1412833" cy="338554"/>
+          </a:xfrm>
+          <a:prstGeom prst="rect">
+            <a:avLst/>
+          </a:prstGeom>
+          <a:noFill/>
+        </p:spPr>
+        <p:txBody>
+          <a:bodyPr wrap="square" rtlCol="0">
+            <a:spAutoFit/>
+          </a:bodyPr>
+          <a:lstStyle/>
+          <a:p>
+            <a:r>
+              <a:rPr lang="en-US" sz="1600" dirty="0"/>
+              <a:t>my-event-info</a:t>
+            </a:r>
+          </a:p>
+        </p:txBody>
+      </p:sp>
+      <p:sp>
+        <p:nvSpPr>
+          <p:cNvPr id="30" name="Arrow: Right 29">
+            <a:extLst>
+              <a:ext uri="{FF2B5EF4-FFF2-40B4-BE49-F238E27FC236}">
+                <a16:creationId xmlns:a16="http://schemas.microsoft.com/office/drawing/2014/main" id="{E585557F-BDE8-4E54-9D62-2DD2BC69D3E4}"/>
+              </a:ext>
+            </a:extLst>
+          </p:cNvPr>
+          <p:cNvSpPr/>
+          <p:nvPr/>
+        </p:nvSpPr>
+        <p:spPr>
+          <a:xfrm>
+            <a:off x="4181270" y="4251586"/>
+            <a:ext cx="630475" cy="324613"/>
+          </a:xfrm>
+          <a:prstGeom prst="rightArrow">
+            <a:avLst/>
+          </a:prstGeom>
+          <a:solidFill>
+            <a:srgbClr val="FFFF00"/>
+          </a:solidFill>
+        </p:spPr>
+        <p:style>
+          <a:lnRef idx="2">
+            <a:schemeClr val="accent1">
+              <a:shade val="50000"/>
+            </a:schemeClr>
+          </a:lnRef>
+          <a:fillRef idx="1">
+            <a:schemeClr val="accent1"/>
+          </a:fillRef>
+          <a:effectRef idx="0">
+            <a:schemeClr val="accent1"/>
+          </a:effectRef>
+          <a:fontRef idx="minor">
+            <a:schemeClr val="lt1"/>
+          </a:fontRef>
+        </p:style>
+        <p:txBody>
+          <a:bodyPr rtlCol="0" anchor="ctr"/>
+          <a:lstStyle/>
+          <a:p>
+            <a:pPr algn="ctr"/>
+            <a:endParaRPr lang="en-US"/>
+          </a:p>
+        </p:txBody>
+      </p:sp>
+      <p:sp>
+        <p:nvSpPr>
+          <p:cNvPr id="31" name="TextBox 30">
+            <a:extLst>
+              <a:ext uri="{FF2B5EF4-FFF2-40B4-BE49-F238E27FC236}">
+                <a16:creationId xmlns:a16="http://schemas.microsoft.com/office/drawing/2014/main" id="{7E19E742-52E2-4170-A9AF-0FD3EC80FC65}"/>
+              </a:ext>
+            </a:extLst>
+          </p:cNvPr>
+          <p:cNvSpPr txBox="1"/>
+          <p:nvPr/>
+        </p:nvSpPr>
+        <p:spPr>
+          <a:xfrm>
+            <a:off x="4148159" y="4003470"/>
+            <a:ext cx="802733" cy="338554"/>
+          </a:xfrm>
+          <a:prstGeom prst="rect">
+            <a:avLst/>
+          </a:prstGeom>
+          <a:noFill/>
+        </p:spPr>
+        <p:txBody>
+          <a:bodyPr wrap="square" rtlCol="0">
+            <a:spAutoFit/>
+          </a:bodyPr>
+          <a:lstStyle/>
+          <a:p>
+            <a:r>
+              <a:rPr lang="en-US" sz="1600" b="1" dirty="0">
+                <a:solidFill>
+                  <a:schemeClr val="accent4">
+                    <a:lumMod val="75000"/>
+                  </a:schemeClr>
+                </a:solidFill>
+              </a:rPr>
+              <a:t>INJECT</a:t>
+            </a:r>
+          </a:p>
+        </p:txBody>
+      </p:sp>
+      <p:sp>
+        <p:nvSpPr>
+          <p:cNvPr id="32" name="TextBox 31">
+            <a:extLst>
+              <a:ext uri="{FF2B5EF4-FFF2-40B4-BE49-F238E27FC236}">
+                <a16:creationId xmlns:a16="http://schemas.microsoft.com/office/drawing/2014/main" id="{8D260713-6310-4F71-85CF-999C2A4E3C77}"/>
+              </a:ext>
+            </a:extLst>
+          </p:cNvPr>
+          <p:cNvSpPr txBox="1"/>
+          <p:nvPr/>
+        </p:nvSpPr>
+        <p:spPr>
+          <a:xfrm>
+            <a:off x="5607069" y="1678370"/>
+            <a:ext cx="1412833" cy="338554"/>
+          </a:xfrm>
+          <a:prstGeom prst="rect">
+            <a:avLst/>
+          </a:prstGeom>
+          <a:noFill/>
+        </p:spPr>
+        <p:txBody>
+          <a:bodyPr wrap="square" rtlCol="0">
+            <a:spAutoFit/>
+          </a:bodyPr>
+          <a:lstStyle/>
+          <a:p>
+            <a:r>
+              <a:rPr lang="en-US" sz="1600" dirty="0"/>
+              <a:t>Change path</a:t>
+            </a:r>
+          </a:p>
+        </p:txBody>
+      </p:sp>
+      <p:sp>
+        <p:nvSpPr>
+          <p:cNvPr id="33" name="Rectangle: Rounded Corners 32">
+            <a:extLst>
+              <a:ext uri="{FF2B5EF4-FFF2-40B4-BE49-F238E27FC236}">
+                <a16:creationId xmlns:a16="http://schemas.microsoft.com/office/drawing/2014/main" id="{B385ABCB-4239-4D5F-BAA6-542CB450B4B3}"/>
+              </a:ext>
+            </a:extLst>
+          </p:cNvPr>
+          <p:cNvSpPr/>
+          <p:nvPr/>
+        </p:nvSpPr>
+        <p:spPr>
+          <a:xfrm>
+            <a:off x="1603512" y="5557849"/>
+            <a:ext cx="1991139" cy="764916"/>
+          </a:xfrm>
+          <a:prstGeom prst="roundRect">
+            <a:avLst/>
+          </a:prstGeom>
+          <a:noFill/>
+          <a:ln w="19050">
+            <a:solidFill>
+              <a:schemeClr val="accent6">
+                <a:lumMod val="75000"/>
+              </a:schemeClr>
+            </a:solidFill>
+            <a:prstDash val="dash"/>
+          </a:ln>
+        </p:spPr>
+        <p:style>
+          <a:lnRef idx="2">
+            <a:schemeClr val="dk1"/>
+          </a:lnRef>
+          <a:fillRef idx="1">
+            <a:schemeClr val="lt1"/>
+          </a:fillRef>
+          <a:effectRef idx="0">
+            <a:schemeClr val="dk1"/>
+          </a:effectRef>
+          <a:fontRef idx="minor">
+            <a:schemeClr val="dk1"/>
+          </a:fontRef>
+        </p:style>
+        <p:txBody>
+          <a:bodyPr rtlCol="0" anchor="ctr"/>
+          <a:lstStyle/>
+          <a:p>
+            <a:pPr algn="ctr"/>
+            <a:endParaRPr lang="en-US" dirty="0">
+              <a:ln>
+                <a:solidFill>
+                  <a:srgbClr val="FF0000"/>
+                </a:solidFill>
+              </a:ln>
+              <a:solidFill>
+                <a:srgbClr val="00B050"/>
+              </a:solidFill>
+            </a:endParaRPr>
+          </a:p>
+        </p:txBody>
+      </p:sp>
+      <p:sp>
+        <p:nvSpPr>
+          <p:cNvPr id="34" name="TextBox 33">
+            <a:extLst>
+              <a:ext uri="{FF2B5EF4-FFF2-40B4-BE49-F238E27FC236}">
+                <a16:creationId xmlns:a16="http://schemas.microsoft.com/office/drawing/2014/main" id="{D0FC962C-54BD-4087-B800-029D97ADCE65}"/>
+              </a:ext>
+            </a:extLst>
+          </p:cNvPr>
+          <p:cNvSpPr txBox="1"/>
+          <p:nvPr/>
+        </p:nvSpPr>
+        <p:spPr>
+          <a:xfrm>
+            <a:off x="1603512" y="5645657"/>
+            <a:ext cx="1868557" cy="338554"/>
+          </a:xfrm>
+          <a:prstGeom prst="rect">
+            <a:avLst/>
+          </a:prstGeom>
+          <a:noFill/>
+        </p:spPr>
+        <p:txBody>
+          <a:bodyPr wrap="square" rtlCol="0">
+            <a:spAutoFit/>
+          </a:bodyPr>
+          <a:lstStyle/>
+          <a:p>
+            <a:r>
+              <a:rPr lang="en-US" sz="1600" b="1" dirty="0">
+                <a:solidFill>
+                  <a:srgbClr val="FF0000"/>
+                </a:solidFill>
+              </a:rPr>
+              <a:t>&lt;my-event-card&gt;</a:t>
+            </a:r>
+          </a:p>
+        </p:txBody>
+      </p:sp>
+      <p:sp>
+        <p:nvSpPr>
+          <p:cNvPr id="35" name="Rectangle: Rounded Corners 34">
+            <a:extLst>
+              <a:ext uri="{FF2B5EF4-FFF2-40B4-BE49-F238E27FC236}">
+                <a16:creationId xmlns:a16="http://schemas.microsoft.com/office/drawing/2014/main" id="{E09B6B63-A410-40CB-9272-F14D7E0D01BC}"/>
+              </a:ext>
+            </a:extLst>
+          </p:cNvPr>
+          <p:cNvSpPr/>
+          <p:nvPr/>
+        </p:nvSpPr>
+        <p:spPr>
+          <a:xfrm>
+            <a:off x="4970135" y="5531360"/>
+            <a:ext cx="1991139" cy="764916"/>
+          </a:xfrm>
+          <a:prstGeom prst="roundRect">
+            <a:avLst/>
+          </a:prstGeom>
+          <a:noFill/>
+          <a:ln w="19050">
+            <a:solidFill>
+              <a:schemeClr val="accent6">
+                <a:lumMod val="75000"/>
+              </a:schemeClr>
+            </a:solidFill>
+            <a:prstDash val="dash"/>
+          </a:ln>
+        </p:spPr>
+        <p:style>
+          <a:lnRef idx="2">
+            <a:schemeClr val="dk1"/>
+          </a:lnRef>
+          <a:fillRef idx="1">
+            <a:schemeClr val="lt1"/>
+          </a:fillRef>
+          <a:effectRef idx="0">
+            <a:schemeClr val="dk1"/>
+          </a:effectRef>
+          <a:fontRef idx="minor">
+            <a:schemeClr val="dk1"/>
+          </a:fontRef>
+        </p:style>
+        <p:txBody>
+          <a:bodyPr rtlCol="0" anchor="ctr"/>
+          <a:lstStyle/>
+          <a:p>
+            <a:pPr algn="ctr"/>
+            <a:endParaRPr lang="en-US" dirty="0">
+              <a:ln>
+                <a:solidFill>
+                  <a:srgbClr val="FF0000"/>
+                </a:solidFill>
+              </a:ln>
+              <a:solidFill>
+                <a:srgbClr val="00B050"/>
+              </a:solidFill>
+            </a:endParaRPr>
+          </a:p>
+        </p:txBody>
+      </p:sp>
+      <p:sp>
+        <p:nvSpPr>
+          <p:cNvPr id="36" name="TextBox 35">
+            <a:extLst>
+              <a:ext uri="{FF2B5EF4-FFF2-40B4-BE49-F238E27FC236}">
+                <a16:creationId xmlns:a16="http://schemas.microsoft.com/office/drawing/2014/main" id="{4A88584D-37CF-42DC-B7B2-9AF301FC3B12}"/>
+              </a:ext>
+            </a:extLst>
+          </p:cNvPr>
+          <p:cNvSpPr txBox="1"/>
+          <p:nvPr/>
+        </p:nvSpPr>
+        <p:spPr>
+          <a:xfrm>
+            <a:off x="4970135" y="5619168"/>
+            <a:ext cx="1868557" cy="338554"/>
+          </a:xfrm>
+          <a:prstGeom prst="rect">
+            <a:avLst/>
+          </a:prstGeom>
+          <a:noFill/>
+        </p:spPr>
+        <p:txBody>
+          <a:bodyPr wrap="square" rtlCol="0">
+            <a:spAutoFit/>
+          </a:bodyPr>
+          <a:lstStyle/>
+          <a:p>
+            <a:r>
+              <a:rPr lang="en-US" sz="1600" b="1" dirty="0">
+                <a:solidFill>
+                  <a:srgbClr val="FF0000"/>
+                </a:solidFill>
+              </a:rPr>
+              <a:t>&lt;event-card&gt;</a:t>
+            </a:r>
+          </a:p>
+        </p:txBody>
+      </p:sp>
+      <p:sp>
+        <p:nvSpPr>
+          <p:cNvPr id="37" name="Rectangle: Rounded Corners 36">
+            <a:extLst>
+              <a:ext uri="{FF2B5EF4-FFF2-40B4-BE49-F238E27FC236}">
+                <a16:creationId xmlns:a16="http://schemas.microsoft.com/office/drawing/2014/main" id="{86CF417B-978D-4C19-8DF3-E03E9FAFF08E}"/>
+              </a:ext>
+            </a:extLst>
+          </p:cNvPr>
+          <p:cNvSpPr/>
+          <p:nvPr/>
+        </p:nvSpPr>
+        <p:spPr>
+          <a:xfrm>
+            <a:off x="8055304" y="5494606"/>
+            <a:ext cx="1991139" cy="764916"/>
+          </a:xfrm>
+          <a:prstGeom prst="roundRect">
+            <a:avLst/>
+          </a:prstGeom>
+          <a:noFill/>
+          <a:ln w="19050">
+            <a:solidFill>
+              <a:schemeClr val="accent6">
+                <a:lumMod val="75000"/>
+              </a:schemeClr>
+            </a:solidFill>
+            <a:prstDash val="dash"/>
+          </a:ln>
+        </p:spPr>
+        <p:style>
+          <a:lnRef idx="2">
+            <a:schemeClr val="dk1"/>
+          </a:lnRef>
+          <a:fillRef idx="1">
+            <a:schemeClr val="lt1"/>
+          </a:fillRef>
+          <a:effectRef idx="0">
+            <a:schemeClr val="dk1"/>
+          </a:effectRef>
+          <a:fontRef idx="minor">
+            <a:schemeClr val="dk1"/>
+          </a:fontRef>
+        </p:style>
+        <p:txBody>
+          <a:bodyPr rtlCol="0" anchor="ctr"/>
+          <a:lstStyle/>
+          <a:p>
+            <a:pPr algn="ctr"/>
+            <a:endParaRPr lang="en-US" dirty="0">
+              <a:ln>
+                <a:solidFill>
+                  <a:srgbClr val="FF0000"/>
+                </a:solidFill>
+              </a:ln>
+              <a:solidFill>
+                <a:srgbClr val="00B050"/>
+              </a:solidFill>
+            </a:endParaRPr>
+          </a:p>
+        </p:txBody>
+      </p:sp>
+      <p:sp>
+        <p:nvSpPr>
+          <p:cNvPr id="38" name="TextBox 37">
+            <a:extLst>
+              <a:ext uri="{FF2B5EF4-FFF2-40B4-BE49-F238E27FC236}">
+                <a16:creationId xmlns:a16="http://schemas.microsoft.com/office/drawing/2014/main" id="{1C952436-FF21-40E3-A4F6-AA51D3EBD035}"/>
+              </a:ext>
+            </a:extLst>
+          </p:cNvPr>
+          <p:cNvSpPr txBox="1"/>
+          <p:nvPr/>
+        </p:nvSpPr>
+        <p:spPr>
+          <a:xfrm>
+            <a:off x="8177886" y="5583589"/>
+            <a:ext cx="1868557" cy="338554"/>
+          </a:xfrm>
+          <a:prstGeom prst="rect">
+            <a:avLst/>
+          </a:prstGeom>
+          <a:noFill/>
+        </p:spPr>
+        <p:txBody>
+          <a:bodyPr wrap="square" rtlCol="0">
+            <a:spAutoFit/>
+          </a:bodyPr>
+          <a:lstStyle/>
+          <a:p>
+            <a:r>
+              <a:rPr lang="en-US" sz="1600" b="1" dirty="0">
+                <a:solidFill>
+                  <a:srgbClr val="FF0000"/>
+                </a:solidFill>
+              </a:rPr>
+              <a:t>&lt;category-card&gt;</a:t>
+            </a:r>
+          </a:p>
+        </p:txBody>
+      </p:sp>
+      <p:cxnSp>
+        <p:nvCxnSpPr>
+          <p:cNvPr id="39" name="Straight Arrow Connector 38">
+            <a:extLst>
+              <a:ext uri="{FF2B5EF4-FFF2-40B4-BE49-F238E27FC236}">
+                <a16:creationId xmlns:a16="http://schemas.microsoft.com/office/drawing/2014/main" id="{52AD0B29-C1B5-48A2-93A6-A7ED8D207588}"/>
+              </a:ext>
+            </a:extLst>
+          </p:cNvPr>
+          <p:cNvCxnSpPr>
+            <a:cxnSpLocks/>
+          </p:cNvCxnSpPr>
+          <p:nvPr/>
+        </p:nvCxnSpPr>
+        <p:spPr>
+          <a:xfrm>
+            <a:off x="2521809" y="4832328"/>
+            <a:ext cx="0" cy="662278"/>
+          </a:xfrm>
+          <a:prstGeom prst="straightConnector1">
+            <a:avLst/>
+          </a:prstGeom>
+          <a:ln w="12700">
+            <a:tailEnd type="triangle"/>
+          </a:ln>
+        </p:spPr>
+        <p:style>
+          <a:lnRef idx="1">
+            <a:schemeClr val="accent1"/>
+          </a:lnRef>
+          <a:fillRef idx="0">
+            <a:schemeClr val="accent1"/>
+          </a:fillRef>
+          <a:effectRef idx="0">
+            <a:schemeClr val="accent1"/>
+          </a:effectRef>
+          <a:fontRef idx="minor">
+            <a:schemeClr val="tx1"/>
+          </a:fontRef>
+        </p:style>
+      </p:cxnSp>
+      <p:cxnSp>
+        <p:nvCxnSpPr>
+          <p:cNvPr id="40" name="Straight Arrow Connector 39">
+            <a:extLst>
+              <a:ext uri="{FF2B5EF4-FFF2-40B4-BE49-F238E27FC236}">
+                <a16:creationId xmlns:a16="http://schemas.microsoft.com/office/drawing/2014/main" id="{99EB1891-7F52-4A15-8739-D7536B5F0CF3}"/>
+              </a:ext>
+            </a:extLst>
+          </p:cNvPr>
+          <p:cNvCxnSpPr>
+            <a:cxnSpLocks/>
+          </p:cNvCxnSpPr>
+          <p:nvPr/>
+        </p:nvCxnSpPr>
+        <p:spPr>
+          <a:xfrm>
+            <a:off x="6086644" y="4852538"/>
+            <a:ext cx="0" cy="662278"/>
+          </a:xfrm>
+          <a:prstGeom prst="straightConnector1">
+            <a:avLst/>
+          </a:prstGeom>
+          <a:ln w="12700">
+            <a:tailEnd type="triangle"/>
+          </a:ln>
+        </p:spPr>
+        <p:style>
+          <a:lnRef idx="1">
+            <a:schemeClr val="accent1"/>
+          </a:lnRef>
+          <a:fillRef idx="0">
+            <a:schemeClr val="accent1"/>
+          </a:fillRef>
+          <a:effectRef idx="0">
+            <a:schemeClr val="accent1"/>
+          </a:effectRef>
+          <a:fontRef idx="minor">
+            <a:schemeClr val="tx1"/>
+          </a:fontRef>
+        </p:style>
+      </p:cxnSp>
+      <p:cxnSp>
+        <p:nvCxnSpPr>
+          <p:cNvPr id="41" name="Straight Arrow Connector 40">
+            <a:extLst>
+              <a:ext uri="{FF2B5EF4-FFF2-40B4-BE49-F238E27FC236}">
+                <a16:creationId xmlns:a16="http://schemas.microsoft.com/office/drawing/2014/main" id="{61C91320-F6D0-423C-9D64-51A012F4C53C}"/>
+              </a:ext>
+            </a:extLst>
+          </p:cNvPr>
+          <p:cNvCxnSpPr>
+            <a:cxnSpLocks/>
+          </p:cNvCxnSpPr>
+          <p:nvPr/>
+        </p:nvCxnSpPr>
+        <p:spPr>
+          <a:xfrm>
+            <a:off x="9161148" y="4832328"/>
+            <a:ext cx="0" cy="662278"/>
+          </a:xfrm>
+          <a:prstGeom prst="straightConnector1">
+            <a:avLst/>
+          </a:prstGeom>
+          <a:ln w="12700">
+            <a:tailEnd type="triangle"/>
+          </a:ln>
+        </p:spPr>
+        <p:style>
+          <a:lnRef idx="1">
+            <a:schemeClr val="accent1"/>
+          </a:lnRef>
+          <a:fillRef idx="0">
+            <a:schemeClr val="accent1"/>
+          </a:fillRef>
+          <a:effectRef idx="0">
+            <a:schemeClr val="accent1"/>
+          </a:effectRef>
+          <a:fontRef idx="minor">
+            <a:schemeClr val="tx1"/>
+          </a:fontRef>
+        </p:style>
+      </p:cxnSp>
+      <p:sp>
+        <p:nvSpPr>
+          <p:cNvPr id="42" name="TextBox 41">
+            <a:extLst>
+              <a:ext uri="{FF2B5EF4-FFF2-40B4-BE49-F238E27FC236}">
+                <a16:creationId xmlns:a16="http://schemas.microsoft.com/office/drawing/2014/main" id="{126E62AF-191A-491A-B0DD-7925FDAF33DA}"/>
+              </a:ext>
+            </a:extLst>
+          </p:cNvPr>
+          <p:cNvSpPr txBox="1"/>
+          <p:nvPr/>
+        </p:nvSpPr>
+        <p:spPr>
+          <a:xfrm>
+            <a:off x="1660238" y="5111026"/>
+            <a:ext cx="802733" cy="338554"/>
+          </a:xfrm>
+          <a:prstGeom prst="rect">
+            <a:avLst/>
+          </a:prstGeom>
+          <a:noFill/>
+        </p:spPr>
+        <p:txBody>
+          <a:bodyPr wrap="square" rtlCol="0">
+            <a:spAutoFit/>
+          </a:bodyPr>
+          <a:lstStyle/>
+          <a:p>
+            <a:r>
+              <a:rPr lang="en-US" sz="1600" b="1" dirty="0">
+                <a:solidFill>
+                  <a:schemeClr val="accent6">
+                    <a:lumMod val="75000"/>
+                  </a:schemeClr>
+                </a:solidFill>
+              </a:rPr>
+              <a:t>PROPS</a:t>
+            </a:r>
+          </a:p>
+        </p:txBody>
+      </p:sp>
+      <p:sp>
+        <p:nvSpPr>
+          <p:cNvPr id="43" name="TextBox 42">
+            <a:extLst>
+              <a:ext uri="{FF2B5EF4-FFF2-40B4-BE49-F238E27FC236}">
+                <a16:creationId xmlns:a16="http://schemas.microsoft.com/office/drawing/2014/main" id="{3AD8F9A2-AEFF-4384-A0CA-59F0FDCCD964}"/>
+              </a:ext>
+            </a:extLst>
+          </p:cNvPr>
+          <p:cNvSpPr txBox="1"/>
+          <p:nvPr/>
+        </p:nvSpPr>
+        <p:spPr>
+          <a:xfrm>
+            <a:off x="2578221" y="5095637"/>
+            <a:ext cx="1582188" cy="369332"/>
+          </a:xfrm>
+          <a:prstGeom prst="rect">
+            <a:avLst/>
+          </a:prstGeom>
+          <a:noFill/>
+        </p:spPr>
+        <p:txBody>
+          <a:bodyPr wrap="square" rtlCol="0">
+            <a:spAutoFit/>
+          </a:bodyPr>
+          <a:lstStyle/>
+          <a:p>
+            <a:r>
+              <a:rPr lang="en-US" sz="1800" dirty="0"/>
+              <a:t>my-event-info</a:t>
+            </a:r>
+          </a:p>
+        </p:txBody>
+      </p:sp>
+      <p:sp>
+        <p:nvSpPr>
+          <p:cNvPr id="44" name="TextBox 43">
+            <a:extLst>
+              <a:ext uri="{FF2B5EF4-FFF2-40B4-BE49-F238E27FC236}">
+                <a16:creationId xmlns:a16="http://schemas.microsoft.com/office/drawing/2014/main" id="{59C9A32E-F9E7-4AA0-B91C-2C647B95953E}"/>
+              </a:ext>
+            </a:extLst>
+          </p:cNvPr>
+          <p:cNvSpPr txBox="1"/>
+          <p:nvPr/>
+        </p:nvSpPr>
+        <p:spPr>
+          <a:xfrm>
+            <a:off x="5302624" y="5072173"/>
+            <a:ext cx="802733" cy="338554"/>
+          </a:xfrm>
+          <a:prstGeom prst="rect">
+            <a:avLst/>
+          </a:prstGeom>
+          <a:noFill/>
+        </p:spPr>
+        <p:txBody>
+          <a:bodyPr wrap="square" rtlCol="0">
+            <a:spAutoFit/>
+          </a:bodyPr>
+          <a:lstStyle/>
+          <a:p>
+            <a:r>
+              <a:rPr lang="en-US" sz="1600" b="1" dirty="0">
+                <a:solidFill>
+                  <a:schemeClr val="accent6">
+                    <a:lumMod val="75000"/>
+                  </a:schemeClr>
+                </a:solidFill>
+              </a:rPr>
+              <a:t>PROPS</a:t>
+            </a:r>
+          </a:p>
+        </p:txBody>
+      </p:sp>
+      <p:sp>
+        <p:nvSpPr>
+          <p:cNvPr id="45" name="TextBox 44">
+            <a:extLst>
+              <a:ext uri="{FF2B5EF4-FFF2-40B4-BE49-F238E27FC236}">
+                <a16:creationId xmlns:a16="http://schemas.microsoft.com/office/drawing/2014/main" id="{8C6B016E-1B06-4030-8A59-5B80BC40D9A8}"/>
+              </a:ext>
+            </a:extLst>
+          </p:cNvPr>
+          <p:cNvSpPr txBox="1"/>
+          <p:nvPr/>
+        </p:nvSpPr>
+        <p:spPr>
+          <a:xfrm>
+            <a:off x="6060420" y="5056784"/>
+            <a:ext cx="1582188" cy="369332"/>
+          </a:xfrm>
+          <a:prstGeom prst="rect">
+            <a:avLst/>
+          </a:prstGeom>
+          <a:noFill/>
+        </p:spPr>
+        <p:txBody>
+          <a:bodyPr wrap="square" rtlCol="0">
+            <a:spAutoFit/>
+          </a:bodyPr>
+          <a:lstStyle/>
+          <a:p>
+            <a:r>
+              <a:rPr lang="en-US" sz="1800" dirty="0"/>
+              <a:t>my-event-info</a:t>
+            </a:r>
+          </a:p>
+        </p:txBody>
+      </p:sp>
+      <p:sp>
+        <p:nvSpPr>
+          <p:cNvPr id="46" name="TextBox 45">
+            <a:extLst>
+              <a:ext uri="{FF2B5EF4-FFF2-40B4-BE49-F238E27FC236}">
+                <a16:creationId xmlns:a16="http://schemas.microsoft.com/office/drawing/2014/main" id="{D7E80750-362A-4824-821A-0B29A71C403E}"/>
+              </a:ext>
+            </a:extLst>
+          </p:cNvPr>
+          <p:cNvSpPr txBox="1"/>
+          <p:nvPr/>
+        </p:nvSpPr>
+        <p:spPr>
+          <a:xfrm>
+            <a:off x="8403352" y="5056695"/>
+            <a:ext cx="802733" cy="338554"/>
+          </a:xfrm>
+          <a:prstGeom prst="rect">
+            <a:avLst/>
+          </a:prstGeom>
+          <a:noFill/>
+        </p:spPr>
+        <p:txBody>
+          <a:bodyPr wrap="square" rtlCol="0">
+            <a:spAutoFit/>
+          </a:bodyPr>
+          <a:lstStyle/>
+          <a:p>
+            <a:r>
+              <a:rPr lang="en-US" sz="1600" b="1" dirty="0">
+                <a:solidFill>
+                  <a:schemeClr val="accent6">
+                    <a:lumMod val="75000"/>
+                  </a:schemeClr>
+                </a:solidFill>
+              </a:rPr>
+              <a:t>PROPS</a:t>
+            </a:r>
+          </a:p>
+        </p:txBody>
+      </p:sp>
+      <p:sp>
+        <p:nvSpPr>
+          <p:cNvPr id="47" name="TextBox 46">
+            <a:extLst>
+              <a:ext uri="{FF2B5EF4-FFF2-40B4-BE49-F238E27FC236}">
+                <a16:creationId xmlns:a16="http://schemas.microsoft.com/office/drawing/2014/main" id="{BDAF6F84-8460-492A-84C9-9CA7BE16C5CE}"/>
+              </a:ext>
+            </a:extLst>
+          </p:cNvPr>
+          <p:cNvSpPr txBox="1"/>
+          <p:nvPr/>
+        </p:nvSpPr>
+        <p:spPr>
+          <a:xfrm>
+            <a:off x="3343516" y="176514"/>
+            <a:ext cx="4608957" cy="400110"/>
+          </a:xfrm>
+          <a:prstGeom prst="rect">
+            <a:avLst/>
+          </a:prstGeom>
+          <a:noFill/>
+        </p:spPr>
+        <p:txBody>
+          <a:bodyPr wrap="square" rtlCol="0">
+            <a:spAutoFit/>
+          </a:bodyPr>
+          <a:lstStyle/>
+          <a:p>
+            <a:r>
+              <a:rPr lang="en-US" sz="2000" b="1" dirty="0">
+                <a:solidFill>
+                  <a:srgbClr val="00B0F0"/>
+                </a:solidFill>
+              </a:rPr>
+              <a:t>Update Component Diagram Menu</a:t>
+            </a:r>
+          </a:p>
+        </p:txBody>
+      </p:sp>
+    </p:spTree>
+    <p:extLst>
+      <p:ext uri="{BB962C8B-B14F-4D97-AF65-F5344CB8AC3E}">
+        <p14:creationId xmlns:p14="http://schemas.microsoft.com/office/powerpoint/2010/main" val="550595046"/>
       </p:ext>
     </p:extLst>
   </p:cSld>

</xml_diff>